<commit_message>
Added the stacked picture to ppt
</commit_message>
<xml_diff>
--- a/mi_picture.pptx
+++ b/mi_picture.pptx
@@ -6,6 +6,7 @@
   </p:sldMasterIdLst>
   <p:sldIdLst>
     <p:sldId id="256" r:id="rId2"/>
+    <p:sldId id="258" r:id="rId3"/>
   </p:sldIdLst>
   <p:sldSz cx="9144000" cy="6858000" type="screen4x3"/>
   <p:notesSz cx="6858000" cy="9144000"/>
@@ -288,7 +289,7 @@
           <a:p>
             <a:fld id="{B17F4E78-F3C6-4442-AD2E-D4916562ED88}" type="datetimeFigureOut">
               <a:rPr lang="en-US" smtClean="0"/>
-              <a:t>10/24/2015</a:t>
+              <a:t>10/30/2015</a:t>
             </a:fld>
             <a:endParaRPr lang="en-US"/>
           </a:p>
@@ -458,7 +459,7 @@
           <a:p>
             <a:fld id="{B17F4E78-F3C6-4442-AD2E-D4916562ED88}" type="datetimeFigureOut">
               <a:rPr lang="en-US" smtClean="0"/>
-              <a:t>10/24/2015</a:t>
+              <a:t>10/30/2015</a:t>
             </a:fld>
             <a:endParaRPr lang="en-US"/>
           </a:p>
@@ -638,7 +639,7 @@
           <a:p>
             <a:fld id="{B17F4E78-F3C6-4442-AD2E-D4916562ED88}" type="datetimeFigureOut">
               <a:rPr lang="en-US" smtClean="0"/>
-              <a:t>10/24/2015</a:t>
+              <a:t>10/30/2015</a:t>
             </a:fld>
             <a:endParaRPr lang="en-US"/>
           </a:p>
@@ -808,7 +809,7 @@
           <a:p>
             <a:fld id="{B17F4E78-F3C6-4442-AD2E-D4916562ED88}" type="datetimeFigureOut">
               <a:rPr lang="en-US" smtClean="0"/>
-              <a:t>10/24/2015</a:t>
+              <a:t>10/30/2015</a:t>
             </a:fld>
             <a:endParaRPr lang="en-US"/>
           </a:p>
@@ -1054,7 +1055,7 @@
           <a:p>
             <a:fld id="{B17F4E78-F3C6-4442-AD2E-D4916562ED88}" type="datetimeFigureOut">
               <a:rPr lang="en-US" smtClean="0"/>
-              <a:t>10/24/2015</a:t>
+              <a:t>10/30/2015</a:t>
             </a:fld>
             <a:endParaRPr lang="en-US"/>
           </a:p>
@@ -1342,7 +1343,7 @@
           <a:p>
             <a:fld id="{B17F4E78-F3C6-4442-AD2E-D4916562ED88}" type="datetimeFigureOut">
               <a:rPr lang="en-US" smtClean="0"/>
-              <a:t>10/24/2015</a:t>
+              <a:t>10/30/2015</a:t>
             </a:fld>
             <a:endParaRPr lang="en-US"/>
           </a:p>
@@ -1764,7 +1765,7 @@
           <a:p>
             <a:fld id="{B17F4E78-F3C6-4442-AD2E-D4916562ED88}" type="datetimeFigureOut">
               <a:rPr lang="en-US" smtClean="0"/>
-              <a:t>10/24/2015</a:t>
+              <a:t>10/30/2015</a:t>
             </a:fld>
             <a:endParaRPr lang="en-US"/>
           </a:p>
@@ -1882,7 +1883,7 @@
           <a:p>
             <a:fld id="{B17F4E78-F3C6-4442-AD2E-D4916562ED88}" type="datetimeFigureOut">
               <a:rPr lang="en-US" smtClean="0"/>
-              <a:t>10/24/2015</a:t>
+              <a:t>10/30/2015</a:t>
             </a:fld>
             <a:endParaRPr lang="en-US"/>
           </a:p>
@@ -1977,7 +1978,7 @@
           <a:p>
             <a:fld id="{B17F4E78-F3C6-4442-AD2E-D4916562ED88}" type="datetimeFigureOut">
               <a:rPr lang="en-US" smtClean="0"/>
-              <a:t>10/24/2015</a:t>
+              <a:t>10/30/2015</a:t>
             </a:fld>
             <a:endParaRPr lang="en-US"/>
           </a:p>
@@ -2254,7 +2255,7 @@
           <a:p>
             <a:fld id="{B17F4E78-F3C6-4442-AD2E-D4916562ED88}" type="datetimeFigureOut">
               <a:rPr lang="en-US" smtClean="0"/>
-              <a:t>10/24/2015</a:t>
+              <a:t>10/30/2015</a:t>
             </a:fld>
             <a:endParaRPr lang="en-US"/>
           </a:p>
@@ -2507,7 +2508,7 @@
           <a:p>
             <a:fld id="{B17F4E78-F3C6-4442-AD2E-D4916562ED88}" type="datetimeFigureOut">
               <a:rPr lang="en-US" smtClean="0"/>
-              <a:t>10/24/2015</a:t>
+              <a:t>10/30/2015</a:t>
             </a:fld>
             <a:endParaRPr lang="en-US"/>
           </a:p>
@@ -2720,7 +2721,7 @@
           <a:p>
             <a:fld id="{B17F4E78-F3C6-4442-AD2E-D4916562ED88}" type="datetimeFigureOut">
               <a:rPr lang="en-US" smtClean="0"/>
-              <a:t>10/24/2015</a:t>
+              <a:t>10/30/2015</a:t>
             </a:fld>
             <a:endParaRPr lang="en-US"/>
           </a:p>
@@ -4911,8 +4912,8 @@
           </a:p>
         </p:txBody>
       </p:sp>
-      <mc:AlternateContent xmlns:mc="http://schemas.openxmlformats.org/markup-compatibility/2006">
-        <mc:Choice xmlns:a14="http://schemas.microsoft.com/office/drawing/2010/main" Requires="a14">
+      <mc:AlternateContent xmlns:mc="http://schemas.openxmlformats.org/markup-compatibility/2006" xmlns:a14="http://schemas.microsoft.com/office/drawing/2010/main">
+        <mc:Choice Requires="a14">
           <p:sp>
             <p:nvSpPr>
               <p:cNvPr id="33" name="Rectangle 32"/>
@@ -5040,7 +5041,7 @@
             </p:txBody>
           </p:sp>
         </mc:Choice>
-        <mc:Fallback>
+        <mc:Fallback xmlns="">
           <p:sp>
             <p:nvSpPr>
               <p:cNvPr id="33" name="Rectangle 32"/>
@@ -5079,8 +5080,8 @@
           </p:sp>
         </mc:Fallback>
       </mc:AlternateContent>
-      <mc:AlternateContent xmlns:mc="http://schemas.openxmlformats.org/markup-compatibility/2006">
-        <mc:Choice xmlns:a14="http://schemas.microsoft.com/office/drawing/2010/main" Requires="a14">
+      <mc:AlternateContent xmlns:mc="http://schemas.openxmlformats.org/markup-compatibility/2006" xmlns:a14="http://schemas.microsoft.com/office/drawing/2010/main">
+        <mc:Choice Requires="a14">
           <p:sp>
             <p:nvSpPr>
               <p:cNvPr id="34" name="Rectangle 33"/>
@@ -5229,7 +5230,7 @@
             </p:txBody>
           </p:sp>
         </mc:Choice>
-        <mc:Fallback>
+        <mc:Fallback xmlns="">
           <p:sp>
             <p:nvSpPr>
               <p:cNvPr id="34" name="Rectangle 33"/>
@@ -5268,8 +5269,8 @@
           </p:sp>
         </mc:Fallback>
       </mc:AlternateContent>
-      <mc:AlternateContent xmlns:mc="http://schemas.openxmlformats.org/markup-compatibility/2006">
-        <mc:Choice xmlns:a14="http://schemas.microsoft.com/office/drawing/2010/main" Requires="a14">
+      <mc:AlternateContent xmlns:mc="http://schemas.openxmlformats.org/markup-compatibility/2006" xmlns:a14="http://schemas.microsoft.com/office/drawing/2010/main">
+        <mc:Choice Requires="a14">
           <p:sp>
             <p:nvSpPr>
               <p:cNvPr id="35" name="Rectangle 34"/>
@@ -5343,13 +5344,7 @@
                       <a:rPr lang="en-US" b="0" i="1" smtClean="0">
                         <a:latin typeface="Cambria Math"/>
                       </a:rPr>
-                      <m:t>8</m:t>
-                    </m:r>
-                    <m:r>
-                      <a:rPr lang="en-US" b="0" i="1" smtClean="0">
-                        <a:latin typeface="Cambria Math"/>
-                      </a:rPr>
-                      <m:t> </m:t>
+                      <m:t>8 </m:t>
                     </m:r>
                   </m:oMath>
                 </a14:m>
@@ -5418,7 +5413,7 @@
             </p:txBody>
           </p:sp>
         </mc:Choice>
-        <mc:Fallback>
+        <mc:Fallback xmlns="">
           <p:sp>
             <p:nvSpPr>
               <p:cNvPr id="35" name="Rectangle 34"/>
@@ -5611,8 +5606,8 @@
           </a:fontRef>
         </p:style>
       </p:cxnSp>
-      <mc:AlternateContent xmlns:mc="http://schemas.openxmlformats.org/markup-compatibility/2006">
-        <mc:Choice xmlns:a14="http://schemas.microsoft.com/office/drawing/2010/main" Requires="a14">
+      <mc:AlternateContent xmlns:mc="http://schemas.openxmlformats.org/markup-compatibility/2006" xmlns:a14="http://schemas.microsoft.com/office/drawing/2010/main">
+        <mc:Choice Requires="a14">
           <p:sp>
             <p:nvSpPr>
               <p:cNvPr id="53" name="Rectangle 52"/>
@@ -5716,14 +5711,11 @@
                   </a:rPr>
                   <a:t>.176</a:t>
                 </a:r>
-                <a:endParaRPr lang="en-US" b="0" i="1" dirty="0" smtClean="0">
-                  <a:latin typeface="Cambria Math"/>
-                </a:endParaRPr>
               </a:p>
             </p:txBody>
           </p:sp>
         </mc:Choice>
-        <mc:Fallback>
+        <mc:Fallback xmlns="">
           <p:sp>
             <p:nvSpPr>
               <p:cNvPr id="53" name="Rectangle 52"/>
@@ -5827,6 +5819,3127 @@
     <p:extLst>
       <p:ext uri="{BB962C8B-B14F-4D97-AF65-F5344CB8AC3E}">
         <p14:creationId xmlns:p14="http://schemas.microsoft.com/office/powerpoint/2010/main" val="203647997"/>
+      </p:ext>
+    </p:extLst>
+  </p:cSld>
+  <p:clrMapOvr>
+    <a:masterClrMapping/>
+  </p:clrMapOvr>
+  <p:timing>
+    <p:tnLst>
+      <p:par>
+        <p:cTn id="1" dur="indefinite" restart="never" nodeType="tmRoot"/>
+      </p:par>
+    </p:tnLst>
+  </p:timing>
+</p:sld>
+</file>
+
+<file path=ppt/slides/slide2.xml><?xml version="1.0" encoding="utf-8"?>
+<p:sld xmlns:a="http://schemas.openxmlformats.org/drawingml/2006/main" xmlns:r="http://schemas.openxmlformats.org/officeDocument/2006/relationships" xmlns:p="http://schemas.openxmlformats.org/presentationml/2006/main">
+  <p:cSld>
+    <p:spTree>
+      <p:nvGrpSpPr>
+        <p:cNvPr id="1" name=""/>
+        <p:cNvGrpSpPr/>
+        <p:nvPr/>
+      </p:nvGrpSpPr>
+      <p:grpSpPr>
+        <a:xfrm>
+          <a:off x="0" y="0"/>
+          <a:ext cx="0" cy="0"/>
+          <a:chOff x="0" y="0"/>
+          <a:chExt cx="0" cy="0"/>
+        </a:xfrm>
+      </p:grpSpPr>
+      <p:graphicFrame>
+        <p:nvGraphicFramePr>
+          <p:cNvPr id="6" name="Table 5"/>
+          <p:cNvGraphicFramePr>
+            <a:graphicFrameLocks noGrp="1"/>
+          </p:cNvGraphicFramePr>
+          <p:nvPr>
+            <p:extLst>
+              <p:ext uri="{D42A27DB-BD31-4B8C-83A1-F6EECF244321}">
+                <p14:modId xmlns:p14="http://schemas.microsoft.com/office/powerpoint/2010/main" val="1467241442"/>
+              </p:ext>
+            </p:extLst>
+          </p:nvPr>
+        </p:nvGraphicFramePr>
+        <p:xfrm>
+          <a:off x="304800" y="3254616"/>
+          <a:ext cx="1371600" cy="958368"/>
+        </p:xfrm>
+        <a:graphic>
+          <a:graphicData uri="http://schemas.openxmlformats.org/drawingml/2006/table">
+            <a:tbl>
+              <a:tblPr firstRow="1" bandRow="1">
+                <a:tableStyleId>{5C22544A-7EE6-4342-B048-85BDC9FD1C3A}</a:tableStyleId>
+              </a:tblPr>
+              <a:tblGrid>
+                <a:gridCol w="461216"/>
+                <a:gridCol w="453184"/>
+                <a:gridCol w="457200"/>
+              </a:tblGrid>
+              <a:tr h="228600">
+                <a:tc>
+                  <a:txBody>
+                    <a:bodyPr/>
+                    <a:lstStyle/>
+                    <a:p>
+                      <a:pPr algn="ctr" fontAlgn="b"/>
+                      <a:r>
+                        <a:rPr lang="en-US" sz="1100" u="none" strike="noStrike" dirty="0">
+                          <a:effectLst/>
+                        </a:rPr>
+                        <a:t>Age</a:t>
+                      </a:r>
+                      <a:endParaRPr lang="en-US" sz="1100" b="1" i="0" u="none" strike="noStrike" dirty="0">
+                        <a:solidFill>
+                          <a:srgbClr val="FFFFFF"/>
+                        </a:solidFill>
+                        <a:effectLst/>
+                        <a:latin typeface="Calibri"/>
+                      </a:endParaRPr>
+                    </a:p>
+                  </a:txBody>
+                  <a:tcPr marL="9525" marR="9525" marT="9525" marB="0" anchor="b"/>
+                </a:tc>
+                <a:tc>
+                  <a:txBody>
+                    <a:bodyPr/>
+                    <a:lstStyle/>
+                    <a:p>
+                      <a:pPr algn="ctr" fontAlgn="b"/>
+                      <a:r>
+                        <a:rPr lang="en-US" sz="1100" u="none" strike="noStrike">
+                          <a:effectLst/>
+                        </a:rPr>
+                        <a:t>Weight</a:t>
+                      </a:r>
+                      <a:endParaRPr lang="en-US" sz="1100" b="1" i="0" u="none" strike="noStrike">
+                        <a:solidFill>
+                          <a:srgbClr val="FFFFFF"/>
+                        </a:solidFill>
+                        <a:effectLst/>
+                        <a:latin typeface="Calibri"/>
+                      </a:endParaRPr>
+                    </a:p>
+                  </a:txBody>
+                  <a:tcPr marL="9525" marR="9525" marT="9525" marB="0" anchor="b"/>
+                </a:tc>
+                <a:tc>
+                  <a:txBody>
+                    <a:bodyPr/>
+                    <a:lstStyle/>
+                    <a:p>
+                      <a:pPr algn="ctr" fontAlgn="b"/>
+                      <a:r>
+                        <a:rPr lang="en-US" sz="1100" u="none" strike="noStrike" dirty="0">
+                          <a:effectLst/>
+                        </a:rPr>
+                        <a:t>Height</a:t>
+                      </a:r>
+                      <a:endParaRPr lang="en-US" sz="1100" b="1" i="0" u="none" strike="noStrike" dirty="0">
+                        <a:solidFill>
+                          <a:srgbClr val="FFFFFF"/>
+                        </a:solidFill>
+                        <a:effectLst/>
+                        <a:latin typeface="Calibri"/>
+                      </a:endParaRPr>
+                    </a:p>
+                  </a:txBody>
+                  <a:tcPr marL="9525" marR="9525" marT="9525" marB="0" anchor="b"/>
+                </a:tc>
+              </a:tr>
+              <a:tr h="182442">
+                <a:tc>
+                  <a:txBody>
+                    <a:bodyPr/>
+                    <a:lstStyle/>
+                    <a:p>
+                      <a:pPr algn="ctr" fontAlgn="b"/>
+                      <a:r>
+                        <a:rPr lang="en-US" sz="1100" u="none" strike="noStrike">
+                          <a:effectLst/>
+                        </a:rPr>
+                        <a:t>24</a:t>
+                      </a:r>
+                      <a:endParaRPr lang="en-US" sz="1100" b="0" i="0" u="none" strike="noStrike">
+                        <a:solidFill>
+                          <a:srgbClr val="000000"/>
+                        </a:solidFill>
+                        <a:effectLst/>
+                        <a:latin typeface="Calibri"/>
+                      </a:endParaRPr>
+                    </a:p>
+                  </a:txBody>
+                  <a:tcPr marL="9525" marR="9525" marT="9525" marB="0" anchor="b"/>
+                </a:tc>
+                <a:tc>
+                  <a:txBody>
+                    <a:bodyPr/>
+                    <a:lstStyle/>
+                    <a:p>
+                      <a:pPr algn="ctr" fontAlgn="b"/>
+                      <a:r>
+                        <a:rPr lang="en-US" sz="1100" u="none" strike="noStrike" dirty="0">
+                          <a:solidFill>
+                            <a:srgbClr val="FF0000"/>
+                          </a:solidFill>
+                          <a:effectLst/>
+                        </a:rPr>
+                        <a:t>?</a:t>
+                      </a:r>
+                      <a:endParaRPr lang="en-US" sz="1100" b="0" i="0" u="none" strike="noStrike" dirty="0">
+                        <a:solidFill>
+                          <a:srgbClr val="FF0000"/>
+                        </a:solidFill>
+                        <a:effectLst/>
+                        <a:latin typeface="Calibri"/>
+                      </a:endParaRPr>
+                    </a:p>
+                  </a:txBody>
+                  <a:tcPr marL="9525" marR="9525" marT="9525" marB="0" anchor="b"/>
+                </a:tc>
+                <a:tc>
+                  <a:txBody>
+                    <a:bodyPr/>
+                    <a:lstStyle/>
+                    <a:p>
+                      <a:pPr algn="ctr" fontAlgn="b"/>
+                      <a:r>
+                        <a:rPr lang="en-US" sz="1100" u="none" strike="noStrike">
+                          <a:effectLst/>
+                        </a:rPr>
+                        <a:t>70</a:t>
+                      </a:r>
+                      <a:endParaRPr lang="en-US" sz="1100" b="0" i="0" u="none" strike="noStrike">
+                        <a:solidFill>
+                          <a:srgbClr val="000000"/>
+                        </a:solidFill>
+                        <a:effectLst/>
+                        <a:latin typeface="Calibri"/>
+                      </a:endParaRPr>
+                    </a:p>
+                  </a:txBody>
+                  <a:tcPr marL="9525" marR="9525" marT="9525" marB="0" anchor="b"/>
+                </a:tc>
+              </a:tr>
+              <a:tr h="182442">
+                <a:tc>
+                  <a:txBody>
+                    <a:bodyPr/>
+                    <a:lstStyle/>
+                    <a:p>
+                      <a:pPr algn="ctr" fontAlgn="b"/>
+                      <a:r>
+                        <a:rPr lang="en-US" sz="1100" u="none" strike="noStrike">
+                          <a:effectLst/>
+                        </a:rPr>
+                        <a:t>28</a:t>
+                      </a:r>
+                      <a:endParaRPr lang="en-US" sz="1100" b="0" i="0" u="none" strike="noStrike">
+                        <a:solidFill>
+                          <a:srgbClr val="000000"/>
+                        </a:solidFill>
+                        <a:effectLst/>
+                        <a:latin typeface="Calibri"/>
+                      </a:endParaRPr>
+                    </a:p>
+                  </a:txBody>
+                  <a:tcPr marL="9525" marR="9525" marT="9525" marB="0" anchor="b"/>
+                </a:tc>
+                <a:tc>
+                  <a:txBody>
+                    <a:bodyPr/>
+                    <a:lstStyle/>
+                    <a:p>
+                      <a:pPr algn="ctr" fontAlgn="b"/>
+                      <a:r>
+                        <a:rPr lang="en-US" sz="1100" u="none" strike="noStrike">
+                          <a:effectLst/>
+                        </a:rPr>
+                        <a:t>160</a:t>
+                      </a:r>
+                      <a:endParaRPr lang="en-US" sz="1100" b="0" i="0" u="none" strike="noStrike">
+                        <a:solidFill>
+                          <a:srgbClr val="000000"/>
+                        </a:solidFill>
+                        <a:effectLst/>
+                        <a:latin typeface="Calibri"/>
+                      </a:endParaRPr>
+                    </a:p>
+                  </a:txBody>
+                  <a:tcPr marL="9525" marR="9525" marT="9525" marB="0" anchor="b"/>
+                </a:tc>
+                <a:tc>
+                  <a:txBody>
+                    <a:bodyPr/>
+                    <a:lstStyle/>
+                    <a:p>
+                      <a:pPr algn="ctr" fontAlgn="b"/>
+                      <a:r>
+                        <a:rPr lang="en-US" sz="1100" u="none" strike="noStrike" dirty="0">
+                          <a:solidFill>
+                            <a:srgbClr val="FF0000"/>
+                          </a:solidFill>
+                          <a:effectLst/>
+                        </a:rPr>
+                        <a:t>?</a:t>
+                      </a:r>
+                      <a:endParaRPr lang="en-US" sz="1100" b="0" i="0" u="none" strike="noStrike" dirty="0">
+                        <a:solidFill>
+                          <a:srgbClr val="FF0000"/>
+                        </a:solidFill>
+                        <a:effectLst/>
+                        <a:latin typeface="Calibri"/>
+                      </a:endParaRPr>
+                    </a:p>
+                  </a:txBody>
+                  <a:tcPr marL="9525" marR="9525" marT="9525" marB="0" anchor="b"/>
+                </a:tc>
+              </a:tr>
+              <a:tr h="182442">
+                <a:tc>
+                  <a:txBody>
+                    <a:bodyPr/>
+                    <a:lstStyle/>
+                    <a:p>
+                      <a:pPr algn="ctr" fontAlgn="b"/>
+                      <a:r>
+                        <a:rPr lang="en-US" sz="1100" u="none" strike="noStrike">
+                          <a:effectLst/>
+                        </a:rPr>
+                        <a:t>20</a:t>
+                      </a:r>
+                      <a:endParaRPr lang="en-US" sz="1100" b="0" i="0" u="none" strike="noStrike">
+                        <a:solidFill>
+                          <a:srgbClr val="000000"/>
+                        </a:solidFill>
+                        <a:effectLst/>
+                        <a:latin typeface="Calibri"/>
+                      </a:endParaRPr>
+                    </a:p>
+                  </a:txBody>
+                  <a:tcPr marL="9525" marR="9525" marT="9525" marB="0" anchor="b"/>
+                </a:tc>
+                <a:tc>
+                  <a:txBody>
+                    <a:bodyPr/>
+                    <a:lstStyle/>
+                    <a:p>
+                      <a:pPr algn="ctr" fontAlgn="b"/>
+                      <a:r>
+                        <a:rPr lang="en-US" sz="1100" u="none" strike="noStrike">
+                          <a:effectLst/>
+                        </a:rPr>
+                        <a:t>155</a:t>
+                      </a:r>
+                      <a:endParaRPr lang="en-US" sz="1100" b="0" i="0" u="none" strike="noStrike">
+                        <a:solidFill>
+                          <a:srgbClr val="000000"/>
+                        </a:solidFill>
+                        <a:effectLst/>
+                        <a:latin typeface="Calibri"/>
+                      </a:endParaRPr>
+                    </a:p>
+                  </a:txBody>
+                  <a:tcPr marL="9525" marR="9525" marT="9525" marB="0" anchor="b"/>
+                </a:tc>
+                <a:tc>
+                  <a:txBody>
+                    <a:bodyPr/>
+                    <a:lstStyle/>
+                    <a:p>
+                      <a:pPr algn="ctr" fontAlgn="b"/>
+                      <a:r>
+                        <a:rPr lang="en-US" sz="1100" u="none" strike="noStrike" dirty="0">
+                          <a:effectLst/>
+                        </a:rPr>
+                        <a:t>65</a:t>
+                      </a:r>
+                      <a:endParaRPr lang="en-US" sz="1100" b="0" i="0" u="none" strike="noStrike" dirty="0">
+                        <a:solidFill>
+                          <a:srgbClr val="000000"/>
+                        </a:solidFill>
+                        <a:effectLst/>
+                        <a:latin typeface="Calibri"/>
+                      </a:endParaRPr>
+                    </a:p>
+                  </a:txBody>
+                  <a:tcPr marL="9525" marR="9525" marT="9525" marB="0" anchor="b"/>
+                </a:tc>
+              </a:tr>
+              <a:tr h="182442">
+                <a:tc>
+                  <a:txBody>
+                    <a:bodyPr/>
+                    <a:lstStyle/>
+                    <a:p>
+                      <a:pPr algn="ctr" fontAlgn="b"/>
+                      <a:r>
+                        <a:rPr lang="en-US" sz="1100" b="0" i="0" u="none" strike="noStrike" dirty="0" smtClean="0">
+                          <a:solidFill>
+                            <a:srgbClr val="000000"/>
+                          </a:solidFill>
+                          <a:effectLst/>
+                          <a:latin typeface="Calibri"/>
+                        </a:rPr>
+                        <a:t>⁞</a:t>
+                      </a:r>
+                      <a:endParaRPr lang="en-US" sz="1100" b="0" i="0" u="none" strike="noStrike" dirty="0">
+                        <a:solidFill>
+                          <a:srgbClr val="000000"/>
+                        </a:solidFill>
+                        <a:effectLst/>
+                        <a:latin typeface="Calibri"/>
+                      </a:endParaRPr>
+                    </a:p>
+                  </a:txBody>
+                  <a:tcPr marL="9525" marR="9525" marT="9525" marB="0" anchor="b"/>
+                </a:tc>
+                <a:tc>
+                  <a:txBody>
+                    <a:bodyPr/>
+                    <a:lstStyle/>
+                    <a:p>
+                      <a:pPr algn="ctr" fontAlgn="b"/>
+                      <a:r>
+                        <a:rPr lang="en-US" sz="1100" b="0" i="0" u="none" strike="noStrike" dirty="0" smtClean="0">
+                          <a:solidFill>
+                            <a:srgbClr val="000000"/>
+                          </a:solidFill>
+                          <a:effectLst/>
+                          <a:latin typeface="+mn-lt"/>
+                        </a:rPr>
+                        <a:t>⁞</a:t>
+                      </a:r>
+                    </a:p>
+                  </a:txBody>
+                  <a:tcPr marL="9525" marR="9525" marT="9525" marB="0" anchor="b"/>
+                </a:tc>
+                <a:tc>
+                  <a:txBody>
+                    <a:bodyPr/>
+                    <a:lstStyle/>
+                    <a:p>
+                      <a:pPr algn="ctr" fontAlgn="b"/>
+                      <a:r>
+                        <a:rPr lang="en-US" sz="1100" b="0" i="0" u="none" strike="noStrike" dirty="0" smtClean="0">
+                          <a:solidFill>
+                            <a:srgbClr val="000000"/>
+                          </a:solidFill>
+                          <a:effectLst/>
+                          <a:latin typeface="+mn-lt"/>
+                        </a:rPr>
+                        <a:t>⁞</a:t>
+                      </a:r>
+                      <a:endParaRPr lang="en-US" sz="1100" b="0" i="0" u="none" strike="noStrike" dirty="0">
+                        <a:solidFill>
+                          <a:srgbClr val="000000"/>
+                        </a:solidFill>
+                        <a:effectLst/>
+                        <a:latin typeface="Calibri"/>
+                      </a:endParaRPr>
+                    </a:p>
+                  </a:txBody>
+                  <a:tcPr marL="9525" marR="9525" marT="9525" marB="0" anchor="b"/>
+                </a:tc>
+              </a:tr>
+            </a:tbl>
+          </a:graphicData>
+        </a:graphic>
+      </p:graphicFrame>
+      <p:graphicFrame>
+        <p:nvGraphicFramePr>
+          <p:cNvPr id="7" name="Table 6"/>
+          <p:cNvGraphicFramePr>
+            <a:graphicFrameLocks noGrp="1"/>
+          </p:cNvGraphicFramePr>
+          <p:nvPr>
+            <p:extLst>
+              <p:ext uri="{D42A27DB-BD31-4B8C-83A1-F6EECF244321}">
+                <p14:modId xmlns:p14="http://schemas.microsoft.com/office/powerpoint/2010/main" val="1983882492"/>
+              </p:ext>
+            </p:extLst>
+          </p:nvPr>
+        </p:nvGraphicFramePr>
+        <p:xfrm>
+          <a:off x="2604387" y="2133600"/>
+          <a:ext cx="1371600" cy="958368"/>
+        </p:xfrm>
+        <a:graphic>
+          <a:graphicData uri="http://schemas.openxmlformats.org/drawingml/2006/table">
+            <a:tbl>
+              <a:tblPr firstRow="1" bandRow="1">
+                <a:tableStyleId>{5C22544A-7EE6-4342-B048-85BDC9FD1C3A}</a:tableStyleId>
+              </a:tblPr>
+              <a:tblGrid>
+                <a:gridCol w="461216"/>
+                <a:gridCol w="453184"/>
+                <a:gridCol w="457200"/>
+              </a:tblGrid>
+              <a:tr h="228600">
+                <a:tc>
+                  <a:txBody>
+                    <a:bodyPr/>
+                    <a:lstStyle/>
+                    <a:p>
+                      <a:pPr algn="ctr" fontAlgn="b"/>
+                      <a:r>
+                        <a:rPr lang="en-US" sz="1100" u="none" strike="noStrike" dirty="0">
+                          <a:effectLst/>
+                        </a:rPr>
+                        <a:t>Age</a:t>
+                      </a:r>
+                      <a:endParaRPr lang="en-US" sz="1100" b="1" i="0" u="none" strike="noStrike" dirty="0">
+                        <a:solidFill>
+                          <a:srgbClr val="FFFFFF"/>
+                        </a:solidFill>
+                        <a:effectLst/>
+                        <a:latin typeface="Calibri"/>
+                      </a:endParaRPr>
+                    </a:p>
+                  </a:txBody>
+                  <a:tcPr marL="9525" marR="9525" marT="9525" marB="0" anchor="b"/>
+                </a:tc>
+                <a:tc>
+                  <a:txBody>
+                    <a:bodyPr/>
+                    <a:lstStyle/>
+                    <a:p>
+                      <a:pPr algn="ctr" fontAlgn="b"/>
+                      <a:r>
+                        <a:rPr lang="en-US" sz="1100" u="none" strike="noStrike" dirty="0">
+                          <a:effectLst/>
+                        </a:rPr>
+                        <a:t>Weight</a:t>
+                      </a:r>
+                      <a:endParaRPr lang="en-US" sz="1100" b="1" i="0" u="none" strike="noStrike" dirty="0">
+                        <a:solidFill>
+                          <a:srgbClr val="FFFFFF"/>
+                        </a:solidFill>
+                        <a:effectLst/>
+                        <a:latin typeface="Calibri"/>
+                      </a:endParaRPr>
+                    </a:p>
+                  </a:txBody>
+                  <a:tcPr marL="9525" marR="9525" marT="9525" marB="0" anchor="b"/>
+                </a:tc>
+                <a:tc>
+                  <a:txBody>
+                    <a:bodyPr/>
+                    <a:lstStyle/>
+                    <a:p>
+                      <a:pPr algn="ctr" fontAlgn="b"/>
+                      <a:r>
+                        <a:rPr lang="en-US" sz="1100" u="none" strike="noStrike" dirty="0">
+                          <a:effectLst/>
+                        </a:rPr>
+                        <a:t>Height</a:t>
+                      </a:r>
+                      <a:endParaRPr lang="en-US" sz="1100" b="1" i="0" u="none" strike="noStrike" dirty="0">
+                        <a:solidFill>
+                          <a:srgbClr val="FFFFFF"/>
+                        </a:solidFill>
+                        <a:effectLst/>
+                        <a:latin typeface="Calibri"/>
+                      </a:endParaRPr>
+                    </a:p>
+                  </a:txBody>
+                  <a:tcPr marL="9525" marR="9525" marT="9525" marB="0" anchor="b"/>
+                </a:tc>
+              </a:tr>
+              <a:tr h="182442">
+                <a:tc>
+                  <a:txBody>
+                    <a:bodyPr/>
+                    <a:lstStyle/>
+                    <a:p>
+                      <a:pPr algn="ctr" fontAlgn="b"/>
+                      <a:r>
+                        <a:rPr lang="en-US" sz="1100" u="none" strike="noStrike">
+                          <a:effectLst/>
+                        </a:rPr>
+                        <a:t>24</a:t>
+                      </a:r>
+                      <a:endParaRPr lang="en-US" sz="1100" b="0" i="0" u="none" strike="noStrike">
+                        <a:solidFill>
+                          <a:srgbClr val="000000"/>
+                        </a:solidFill>
+                        <a:effectLst/>
+                        <a:latin typeface="Calibri"/>
+                      </a:endParaRPr>
+                    </a:p>
+                  </a:txBody>
+                  <a:tcPr marL="9525" marR="9525" marT="9525" marB="0" anchor="b"/>
+                </a:tc>
+                <a:tc>
+                  <a:txBody>
+                    <a:bodyPr/>
+                    <a:lstStyle/>
+                    <a:p>
+                      <a:pPr algn="ctr" fontAlgn="b"/>
+                      <a:r>
+                        <a:rPr lang="en-US" sz="1100" u="none" strike="noStrike" dirty="0" smtClean="0">
+                          <a:solidFill>
+                            <a:srgbClr val="00B050"/>
+                          </a:solidFill>
+                          <a:effectLst/>
+                        </a:rPr>
+                        <a:t>170</a:t>
+                      </a:r>
+                      <a:endParaRPr lang="en-US" sz="1100" b="0" i="0" u="none" strike="noStrike" dirty="0">
+                        <a:solidFill>
+                          <a:srgbClr val="00B050"/>
+                        </a:solidFill>
+                        <a:effectLst/>
+                        <a:latin typeface="Calibri"/>
+                      </a:endParaRPr>
+                    </a:p>
+                  </a:txBody>
+                  <a:tcPr marL="9525" marR="9525" marT="9525" marB="0" anchor="b"/>
+                </a:tc>
+                <a:tc>
+                  <a:txBody>
+                    <a:bodyPr/>
+                    <a:lstStyle/>
+                    <a:p>
+                      <a:pPr algn="ctr" fontAlgn="b"/>
+                      <a:r>
+                        <a:rPr lang="en-US" sz="1100" u="none" strike="noStrike">
+                          <a:effectLst/>
+                        </a:rPr>
+                        <a:t>70</a:t>
+                      </a:r>
+                      <a:endParaRPr lang="en-US" sz="1100" b="0" i="0" u="none" strike="noStrike">
+                        <a:solidFill>
+                          <a:srgbClr val="000000"/>
+                        </a:solidFill>
+                        <a:effectLst/>
+                        <a:latin typeface="Calibri"/>
+                      </a:endParaRPr>
+                    </a:p>
+                  </a:txBody>
+                  <a:tcPr marL="9525" marR="9525" marT="9525" marB="0" anchor="b"/>
+                </a:tc>
+              </a:tr>
+              <a:tr h="182442">
+                <a:tc>
+                  <a:txBody>
+                    <a:bodyPr/>
+                    <a:lstStyle/>
+                    <a:p>
+                      <a:pPr algn="ctr" fontAlgn="b"/>
+                      <a:r>
+                        <a:rPr lang="en-US" sz="1100" u="none" strike="noStrike">
+                          <a:effectLst/>
+                        </a:rPr>
+                        <a:t>28</a:t>
+                      </a:r>
+                      <a:endParaRPr lang="en-US" sz="1100" b="0" i="0" u="none" strike="noStrike">
+                        <a:solidFill>
+                          <a:srgbClr val="000000"/>
+                        </a:solidFill>
+                        <a:effectLst/>
+                        <a:latin typeface="Calibri"/>
+                      </a:endParaRPr>
+                    </a:p>
+                  </a:txBody>
+                  <a:tcPr marL="9525" marR="9525" marT="9525" marB="0" anchor="b"/>
+                </a:tc>
+                <a:tc>
+                  <a:txBody>
+                    <a:bodyPr/>
+                    <a:lstStyle/>
+                    <a:p>
+                      <a:pPr algn="ctr" fontAlgn="b"/>
+                      <a:r>
+                        <a:rPr lang="en-US" sz="1100" u="none" strike="noStrike">
+                          <a:effectLst/>
+                        </a:rPr>
+                        <a:t>160</a:t>
+                      </a:r>
+                      <a:endParaRPr lang="en-US" sz="1100" b="0" i="0" u="none" strike="noStrike">
+                        <a:solidFill>
+                          <a:srgbClr val="000000"/>
+                        </a:solidFill>
+                        <a:effectLst/>
+                        <a:latin typeface="Calibri"/>
+                      </a:endParaRPr>
+                    </a:p>
+                  </a:txBody>
+                  <a:tcPr marL="9525" marR="9525" marT="9525" marB="0" anchor="b"/>
+                </a:tc>
+                <a:tc>
+                  <a:txBody>
+                    <a:bodyPr/>
+                    <a:lstStyle/>
+                    <a:p>
+                      <a:pPr algn="ctr" fontAlgn="b"/>
+                      <a:r>
+                        <a:rPr lang="en-US" sz="1100" b="0" i="0" u="none" strike="noStrike" dirty="0" smtClean="0">
+                          <a:solidFill>
+                            <a:srgbClr val="00B050"/>
+                          </a:solidFill>
+                          <a:effectLst/>
+                          <a:latin typeface="+mn-lt"/>
+                        </a:rPr>
+                        <a:t>68</a:t>
+                      </a:r>
+                      <a:endParaRPr lang="en-US" sz="1100" b="0" i="0" u="none" strike="noStrike" dirty="0">
+                        <a:solidFill>
+                          <a:srgbClr val="00B050"/>
+                        </a:solidFill>
+                        <a:effectLst/>
+                        <a:latin typeface="Calibri"/>
+                      </a:endParaRPr>
+                    </a:p>
+                  </a:txBody>
+                  <a:tcPr marL="9525" marR="9525" marT="9525" marB="0" anchor="b"/>
+                </a:tc>
+              </a:tr>
+              <a:tr h="182442">
+                <a:tc>
+                  <a:txBody>
+                    <a:bodyPr/>
+                    <a:lstStyle/>
+                    <a:p>
+                      <a:pPr algn="ctr" fontAlgn="b"/>
+                      <a:r>
+                        <a:rPr lang="en-US" sz="1100" u="none" strike="noStrike">
+                          <a:effectLst/>
+                        </a:rPr>
+                        <a:t>20</a:t>
+                      </a:r>
+                      <a:endParaRPr lang="en-US" sz="1100" b="0" i="0" u="none" strike="noStrike">
+                        <a:solidFill>
+                          <a:srgbClr val="000000"/>
+                        </a:solidFill>
+                        <a:effectLst/>
+                        <a:latin typeface="Calibri"/>
+                      </a:endParaRPr>
+                    </a:p>
+                  </a:txBody>
+                  <a:tcPr marL="9525" marR="9525" marT="9525" marB="0" anchor="b"/>
+                </a:tc>
+                <a:tc>
+                  <a:txBody>
+                    <a:bodyPr/>
+                    <a:lstStyle/>
+                    <a:p>
+                      <a:pPr algn="ctr" fontAlgn="b"/>
+                      <a:r>
+                        <a:rPr lang="en-US" sz="1100" u="none" strike="noStrike">
+                          <a:effectLst/>
+                        </a:rPr>
+                        <a:t>155</a:t>
+                      </a:r>
+                      <a:endParaRPr lang="en-US" sz="1100" b="0" i="0" u="none" strike="noStrike">
+                        <a:solidFill>
+                          <a:srgbClr val="000000"/>
+                        </a:solidFill>
+                        <a:effectLst/>
+                        <a:latin typeface="Calibri"/>
+                      </a:endParaRPr>
+                    </a:p>
+                  </a:txBody>
+                  <a:tcPr marL="9525" marR="9525" marT="9525" marB="0" anchor="b"/>
+                </a:tc>
+                <a:tc>
+                  <a:txBody>
+                    <a:bodyPr/>
+                    <a:lstStyle/>
+                    <a:p>
+                      <a:pPr algn="ctr" fontAlgn="b"/>
+                      <a:r>
+                        <a:rPr lang="en-US" sz="1100" u="none" strike="noStrike" dirty="0">
+                          <a:effectLst/>
+                        </a:rPr>
+                        <a:t>65</a:t>
+                      </a:r>
+                      <a:endParaRPr lang="en-US" sz="1100" b="0" i="0" u="none" strike="noStrike" dirty="0">
+                        <a:solidFill>
+                          <a:srgbClr val="000000"/>
+                        </a:solidFill>
+                        <a:effectLst/>
+                        <a:latin typeface="Calibri"/>
+                      </a:endParaRPr>
+                    </a:p>
+                  </a:txBody>
+                  <a:tcPr marL="9525" marR="9525" marT="9525" marB="0" anchor="b"/>
+                </a:tc>
+              </a:tr>
+              <a:tr h="182442">
+                <a:tc>
+                  <a:txBody>
+                    <a:bodyPr/>
+                    <a:lstStyle/>
+                    <a:p>
+                      <a:pPr algn="ctr" fontAlgn="b"/>
+                      <a:r>
+                        <a:rPr lang="en-US" sz="1100" b="0" i="0" u="none" strike="noStrike" dirty="0" smtClean="0">
+                          <a:solidFill>
+                            <a:srgbClr val="000000"/>
+                          </a:solidFill>
+                          <a:effectLst/>
+                          <a:latin typeface="Calibri"/>
+                        </a:rPr>
+                        <a:t>⁞</a:t>
+                      </a:r>
+                      <a:endParaRPr lang="en-US" sz="1100" b="0" i="0" u="none" strike="noStrike" dirty="0">
+                        <a:solidFill>
+                          <a:srgbClr val="000000"/>
+                        </a:solidFill>
+                        <a:effectLst/>
+                        <a:latin typeface="Calibri"/>
+                      </a:endParaRPr>
+                    </a:p>
+                  </a:txBody>
+                  <a:tcPr marL="9525" marR="9525" marT="9525" marB="0" anchor="b"/>
+                </a:tc>
+                <a:tc>
+                  <a:txBody>
+                    <a:bodyPr/>
+                    <a:lstStyle/>
+                    <a:p>
+                      <a:pPr algn="ctr" fontAlgn="b"/>
+                      <a:r>
+                        <a:rPr lang="en-US" sz="1100" b="0" i="0" u="none" strike="noStrike" dirty="0" smtClean="0">
+                          <a:solidFill>
+                            <a:srgbClr val="000000"/>
+                          </a:solidFill>
+                          <a:effectLst/>
+                          <a:latin typeface="+mn-lt"/>
+                        </a:rPr>
+                        <a:t>⁞</a:t>
+                      </a:r>
+                    </a:p>
+                  </a:txBody>
+                  <a:tcPr marL="9525" marR="9525" marT="9525" marB="0" anchor="b"/>
+                </a:tc>
+                <a:tc>
+                  <a:txBody>
+                    <a:bodyPr/>
+                    <a:lstStyle/>
+                    <a:p>
+                      <a:pPr algn="ctr" fontAlgn="b"/>
+                      <a:r>
+                        <a:rPr lang="en-US" sz="1100" b="0" i="0" u="none" strike="noStrike" dirty="0" smtClean="0">
+                          <a:solidFill>
+                            <a:srgbClr val="000000"/>
+                          </a:solidFill>
+                          <a:effectLst/>
+                          <a:latin typeface="+mn-lt"/>
+                        </a:rPr>
+                        <a:t>⁞</a:t>
+                      </a:r>
+                      <a:endParaRPr lang="en-US" sz="1100" b="0" i="0" u="none" strike="noStrike" dirty="0">
+                        <a:solidFill>
+                          <a:srgbClr val="000000"/>
+                        </a:solidFill>
+                        <a:effectLst/>
+                        <a:latin typeface="Calibri"/>
+                      </a:endParaRPr>
+                    </a:p>
+                  </a:txBody>
+                  <a:tcPr marL="9525" marR="9525" marT="9525" marB="0" anchor="b"/>
+                </a:tc>
+              </a:tr>
+            </a:tbl>
+          </a:graphicData>
+        </a:graphic>
+      </p:graphicFrame>
+      <p:graphicFrame>
+        <p:nvGraphicFramePr>
+          <p:cNvPr id="8" name="Table 7"/>
+          <p:cNvGraphicFramePr>
+            <a:graphicFrameLocks noGrp="1"/>
+          </p:cNvGraphicFramePr>
+          <p:nvPr>
+            <p:extLst>
+              <p:ext uri="{D42A27DB-BD31-4B8C-83A1-F6EECF244321}">
+                <p14:modId xmlns:p14="http://schemas.microsoft.com/office/powerpoint/2010/main" val="1967788423"/>
+              </p:ext>
+            </p:extLst>
+          </p:nvPr>
+        </p:nvGraphicFramePr>
+        <p:xfrm>
+          <a:off x="2604387" y="3116141"/>
+          <a:ext cx="1371600" cy="958368"/>
+        </p:xfrm>
+        <a:graphic>
+          <a:graphicData uri="http://schemas.openxmlformats.org/drawingml/2006/table">
+            <a:tbl>
+              <a:tblPr firstRow="1" bandRow="1">
+                <a:tableStyleId>{5C22544A-7EE6-4342-B048-85BDC9FD1C3A}</a:tableStyleId>
+              </a:tblPr>
+              <a:tblGrid>
+                <a:gridCol w="461216"/>
+                <a:gridCol w="453184"/>
+                <a:gridCol w="457200"/>
+              </a:tblGrid>
+              <a:tr h="228600">
+                <a:tc>
+                  <a:txBody>
+                    <a:bodyPr/>
+                    <a:lstStyle/>
+                    <a:p>
+                      <a:pPr algn="ctr" fontAlgn="b"/>
+                      <a:r>
+                        <a:rPr lang="en-US" sz="1100" u="none" strike="noStrike" dirty="0">
+                          <a:effectLst/>
+                        </a:rPr>
+                        <a:t>Age</a:t>
+                      </a:r>
+                      <a:endParaRPr lang="en-US" sz="1100" b="1" i="0" u="none" strike="noStrike" dirty="0">
+                        <a:solidFill>
+                          <a:srgbClr val="FFFFFF"/>
+                        </a:solidFill>
+                        <a:effectLst/>
+                        <a:latin typeface="Calibri"/>
+                      </a:endParaRPr>
+                    </a:p>
+                  </a:txBody>
+                  <a:tcPr marL="9525" marR="9525" marT="9525" marB="0" anchor="b"/>
+                </a:tc>
+                <a:tc>
+                  <a:txBody>
+                    <a:bodyPr/>
+                    <a:lstStyle/>
+                    <a:p>
+                      <a:pPr algn="ctr" fontAlgn="b"/>
+                      <a:r>
+                        <a:rPr lang="en-US" sz="1100" u="none" strike="noStrike">
+                          <a:effectLst/>
+                        </a:rPr>
+                        <a:t>Weight</a:t>
+                      </a:r>
+                      <a:endParaRPr lang="en-US" sz="1100" b="1" i="0" u="none" strike="noStrike">
+                        <a:solidFill>
+                          <a:srgbClr val="FFFFFF"/>
+                        </a:solidFill>
+                        <a:effectLst/>
+                        <a:latin typeface="Calibri"/>
+                      </a:endParaRPr>
+                    </a:p>
+                  </a:txBody>
+                  <a:tcPr marL="9525" marR="9525" marT="9525" marB="0" anchor="b"/>
+                </a:tc>
+                <a:tc>
+                  <a:txBody>
+                    <a:bodyPr/>
+                    <a:lstStyle/>
+                    <a:p>
+                      <a:pPr algn="ctr" fontAlgn="b"/>
+                      <a:r>
+                        <a:rPr lang="en-US" sz="1100" u="none" strike="noStrike" dirty="0">
+                          <a:effectLst/>
+                        </a:rPr>
+                        <a:t>Height</a:t>
+                      </a:r>
+                      <a:endParaRPr lang="en-US" sz="1100" b="1" i="0" u="none" strike="noStrike" dirty="0">
+                        <a:solidFill>
+                          <a:srgbClr val="FFFFFF"/>
+                        </a:solidFill>
+                        <a:effectLst/>
+                        <a:latin typeface="Calibri"/>
+                      </a:endParaRPr>
+                    </a:p>
+                  </a:txBody>
+                  <a:tcPr marL="9525" marR="9525" marT="9525" marB="0" anchor="b"/>
+                </a:tc>
+              </a:tr>
+              <a:tr h="182442">
+                <a:tc>
+                  <a:txBody>
+                    <a:bodyPr/>
+                    <a:lstStyle/>
+                    <a:p>
+                      <a:pPr algn="ctr" fontAlgn="b"/>
+                      <a:r>
+                        <a:rPr lang="en-US" sz="1100" u="none" strike="noStrike" dirty="0">
+                          <a:effectLst/>
+                        </a:rPr>
+                        <a:t>24</a:t>
+                      </a:r>
+                      <a:endParaRPr lang="en-US" sz="1100" b="0" i="0" u="none" strike="noStrike" dirty="0">
+                        <a:solidFill>
+                          <a:srgbClr val="000000"/>
+                        </a:solidFill>
+                        <a:effectLst/>
+                        <a:latin typeface="Calibri"/>
+                      </a:endParaRPr>
+                    </a:p>
+                  </a:txBody>
+                  <a:tcPr marL="9525" marR="9525" marT="9525" marB="0" anchor="b"/>
+                </a:tc>
+                <a:tc>
+                  <a:txBody>
+                    <a:bodyPr/>
+                    <a:lstStyle/>
+                    <a:p>
+                      <a:pPr algn="ctr" fontAlgn="b"/>
+                      <a:r>
+                        <a:rPr lang="en-US" sz="1100" u="none" strike="noStrike" dirty="0" smtClean="0">
+                          <a:solidFill>
+                            <a:srgbClr val="00B050"/>
+                          </a:solidFill>
+                          <a:effectLst/>
+                        </a:rPr>
+                        <a:t>150</a:t>
+                      </a:r>
+                      <a:endParaRPr lang="en-US" sz="1100" b="0" i="0" u="none" strike="noStrike" dirty="0">
+                        <a:solidFill>
+                          <a:srgbClr val="00B050"/>
+                        </a:solidFill>
+                        <a:effectLst/>
+                        <a:latin typeface="Calibri"/>
+                      </a:endParaRPr>
+                    </a:p>
+                  </a:txBody>
+                  <a:tcPr marL="9525" marR="9525" marT="9525" marB="0" anchor="b"/>
+                </a:tc>
+                <a:tc>
+                  <a:txBody>
+                    <a:bodyPr/>
+                    <a:lstStyle/>
+                    <a:p>
+                      <a:pPr algn="ctr" fontAlgn="b"/>
+                      <a:r>
+                        <a:rPr lang="en-US" sz="1100" u="none" strike="noStrike" dirty="0">
+                          <a:effectLst/>
+                        </a:rPr>
+                        <a:t>70</a:t>
+                      </a:r>
+                      <a:endParaRPr lang="en-US" sz="1100" b="0" i="0" u="none" strike="noStrike" dirty="0">
+                        <a:solidFill>
+                          <a:srgbClr val="000000"/>
+                        </a:solidFill>
+                        <a:effectLst/>
+                        <a:latin typeface="Calibri"/>
+                      </a:endParaRPr>
+                    </a:p>
+                  </a:txBody>
+                  <a:tcPr marL="9525" marR="9525" marT="9525" marB="0" anchor="b"/>
+                </a:tc>
+              </a:tr>
+              <a:tr h="182442">
+                <a:tc>
+                  <a:txBody>
+                    <a:bodyPr/>
+                    <a:lstStyle/>
+                    <a:p>
+                      <a:pPr algn="ctr" fontAlgn="b"/>
+                      <a:r>
+                        <a:rPr lang="en-US" sz="1100" u="none" strike="noStrike" dirty="0">
+                          <a:effectLst/>
+                        </a:rPr>
+                        <a:t>28</a:t>
+                      </a:r>
+                      <a:endParaRPr lang="en-US" sz="1100" b="0" i="0" u="none" strike="noStrike" dirty="0">
+                        <a:solidFill>
+                          <a:srgbClr val="000000"/>
+                        </a:solidFill>
+                        <a:effectLst/>
+                        <a:latin typeface="Calibri"/>
+                      </a:endParaRPr>
+                    </a:p>
+                  </a:txBody>
+                  <a:tcPr marL="9525" marR="9525" marT="9525" marB="0" anchor="b"/>
+                </a:tc>
+                <a:tc>
+                  <a:txBody>
+                    <a:bodyPr/>
+                    <a:lstStyle/>
+                    <a:p>
+                      <a:pPr algn="ctr" fontAlgn="b"/>
+                      <a:r>
+                        <a:rPr lang="en-US" sz="1100" u="none" strike="noStrike" dirty="0">
+                          <a:effectLst/>
+                        </a:rPr>
+                        <a:t>160</a:t>
+                      </a:r>
+                      <a:endParaRPr lang="en-US" sz="1100" b="0" i="0" u="none" strike="noStrike" dirty="0">
+                        <a:solidFill>
+                          <a:srgbClr val="000000"/>
+                        </a:solidFill>
+                        <a:effectLst/>
+                        <a:latin typeface="Calibri"/>
+                      </a:endParaRPr>
+                    </a:p>
+                  </a:txBody>
+                  <a:tcPr marL="9525" marR="9525" marT="9525" marB="0" anchor="b"/>
+                </a:tc>
+                <a:tc>
+                  <a:txBody>
+                    <a:bodyPr/>
+                    <a:lstStyle/>
+                    <a:p>
+                      <a:pPr algn="ctr" fontAlgn="b"/>
+                      <a:r>
+                        <a:rPr lang="en-US" sz="1100" u="none" strike="noStrike" dirty="0" smtClean="0">
+                          <a:solidFill>
+                            <a:srgbClr val="00B050"/>
+                          </a:solidFill>
+                          <a:effectLst/>
+                        </a:rPr>
+                        <a:t>64</a:t>
+                      </a:r>
+                      <a:endParaRPr lang="en-US" sz="1100" b="0" i="0" u="none" strike="noStrike" dirty="0">
+                        <a:solidFill>
+                          <a:srgbClr val="00B050"/>
+                        </a:solidFill>
+                        <a:effectLst/>
+                        <a:latin typeface="Calibri"/>
+                      </a:endParaRPr>
+                    </a:p>
+                  </a:txBody>
+                  <a:tcPr marL="9525" marR="9525" marT="9525" marB="0" anchor="b"/>
+                </a:tc>
+              </a:tr>
+              <a:tr h="182442">
+                <a:tc>
+                  <a:txBody>
+                    <a:bodyPr/>
+                    <a:lstStyle/>
+                    <a:p>
+                      <a:pPr algn="ctr" fontAlgn="b"/>
+                      <a:r>
+                        <a:rPr lang="en-US" sz="1100" u="none" strike="noStrike">
+                          <a:effectLst/>
+                        </a:rPr>
+                        <a:t>20</a:t>
+                      </a:r>
+                      <a:endParaRPr lang="en-US" sz="1100" b="0" i="0" u="none" strike="noStrike">
+                        <a:solidFill>
+                          <a:srgbClr val="000000"/>
+                        </a:solidFill>
+                        <a:effectLst/>
+                        <a:latin typeface="Calibri"/>
+                      </a:endParaRPr>
+                    </a:p>
+                  </a:txBody>
+                  <a:tcPr marL="9525" marR="9525" marT="9525" marB="0" anchor="b"/>
+                </a:tc>
+                <a:tc>
+                  <a:txBody>
+                    <a:bodyPr/>
+                    <a:lstStyle/>
+                    <a:p>
+                      <a:pPr algn="ctr" fontAlgn="b"/>
+                      <a:r>
+                        <a:rPr lang="en-US" sz="1100" u="none" strike="noStrike" dirty="0">
+                          <a:effectLst/>
+                        </a:rPr>
+                        <a:t>155</a:t>
+                      </a:r>
+                      <a:endParaRPr lang="en-US" sz="1100" b="0" i="0" u="none" strike="noStrike" dirty="0">
+                        <a:solidFill>
+                          <a:srgbClr val="000000"/>
+                        </a:solidFill>
+                        <a:effectLst/>
+                        <a:latin typeface="Calibri"/>
+                      </a:endParaRPr>
+                    </a:p>
+                  </a:txBody>
+                  <a:tcPr marL="9525" marR="9525" marT="9525" marB="0" anchor="b"/>
+                </a:tc>
+                <a:tc>
+                  <a:txBody>
+                    <a:bodyPr/>
+                    <a:lstStyle/>
+                    <a:p>
+                      <a:pPr algn="ctr" fontAlgn="b"/>
+                      <a:r>
+                        <a:rPr lang="en-US" sz="1100" u="none" strike="noStrike" dirty="0">
+                          <a:effectLst/>
+                        </a:rPr>
+                        <a:t>65</a:t>
+                      </a:r>
+                      <a:endParaRPr lang="en-US" sz="1100" b="0" i="0" u="none" strike="noStrike" dirty="0">
+                        <a:solidFill>
+                          <a:srgbClr val="000000"/>
+                        </a:solidFill>
+                        <a:effectLst/>
+                        <a:latin typeface="Calibri"/>
+                      </a:endParaRPr>
+                    </a:p>
+                  </a:txBody>
+                  <a:tcPr marL="9525" marR="9525" marT="9525" marB="0" anchor="b"/>
+                </a:tc>
+              </a:tr>
+              <a:tr h="182442">
+                <a:tc>
+                  <a:txBody>
+                    <a:bodyPr/>
+                    <a:lstStyle/>
+                    <a:p>
+                      <a:pPr algn="ctr" fontAlgn="b"/>
+                      <a:r>
+                        <a:rPr lang="en-US" sz="1100" b="0" i="0" u="none" strike="noStrike" dirty="0" smtClean="0">
+                          <a:solidFill>
+                            <a:srgbClr val="000000"/>
+                          </a:solidFill>
+                          <a:effectLst/>
+                          <a:latin typeface="Calibri"/>
+                        </a:rPr>
+                        <a:t>⁞</a:t>
+                      </a:r>
+                      <a:endParaRPr lang="en-US" sz="1100" b="0" i="0" u="none" strike="noStrike" dirty="0">
+                        <a:solidFill>
+                          <a:srgbClr val="000000"/>
+                        </a:solidFill>
+                        <a:effectLst/>
+                        <a:latin typeface="Calibri"/>
+                      </a:endParaRPr>
+                    </a:p>
+                  </a:txBody>
+                  <a:tcPr marL="9525" marR="9525" marT="9525" marB="0" anchor="b"/>
+                </a:tc>
+                <a:tc>
+                  <a:txBody>
+                    <a:bodyPr/>
+                    <a:lstStyle/>
+                    <a:p>
+                      <a:pPr algn="ctr" fontAlgn="b"/>
+                      <a:r>
+                        <a:rPr lang="en-US" sz="1100" b="0" i="0" u="none" strike="noStrike" dirty="0" smtClean="0">
+                          <a:solidFill>
+                            <a:srgbClr val="000000"/>
+                          </a:solidFill>
+                          <a:effectLst/>
+                          <a:latin typeface="+mn-lt"/>
+                        </a:rPr>
+                        <a:t>⁞</a:t>
+                      </a:r>
+                    </a:p>
+                  </a:txBody>
+                  <a:tcPr marL="9525" marR="9525" marT="9525" marB="0" anchor="b"/>
+                </a:tc>
+                <a:tc>
+                  <a:txBody>
+                    <a:bodyPr/>
+                    <a:lstStyle/>
+                    <a:p>
+                      <a:pPr algn="ctr" fontAlgn="b"/>
+                      <a:r>
+                        <a:rPr lang="en-US" sz="1100" b="0" i="0" u="none" strike="noStrike" dirty="0" smtClean="0">
+                          <a:solidFill>
+                            <a:srgbClr val="000000"/>
+                          </a:solidFill>
+                          <a:effectLst/>
+                          <a:latin typeface="+mn-lt"/>
+                        </a:rPr>
+                        <a:t>⁞</a:t>
+                      </a:r>
+                      <a:endParaRPr lang="en-US" sz="1100" b="0" i="0" u="none" strike="noStrike" dirty="0">
+                        <a:solidFill>
+                          <a:srgbClr val="000000"/>
+                        </a:solidFill>
+                        <a:effectLst/>
+                        <a:latin typeface="Calibri"/>
+                      </a:endParaRPr>
+                    </a:p>
+                  </a:txBody>
+                  <a:tcPr marL="9525" marR="9525" marT="9525" marB="0" anchor="b"/>
+                </a:tc>
+              </a:tr>
+            </a:tbl>
+          </a:graphicData>
+        </a:graphic>
+      </p:graphicFrame>
+      <p:graphicFrame>
+        <p:nvGraphicFramePr>
+          <p:cNvPr id="9" name="Table 8"/>
+          <p:cNvGraphicFramePr>
+            <a:graphicFrameLocks noGrp="1"/>
+          </p:cNvGraphicFramePr>
+          <p:nvPr>
+            <p:extLst>
+              <p:ext uri="{D42A27DB-BD31-4B8C-83A1-F6EECF244321}">
+                <p14:modId xmlns:p14="http://schemas.microsoft.com/office/powerpoint/2010/main" val="3500517569"/>
+              </p:ext>
+            </p:extLst>
+          </p:nvPr>
+        </p:nvGraphicFramePr>
+        <p:xfrm>
+          <a:off x="2625169" y="4299432"/>
+          <a:ext cx="1371600" cy="958368"/>
+        </p:xfrm>
+        <a:graphic>
+          <a:graphicData uri="http://schemas.openxmlformats.org/drawingml/2006/table">
+            <a:tbl>
+              <a:tblPr firstRow="1" bandRow="1">
+                <a:tableStyleId>{5C22544A-7EE6-4342-B048-85BDC9FD1C3A}</a:tableStyleId>
+              </a:tblPr>
+              <a:tblGrid>
+                <a:gridCol w="461216"/>
+                <a:gridCol w="453184"/>
+                <a:gridCol w="457200"/>
+              </a:tblGrid>
+              <a:tr h="228600">
+                <a:tc>
+                  <a:txBody>
+                    <a:bodyPr/>
+                    <a:lstStyle/>
+                    <a:p>
+                      <a:pPr algn="ctr" fontAlgn="b"/>
+                      <a:r>
+                        <a:rPr lang="en-US" sz="1100" u="none" strike="noStrike" dirty="0">
+                          <a:effectLst/>
+                        </a:rPr>
+                        <a:t>Age</a:t>
+                      </a:r>
+                      <a:endParaRPr lang="en-US" sz="1100" b="1" i="0" u="none" strike="noStrike" dirty="0">
+                        <a:solidFill>
+                          <a:srgbClr val="FFFFFF"/>
+                        </a:solidFill>
+                        <a:effectLst/>
+                        <a:latin typeface="Calibri"/>
+                      </a:endParaRPr>
+                    </a:p>
+                  </a:txBody>
+                  <a:tcPr marL="9525" marR="9525" marT="9525" marB="0" anchor="b"/>
+                </a:tc>
+                <a:tc>
+                  <a:txBody>
+                    <a:bodyPr/>
+                    <a:lstStyle/>
+                    <a:p>
+                      <a:pPr algn="ctr" fontAlgn="b"/>
+                      <a:r>
+                        <a:rPr lang="en-US" sz="1100" u="none" strike="noStrike" dirty="0">
+                          <a:effectLst/>
+                        </a:rPr>
+                        <a:t>Weight</a:t>
+                      </a:r>
+                      <a:endParaRPr lang="en-US" sz="1100" b="1" i="0" u="none" strike="noStrike" dirty="0">
+                        <a:solidFill>
+                          <a:srgbClr val="FFFFFF"/>
+                        </a:solidFill>
+                        <a:effectLst/>
+                        <a:latin typeface="Calibri"/>
+                      </a:endParaRPr>
+                    </a:p>
+                  </a:txBody>
+                  <a:tcPr marL="9525" marR="9525" marT="9525" marB="0" anchor="b"/>
+                </a:tc>
+                <a:tc>
+                  <a:txBody>
+                    <a:bodyPr/>
+                    <a:lstStyle/>
+                    <a:p>
+                      <a:pPr algn="ctr" fontAlgn="b"/>
+                      <a:r>
+                        <a:rPr lang="en-US" sz="1100" u="none" strike="noStrike" dirty="0">
+                          <a:effectLst/>
+                        </a:rPr>
+                        <a:t>Height</a:t>
+                      </a:r>
+                      <a:endParaRPr lang="en-US" sz="1100" b="1" i="0" u="none" strike="noStrike" dirty="0">
+                        <a:solidFill>
+                          <a:srgbClr val="FFFFFF"/>
+                        </a:solidFill>
+                        <a:effectLst/>
+                        <a:latin typeface="Calibri"/>
+                      </a:endParaRPr>
+                    </a:p>
+                  </a:txBody>
+                  <a:tcPr marL="9525" marR="9525" marT="9525" marB="0" anchor="b"/>
+                </a:tc>
+              </a:tr>
+              <a:tr h="182442">
+                <a:tc>
+                  <a:txBody>
+                    <a:bodyPr/>
+                    <a:lstStyle/>
+                    <a:p>
+                      <a:pPr algn="ctr" fontAlgn="b"/>
+                      <a:r>
+                        <a:rPr lang="en-US" sz="1100" u="none" strike="noStrike" dirty="0">
+                          <a:effectLst/>
+                        </a:rPr>
+                        <a:t>24</a:t>
+                      </a:r>
+                      <a:endParaRPr lang="en-US" sz="1100" b="0" i="0" u="none" strike="noStrike" dirty="0">
+                        <a:solidFill>
+                          <a:srgbClr val="000000"/>
+                        </a:solidFill>
+                        <a:effectLst/>
+                        <a:latin typeface="Calibri"/>
+                      </a:endParaRPr>
+                    </a:p>
+                  </a:txBody>
+                  <a:tcPr marL="9525" marR="9525" marT="9525" marB="0" anchor="b"/>
+                </a:tc>
+                <a:tc>
+                  <a:txBody>
+                    <a:bodyPr/>
+                    <a:lstStyle/>
+                    <a:p>
+                      <a:pPr algn="ctr" fontAlgn="b"/>
+                      <a:r>
+                        <a:rPr lang="en-US" sz="1100" b="0" i="0" u="none" strike="noStrike" dirty="0" smtClean="0">
+                          <a:solidFill>
+                            <a:srgbClr val="00B050"/>
+                          </a:solidFill>
+                          <a:effectLst/>
+                          <a:latin typeface="+mn-lt"/>
+                        </a:rPr>
+                        <a:t>163</a:t>
+                      </a:r>
+                      <a:endParaRPr lang="en-US" sz="1100" b="0" i="0" u="none" strike="noStrike" dirty="0">
+                        <a:solidFill>
+                          <a:srgbClr val="00B050"/>
+                        </a:solidFill>
+                        <a:effectLst/>
+                        <a:latin typeface="Calibri"/>
+                      </a:endParaRPr>
+                    </a:p>
+                  </a:txBody>
+                  <a:tcPr marL="9525" marR="9525" marT="9525" marB="0" anchor="b"/>
+                </a:tc>
+                <a:tc>
+                  <a:txBody>
+                    <a:bodyPr/>
+                    <a:lstStyle/>
+                    <a:p>
+                      <a:pPr algn="ctr" fontAlgn="b"/>
+                      <a:r>
+                        <a:rPr lang="en-US" sz="1100" u="none" strike="noStrike">
+                          <a:effectLst/>
+                        </a:rPr>
+                        <a:t>70</a:t>
+                      </a:r>
+                      <a:endParaRPr lang="en-US" sz="1100" b="0" i="0" u="none" strike="noStrike">
+                        <a:solidFill>
+                          <a:srgbClr val="000000"/>
+                        </a:solidFill>
+                        <a:effectLst/>
+                        <a:latin typeface="Calibri"/>
+                      </a:endParaRPr>
+                    </a:p>
+                  </a:txBody>
+                  <a:tcPr marL="9525" marR="9525" marT="9525" marB="0" anchor="b"/>
+                </a:tc>
+              </a:tr>
+              <a:tr h="182442">
+                <a:tc>
+                  <a:txBody>
+                    <a:bodyPr/>
+                    <a:lstStyle/>
+                    <a:p>
+                      <a:pPr algn="ctr" fontAlgn="b"/>
+                      <a:r>
+                        <a:rPr lang="en-US" sz="1100" u="none" strike="noStrike" dirty="0">
+                          <a:effectLst/>
+                        </a:rPr>
+                        <a:t>28</a:t>
+                      </a:r>
+                      <a:endParaRPr lang="en-US" sz="1100" b="0" i="0" u="none" strike="noStrike" dirty="0">
+                        <a:solidFill>
+                          <a:srgbClr val="000000"/>
+                        </a:solidFill>
+                        <a:effectLst/>
+                        <a:latin typeface="Calibri"/>
+                      </a:endParaRPr>
+                    </a:p>
+                  </a:txBody>
+                  <a:tcPr marL="9525" marR="9525" marT="9525" marB="0" anchor="b"/>
+                </a:tc>
+                <a:tc>
+                  <a:txBody>
+                    <a:bodyPr/>
+                    <a:lstStyle/>
+                    <a:p>
+                      <a:pPr algn="ctr" fontAlgn="b"/>
+                      <a:r>
+                        <a:rPr lang="en-US" sz="1100" u="none" strike="noStrike">
+                          <a:effectLst/>
+                        </a:rPr>
+                        <a:t>160</a:t>
+                      </a:r>
+                      <a:endParaRPr lang="en-US" sz="1100" b="0" i="0" u="none" strike="noStrike">
+                        <a:solidFill>
+                          <a:srgbClr val="000000"/>
+                        </a:solidFill>
+                        <a:effectLst/>
+                        <a:latin typeface="Calibri"/>
+                      </a:endParaRPr>
+                    </a:p>
+                  </a:txBody>
+                  <a:tcPr marL="9525" marR="9525" marT="9525" marB="0" anchor="b"/>
+                </a:tc>
+                <a:tc>
+                  <a:txBody>
+                    <a:bodyPr/>
+                    <a:lstStyle/>
+                    <a:p>
+                      <a:pPr algn="ctr" fontAlgn="b"/>
+                      <a:r>
+                        <a:rPr lang="en-US" sz="1100" u="none" strike="noStrike" dirty="0" smtClean="0">
+                          <a:solidFill>
+                            <a:srgbClr val="00B050"/>
+                          </a:solidFill>
+                          <a:effectLst/>
+                        </a:rPr>
+                        <a:t>66</a:t>
+                      </a:r>
+                      <a:endParaRPr lang="en-US" sz="1100" b="0" i="0" u="none" strike="noStrike" dirty="0">
+                        <a:solidFill>
+                          <a:srgbClr val="00B050"/>
+                        </a:solidFill>
+                        <a:effectLst/>
+                        <a:latin typeface="Calibri"/>
+                      </a:endParaRPr>
+                    </a:p>
+                  </a:txBody>
+                  <a:tcPr marL="9525" marR="9525" marT="9525" marB="0" anchor="b"/>
+                </a:tc>
+              </a:tr>
+              <a:tr h="182442">
+                <a:tc>
+                  <a:txBody>
+                    <a:bodyPr/>
+                    <a:lstStyle/>
+                    <a:p>
+                      <a:pPr algn="ctr" fontAlgn="b"/>
+                      <a:r>
+                        <a:rPr lang="en-US" sz="1100" u="none" strike="noStrike">
+                          <a:effectLst/>
+                        </a:rPr>
+                        <a:t>20</a:t>
+                      </a:r>
+                      <a:endParaRPr lang="en-US" sz="1100" b="0" i="0" u="none" strike="noStrike">
+                        <a:solidFill>
+                          <a:srgbClr val="000000"/>
+                        </a:solidFill>
+                        <a:effectLst/>
+                        <a:latin typeface="Calibri"/>
+                      </a:endParaRPr>
+                    </a:p>
+                  </a:txBody>
+                  <a:tcPr marL="9525" marR="9525" marT="9525" marB="0" anchor="b"/>
+                </a:tc>
+                <a:tc>
+                  <a:txBody>
+                    <a:bodyPr/>
+                    <a:lstStyle/>
+                    <a:p>
+                      <a:pPr algn="ctr" fontAlgn="b"/>
+                      <a:r>
+                        <a:rPr lang="en-US" sz="1100" u="none" strike="noStrike" dirty="0">
+                          <a:effectLst/>
+                        </a:rPr>
+                        <a:t>155</a:t>
+                      </a:r>
+                      <a:endParaRPr lang="en-US" sz="1100" b="0" i="0" u="none" strike="noStrike" dirty="0">
+                        <a:solidFill>
+                          <a:srgbClr val="000000"/>
+                        </a:solidFill>
+                        <a:effectLst/>
+                        <a:latin typeface="Calibri"/>
+                      </a:endParaRPr>
+                    </a:p>
+                  </a:txBody>
+                  <a:tcPr marL="9525" marR="9525" marT="9525" marB="0" anchor="b"/>
+                </a:tc>
+                <a:tc>
+                  <a:txBody>
+                    <a:bodyPr/>
+                    <a:lstStyle/>
+                    <a:p>
+                      <a:pPr algn="ctr" fontAlgn="b"/>
+                      <a:r>
+                        <a:rPr lang="en-US" sz="1100" u="none" strike="noStrike" dirty="0">
+                          <a:effectLst/>
+                        </a:rPr>
+                        <a:t>65</a:t>
+                      </a:r>
+                      <a:endParaRPr lang="en-US" sz="1100" b="0" i="0" u="none" strike="noStrike" dirty="0">
+                        <a:solidFill>
+                          <a:srgbClr val="000000"/>
+                        </a:solidFill>
+                        <a:effectLst/>
+                        <a:latin typeface="Calibri"/>
+                      </a:endParaRPr>
+                    </a:p>
+                  </a:txBody>
+                  <a:tcPr marL="9525" marR="9525" marT="9525" marB="0" anchor="b"/>
+                </a:tc>
+              </a:tr>
+              <a:tr h="182442">
+                <a:tc>
+                  <a:txBody>
+                    <a:bodyPr/>
+                    <a:lstStyle/>
+                    <a:p>
+                      <a:pPr algn="ctr" fontAlgn="b"/>
+                      <a:r>
+                        <a:rPr lang="en-US" sz="1100" b="0" i="0" u="none" strike="noStrike" dirty="0" smtClean="0">
+                          <a:solidFill>
+                            <a:srgbClr val="000000"/>
+                          </a:solidFill>
+                          <a:effectLst/>
+                          <a:latin typeface="Calibri"/>
+                        </a:rPr>
+                        <a:t>⁞</a:t>
+                      </a:r>
+                      <a:endParaRPr lang="en-US" sz="1100" b="0" i="0" u="none" strike="noStrike" dirty="0">
+                        <a:solidFill>
+                          <a:srgbClr val="000000"/>
+                        </a:solidFill>
+                        <a:effectLst/>
+                        <a:latin typeface="Calibri"/>
+                      </a:endParaRPr>
+                    </a:p>
+                  </a:txBody>
+                  <a:tcPr marL="9525" marR="9525" marT="9525" marB="0" anchor="b"/>
+                </a:tc>
+                <a:tc>
+                  <a:txBody>
+                    <a:bodyPr/>
+                    <a:lstStyle/>
+                    <a:p>
+                      <a:pPr algn="ctr" fontAlgn="b"/>
+                      <a:r>
+                        <a:rPr lang="en-US" sz="1100" b="0" i="0" u="none" strike="noStrike" dirty="0" smtClean="0">
+                          <a:solidFill>
+                            <a:srgbClr val="000000"/>
+                          </a:solidFill>
+                          <a:effectLst/>
+                          <a:latin typeface="+mn-lt"/>
+                        </a:rPr>
+                        <a:t>⁞</a:t>
+                      </a:r>
+                    </a:p>
+                  </a:txBody>
+                  <a:tcPr marL="9525" marR="9525" marT="9525" marB="0" anchor="b"/>
+                </a:tc>
+                <a:tc>
+                  <a:txBody>
+                    <a:bodyPr/>
+                    <a:lstStyle/>
+                    <a:p>
+                      <a:pPr algn="ctr" fontAlgn="b"/>
+                      <a:r>
+                        <a:rPr lang="en-US" sz="1100" b="0" i="0" u="none" strike="noStrike" dirty="0" smtClean="0">
+                          <a:solidFill>
+                            <a:srgbClr val="000000"/>
+                          </a:solidFill>
+                          <a:effectLst/>
+                          <a:latin typeface="+mn-lt"/>
+                        </a:rPr>
+                        <a:t>⁞</a:t>
+                      </a:r>
+                      <a:endParaRPr lang="en-US" sz="1100" b="0" i="0" u="none" strike="noStrike" dirty="0">
+                        <a:solidFill>
+                          <a:srgbClr val="000000"/>
+                        </a:solidFill>
+                        <a:effectLst/>
+                        <a:latin typeface="Calibri"/>
+                      </a:endParaRPr>
+                    </a:p>
+                  </a:txBody>
+                  <a:tcPr marL="9525" marR="9525" marT="9525" marB="0" anchor="b"/>
+                </a:tc>
+              </a:tr>
+            </a:tbl>
+          </a:graphicData>
+        </a:graphic>
+      </p:graphicFrame>
+      <p:cxnSp>
+        <p:nvCxnSpPr>
+          <p:cNvPr id="11" name="Straight Connector 10"/>
+          <p:cNvCxnSpPr/>
+          <p:nvPr/>
+        </p:nvCxnSpPr>
+        <p:spPr>
+          <a:xfrm flipV="1">
+            <a:off x="1689987" y="2612784"/>
+            <a:ext cx="914400" cy="663816"/>
+          </a:xfrm>
+          <a:prstGeom prst="line">
+            <a:avLst/>
+          </a:prstGeom>
+        </p:spPr>
+        <p:style>
+          <a:lnRef idx="1">
+            <a:schemeClr val="accent1"/>
+          </a:lnRef>
+          <a:fillRef idx="0">
+            <a:schemeClr val="accent1"/>
+          </a:fillRef>
+          <a:effectRef idx="0">
+            <a:schemeClr val="accent1"/>
+          </a:effectRef>
+          <a:fontRef idx="minor">
+            <a:schemeClr val="tx1"/>
+          </a:fontRef>
+        </p:style>
+      </p:cxnSp>
+      <p:cxnSp>
+        <p:nvCxnSpPr>
+          <p:cNvPr id="15" name="Straight Connector 14"/>
+          <p:cNvCxnSpPr/>
+          <p:nvPr/>
+        </p:nvCxnSpPr>
+        <p:spPr>
+          <a:xfrm>
+            <a:off x="1689987" y="3768436"/>
+            <a:ext cx="914400" cy="860184"/>
+          </a:xfrm>
+          <a:prstGeom prst="line">
+            <a:avLst/>
+          </a:prstGeom>
+        </p:spPr>
+        <p:style>
+          <a:lnRef idx="1">
+            <a:schemeClr val="accent1"/>
+          </a:lnRef>
+          <a:fillRef idx="0">
+            <a:schemeClr val="accent1"/>
+          </a:fillRef>
+          <a:effectRef idx="0">
+            <a:schemeClr val="accent1"/>
+          </a:effectRef>
+          <a:fontRef idx="minor">
+            <a:schemeClr val="tx1"/>
+          </a:fontRef>
+        </p:style>
+      </p:cxnSp>
+      <p:sp>
+        <p:nvSpPr>
+          <p:cNvPr id="16" name="TextBox 15"/>
+          <p:cNvSpPr txBox="1"/>
+          <p:nvPr/>
+        </p:nvSpPr>
+        <p:spPr>
+          <a:xfrm>
+            <a:off x="304800" y="2907268"/>
+            <a:ext cx="1385187" cy="369332"/>
+          </a:xfrm>
+          <a:prstGeom prst="rect">
+            <a:avLst/>
+          </a:prstGeom>
+          <a:noFill/>
+        </p:spPr>
+        <p:txBody>
+          <a:bodyPr wrap="none" rtlCol="0">
+            <a:spAutoFit/>
+          </a:bodyPr>
+          <a:lstStyle/>
+          <a:p>
+            <a:r>
+              <a:rPr lang="en-US" dirty="0" smtClean="0"/>
+              <a:t>Original data</a:t>
+            </a:r>
+            <a:endParaRPr lang="en-US" dirty="0"/>
+          </a:p>
+        </p:txBody>
+      </p:sp>
+      <p:sp>
+        <p:nvSpPr>
+          <p:cNvPr id="17" name="TextBox 16"/>
+          <p:cNvSpPr txBox="1"/>
+          <p:nvPr/>
+        </p:nvSpPr>
+        <p:spPr>
+          <a:xfrm>
+            <a:off x="2604387" y="1447800"/>
+            <a:ext cx="1295400" cy="646331"/>
+          </a:xfrm>
+          <a:prstGeom prst="rect">
+            <a:avLst/>
+          </a:prstGeom>
+          <a:noFill/>
+        </p:spPr>
+        <p:txBody>
+          <a:bodyPr wrap="square" rtlCol="0">
+            <a:spAutoFit/>
+          </a:bodyPr>
+          <a:lstStyle/>
+          <a:p>
+            <a:pPr algn="ctr"/>
+            <a:r>
+              <a:rPr lang="en-US" dirty="0" smtClean="0"/>
+              <a:t>M=3 MI datasets</a:t>
+            </a:r>
+            <a:endParaRPr lang="en-US" dirty="0"/>
+          </a:p>
+        </p:txBody>
+      </p:sp>
+      <p:graphicFrame>
+        <p:nvGraphicFramePr>
+          <p:cNvPr id="25" name="Table 24"/>
+          <p:cNvGraphicFramePr>
+            <a:graphicFrameLocks noGrp="1"/>
+          </p:cNvGraphicFramePr>
+          <p:nvPr>
+            <p:extLst>
+              <p:ext uri="{D42A27DB-BD31-4B8C-83A1-F6EECF244321}">
+                <p14:modId xmlns:p14="http://schemas.microsoft.com/office/powerpoint/2010/main" val="1584328304"/>
+              </p:ext>
+            </p:extLst>
+          </p:nvPr>
+        </p:nvGraphicFramePr>
+        <p:xfrm>
+          <a:off x="5105399" y="1676395"/>
+          <a:ext cx="1752600" cy="3886207"/>
+        </p:xfrm>
+        <a:graphic>
+          <a:graphicData uri="http://schemas.openxmlformats.org/drawingml/2006/table">
+            <a:tbl>
+              <a:tblPr firstRow="1" bandRow="1">
+                <a:tableStyleId>{5C22544A-7EE6-4342-B048-85BDC9FD1C3A}</a:tableStyleId>
+              </a:tblPr>
+              <a:tblGrid>
+                <a:gridCol w="589332"/>
+                <a:gridCol w="579068"/>
+                <a:gridCol w="584200"/>
+              </a:tblGrid>
+              <a:tr h="199147">
+                <a:tc>
+                  <a:txBody>
+                    <a:bodyPr/>
+                    <a:lstStyle/>
+                    <a:p>
+                      <a:pPr algn="ctr" fontAlgn="b"/>
+                      <a:r>
+                        <a:rPr lang="en-US" sz="1100" u="none" strike="noStrike" dirty="0">
+                          <a:effectLst/>
+                        </a:rPr>
+                        <a:t>Age</a:t>
+                      </a:r>
+                      <a:endParaRPr lang="en-US" sz="1100" b="1" i="0" u="none" strike="noStrike" dirty="0">
+                        <a:solidFill>
+                          <a:srgbClr val="FFFFFF"/>
+                        </a:solidFill>
+                        <a:effectLst/>
+                        <a:latin typeface="Calibri"/>
+                      </a:endParaRPr>
+                    </a:p>
+                  </a:txBody>
+                  <a:tcPr marL="9525" marR="9525" marT="9525" marB="0" anchor="b"/>
+                </a:tc>
+                <a:tc>
+                  <a:txBody>
+                    <a:bodyPr/>
+                    <a:lstStyle/>
+                    <a:p>
+                      <a:pPr algn="ctr" fontAlgn="b"/>
+                      <a:r>
+                        <a:rPr lang="en-US" sz="1100" u="none" strike="noStrike" dirty="0">
+                          <a:effectLst/>
+                        </a:rPr>
+                        <a:t>Weight</a:t>
+                      </a:r>
+                      <a:endParaRPr lang="en-US" sz="1100" b="1" i="0" u="none" strike="noStrike" dirty="0">
+                        <a:solidFill>
+                          <a:srgbClr val="FFFFFF"/>
+                        </a:solidFill>
+                        <a:effectLst/>
+                        <a:latin typeface="Calibri"/>
+                      </a:endParaRPr>
+                    </a:p>
+                  </a:txBody>
+                  <a:tcPr marL="9525" marR="9525" marT="9525" marB="0" anchor="b"/>
+                </a:tc>
+                <a:tc>
+                  <a:txBody>
+                    <a:bodyPr/>
+                    <a:lstStyle/>
+                    <a:p>
+                      <a:pPr algn="ctr" fontAlgn="b"/>
+                      <a:r>
+                        <a:rPr lang="en-US" sz="1100" u="none" strike="noStrike" dirty="0">
+                          <a:effectLst/>
+                        </a:rPr>
+                        <a:t>Height</a:t>
+                      </a:r>
+                      <a:endParaRPr lang="en-US" sz="1100" b="1" i="0" u="none" strike="noStrike" dirty="0">
+                        <a:solidFill>
+                          <a:srgbClr val="FFFFFF"/>
+                        </a:solidFill>
+                        <a:effectLst/>
+                        <a:latin typeface="Calibri"/>
+                      </a:endParaRPr>
+                    </a:p>
+                  </a:txBody>
+                  <a:tcPr marL="9525" marR="9525" marT="9525" marB="0" anchor="b"/>
+                </a:tc>
+              </a:tr>
+              <a:tr h="307255">
+                <a:tc>
+                  <a:txBody>
+                    <a:bodyPr/>
+                    <a:lstStyle/>
+                    <a:p>
+                      <a:pPr algn="ctr" fontAlgn="b"/>
+                      <a:r>
+                        <a:rPr lang="en-US" sz="1100" u="none" strike="noStrike">
+                          <a:effectLst/>
+                        </a:rPr>
+                        <a:t>24</a:t>
+                      </a:r>
+                      <a:endParaRPr lang="en-US" sz="1100" b="0" i="0" u="none" strike="noStrike">
+                        <a:solidFill>
+                          <a:srgbClr val="000000"/>
+                        </a:solidFill>
+                        <a:effectLst/>
+                        <a:latin typeface="Calibri"/>
+                      </a:endParaRPr>
+                    </a:p>
+                  </a:txBody>
+                  <a:tcPr marL="9525" marR="9525" marT="9525" marB="0" anchor="b"/>
+                </a:tc>
+                <a:tc>
+                  <a:txBody>
+                    <a:bodyPr/>
+                    <a:lstStyle/>
+                    <a:p>
+                      <a:pPr algn="ctr" fontAlgn="b"/>
+                      <a:r>
+                        <a:rPr lang="en-US" sz="1100" u="none" strike="noStrike" dirty="0" smtClean="0">
+                          <a:solidFill>
+                            <a:srgbClr val="00B050"/>
+                          </a:solidFill>
+                          <a:effectLst/>
+                        </a:rPr>
+                        <a:t>170</a:t>
+                      </a:r>
+                      <a:endParaRPr lang="en-US" sz="1100" b="0" i="0" u="none" strike="noStrike" dirty="0">
+                        <a:solidFill>
+                          <a:srgbClr val="00B050"/>
+                        </a:solidFill>
+                        <a:effectLst/>
+                        <a:latin typeface="Calibri"/>
+                      </a:endParaRPr>
+                    </a:p>
+                  </a:txBody>
+                  <a:tcPr marL="9525" marR="9525" marT="9525" marB="0" anchor="b"/>
+                </a:tc>
+                <a:tc>
+                  <a:txBody>
+                    <a:bodyPr/>
+                    <a:lstStyle/>
+                    <a:p>
+                      <a:pPr algn="ctr" fontAlgn="b"/>
+                      <a:r>
+                        <a:rPr lang="en-US" sz="1100" u="none" strike="noStrike">
+                          <a:effectLst/>
+                        </a:rPr>
+                        <a:t>70</a:t>
+                      </a:r>
+                      <a:endParaRPr lang="en-US" sz="1100" b="0" i="0" u="none" strike="noStrike">
+                        <a:solidFill>
+                          <a:srgbClr val="000000"/>
+                        </a:solidFill>
+                        <a:effectLst/>
+                        <a:latin typeface="Calibri"/>
+                      </a:endParaRPr>
+                    </a:p>
+                  </a:txBody>
+                  <a:tcPr marL="9525" marR="9525" marT="9525" marB="0" anchor="b"/>
+                </a:tc>
+              </a:tr>
+              <a:tr h="307255">
+                <a:tc>
+                  <a:txBody>
+                    <a:bodyPr/>
+                    <a:lstStyle/>
+                    <a:p>
+                      <a:pPr algn="ctr" fontAlgn="b"/>
+                      <a:r>
+                        <a:rPr lang="en-US" sz="1100" u="none" strike="noStrike">
+                          <a:effectLst/>
+                        </a:rPr>
+                        <a:t>28</a:t>
+                      </a:r>
+                      <a:endParaRPr lang="en-US" sz="1100" b="0" i="0" u="none" strike="noStrike">
+                        <a:solidFill>
+                          <a:srgbClr val="000000"/>
+                        </a:solidFill>
+                        <a:effectLst/>
+                        <a:latin typeface="Calibri"/>
+                      </a:endParaRPr>
+                    </a:p>
+                  </a:txBody>
+                  <a:tcPr marL="9525" marR="9525" marT="9525" marB="0" anchor="b"/>
+                </a:tc>
+                <a:tc>
+                  <a:txBody>
+                    <a:bodyPr/>
+                    <a:lstStyle/>
+                    <a:p>
+                      <a:pPr algn="ctr" fontAlgn="b"/>
+                      <a:r>
+                        <a:rPr lang="en-US" sz="1100" u="none" strike="noStrike">
+                          <a:effectLst/>
+                        </a:rPr>
+                        <a:t>160</a:t>
+                      </a:r>
+                      <a:endParaRPr lang="en-US" sz="1100" b="0" i="0" u="none" strike="noStrike">
+                        <a:solidFill>
+                          <a:srgbClr val="000000"/>
+                        </a:solidFill>
+                        <a:effectLst/>
+                        <a:latin typeface="Calibri"/>
+                      </a:endParaRPr>
+                    </a:p>
+                  </a:txBody>
+                  <a:tcPr marL="9525" marR="9525" marT="9525" marB="0" anchor="b"/>
+                </a:tc>
+                <a:tc>
+                  <a:txBody>
+                    <a:bodyPr/>
+                    <a:lstStyle/>
+                    <a:p>
+                      <a:pPr algn="ctr" fontAlgn="b"/>
+                      <a:r>
+                        <a:rPr lang="en-US" sz="1100" b="0" i="0" u="none" strike="noStrike" dirty="0" smtClean="0">
+                          <a:solidFill>
+                            <a:srgbClr val="00B050"/>
+                          </a:solidFill>
+                          <a:effectLst/>
+                          <a:latin typeface="+mn-lt"/>
+                        </a:rPr>
+                        <a:t>68</a:t>
+                      </a:r>
+                      <a:endParaRPr lang="en-US" sz="1100" b="0" i="0" u="none" strike="noStrike" dirty="0">
+                        <a:solidFill>
+                          <a:srgbClr val="00B050"/>
+                        </a:solidFill>
+                        <a:effectLst/>
+                        <a:latin typeface="Calibri"/>
+                      </a:endParaRPr>
+                    </a:p>
+                  </a:txBody>
+                  <a:tcPr marL="9525" marR="9525" marT="9525" marB="0" anchor="b"/>
+                </a:tc>
+              </a:tr>
+              <a:tr h="307255">
+                <a:tc>
+                  <a:txBody>
+                    <a:bodyPr/>
+                    <a:lstStyle/>
+                    <a:p>
+                      <a:pPr algn="ctr" fontAlgn="b"/>
+                      <a:r>
+                        <a:rPr lang="en-US" sz="1100" u="none" strike="noStrike" dirty="0">
+                          <a:effectLst/>
+                        </a:rPr>
+                        <a:t>20</a:t>
+                      </a:r>
+                      <a:endParaRPr lang="en-US" sz="1100" b="0" i="0" u="none" strike="noStrike" dirty="0">
+                        <a:solidFill>
+                          <a:srgbClr val="000000"/>
+                        </a:solidFill>
+                        <a:effectLst/>
+                        <a:latin typeface="Calibri"/>
+                      </a:endParaRPr>
+                    </a:p>
+                  </a:txBody>
+                  <a:tcPr marL="9525" marR="9525" marT="9525" marB="0" anchor="b"/>
+                </a:tc>
+                <a:tc>
+                  <a:txBody>
+                    <a:bodyPr/>
+                    <a:lstStyle/>
+                    <a:p>
+                      <a:pPr algn="ctr" fontAlgn="b"/>
+                      <a:r>
+                        <a:rPr lang="en-US" sz="1100" u="none" strike="noStrike">
+                          <a:effectLst/>
+                        </a:rPr>
+                        <a:t>155</a:t>
+                      </a:r>
+                      <a:endParaRPr lang="en-US" sz="1100" b="0" i="0" u="none" strike="noStrike">
+                        <a:solidFill>
+                          <a:srgbClr val="000000"/>
+                        </a:solidFill>
+                        <a:effectLst/>
+                        <a:latin typeface="Calibri"/>
+                      </a:endParaRPr>
+                    </a:p>
+                  </a:txBody>
+                  <a:tcPr marL="9525" marR="9525" marT="9525" marB="0" anchor="b"/>
+                </a:tc>
+                <a:tc>
+                  <a:txBody>
+                    <a:bodyPr/>
+                    <a:lstStyle/>
+                    <a:p>
+                      <a:pPr algn="ctr" fontAlgn="b"/>
+                      <a:r>
+                        <a:rPr lang="en-US" sz="1100" u="none" strike="noStrike" dirty="0">
+                          <a:effectLst/>
+                        </a:rPr>
+                        <a:t>65</a:t>
+                      </a:r>
+                      <a:endParaRPr lang="en-US" sz="1100" b="0" i="0" u="none" strike="noStrike" dirty="0">
+                        <a:solidFill>
+                          <a:srgbClr val="000000"/>
+                        </a:solidFill>
+                        <a:effectLst/>
+                        <a:latin typeface="Calibri"/>
+                      </a:endParaRPr>
+                    </a:p>
+                  </a:txBody>
+                  <a:tcPr marL="9525" marR="9525" marT="9525" marB="0" anchor="b"/>
+                </a:tc>
+              </a:tr>
+              <a:tr h="307255">
+                <a:tc>
+                  <a:txBody>
+                    <a:bodyPr/>
+                    <a:lstStyle/>
+                    <a:p>
+                      <a:pPr algn="ctr" fontAlgn="b"/>
+                      <a:r>
+                        <a:rPr lang="en-US" sz="1100" b="0" i="0" u="none" strike="noStrike" dirty="0" smtClean="0">
+                          <a:solidFill>
+                            <a:srgbClr val="000000"/>
+                          </a:solidFill>
+                          <a:effectLst/>
+                          <a:latin typeface="Calibri"/>
+                        </a:rPr>
+                        <a:t>⁞</a:t>
+                      </a:r>
+                      <a:endParaRPr lang="en-US" sz="1100" b="0" i="0" u="none" strike="noStrike" dirty="0">
+                        <a:solidFill>
+                          <a:srgbClr val="000000"/>
+                        </a:solidFill>
+                        <a:effectLst/>
+                        <a:latin typeface="Calibri"/>
+                      </a:endParaRPr>
+                    </a:p>
+                  </a:txBody>
+                  <a:tcPr marL="9525" marR="9525" marT="9525" marB="0" anchor="b"/>
+                </a:tc>
+                <a:tc>
+                  <a:txBody>
+                    <a:bodyPr/>
+                    <a:lstStyle/>
+                    <a:p>
+                      <a:pPr algn="ctr" fontAlgn="b"/>
+                      <a:r>
+                        <a:rPr lang="en-US" sz="1100" b="0" i="0" u="none" strike="noStrike" dirty="0" smtClean="0">
+                          <a:solidFill>
+                            <a:srgbClr val="000000"/>
+                          </a:solidFill>
+                          <a:effectLst/>
+                          <a:latin typeface="+mn-lt"/>
+                        </a:rPr>
+                        <a:t>⁞</a:t>
+                      </a:r>
+                    </a:p>
+                  </a:txBody>
+                  <a:tcPr marL="9525" marR="9525" marT="9525" marB="0" anchor="b"/>
+                </a:tc>
+                <a:tc>
+                  <a:txBody>
+                    <a:bodyPr/>
+                    <a:lstStyle/>
+                    <a:p>
+                      <a:pPr algn="ctr" fontAlgn="b"/>
+                      <a:r>
+                        <a:rPr lang="en-US" sz="1100" b="0" i="0" u="none" strike="noStrike" dirty="0" smtClean="0">
+                          <a:solidFill>
+                            <a:srgbClr val="000000"/>
+                          </a:solidFill>
+                          <a:effectLst/>
+                          <a:latin typeface="+mn-lt"/>
+                        </a:rPr>
+                        <a:t>⁞</a:t>
+                      </a:r>
+                      <a:endParaRPr lang="en-US" sz="1100" b="0" i="0" u="none" strike="noStrike" dirty="0">
+                        <a:solidFill>
+                          <a:srgbClr val="000000"/>
+                        </a:solidFill>
+                        <a:effectLst/>
+                        <a:latin typeface="Calibri"/>
+                      </a:endParaRPr>
+                    </a:p>
+                  </a:txBody>
+                  <a:tcPr marL="9525" marR="9525" marT="9525" marB="0" anchor="b"/>
+                </a:tc>
+              </a:tr>
+              <a:tr h="307255">
+                <a:tc>
+                  <a:txBody>
+                    <a:bodyPr/>
+                    <a:lstStyle/>
+                    <a:p>
+                      <a:pPr algn="ctr" fontAlgn="b"/>
+                      <a:r>
+                        <a:rPr lang="en-US" sz="1100" u="none" strike="noStrike" dirty="0">
+                          <a:effectLst/>
+                        </a:rPr>
+                        <a:t>24</a:t>
+                      </a:r>
+                      <a:endParaRPr lang="en-US" sz="1100" b="0" i="0" u="none" strike="noStrike" dirty="0">
+                        <a:solidFill>
+                          <a:srgbClr val="000000"/>
+                        </a:solidFill>
+                        <a:effectLst/>
+                        <a:latin typeface="Calibri"/>
+                      </a:endParaRPr>
+                    </a:p>
+                  </a:txBody>
+                  <a:tcPr marL="9525" marR="9525" marT="9525" marB="0" anchor="b"/>
+                </a:tc>
+                <a:tc>
+                  <a:txBody>
+                    <a:bodyPr/>
+                    <a:lstStyle/>
+                    <a:p>
+                      <a:pPr algn="ctr" fontAlgn="b"/>
+                      <a:r>
+                        <a:rPr lang="en-US" sz="1100" u="none" strike="noStrike" dirty="0" smtClean="0">
+                          <a:solidFill>
+                            <a:srgbClr val="00B050"/>
+                          </a:solidFill>
+                          <a:effectLst/>
+                        </a:rPr>
+                        <a:t>150</a:t>
+                      </a:r>
+                      <a:endParaRPr lang="en-US" sz="1100" b="0" i="0" u="none" strike="noStrike" dirty="0">
+                        <a:solidFill>
+                          <a:srgbClr val="00B050"/>
+                        </a:solidFill>
+                        <a:effectLst/>
+                        <a:latin typeface="Calibri"/>
+                      </a:endParaRPr>
+                    </a:p>
+                  </a:txBody>
+                  <a:tcPr marL="9525" marR="9525" marT="9525" marB="0" anchor="b"/>
+                </a:tc>
+                <a:tc>
+                  <a:txBody>
+                    <a:bodyPr/>
+                    <a:lstStyle/>
+                    <a:p>
+                      <a:pPr algn="ctr" fontAlgn="b"/>
+                      <a:r>
+                        <a:rPr lang="en-US" sz="1100" u="none" strike="noStrike" dirty="0">
+                          <a:effectLst/>
+                        </a:rPr>
+                        <a:t>70</a:t>
+                      </a:r>
+                      <a:endParaRPr lang="en-US" sz="1100" b="0" i="0" u="none" strike="noStrike" dirty="0">
+                        <a:solidFill>
+                          <a:srgbClr val="000000"/>
+                        </a:solidFill>
+                        <a:effectLst/>
+                        <a:latin typeface="Calibri"/>
+                      </a:endParaRPr>
+                    </a:p>
+                  </a:txBody>
+                  <a:tcPr marL="9525" marR="9525" marT="9525" marB="0" anchor="b"/>
+                </a:tc>
+              </a:tr>
+              <a:tr h="307255">
+                <a:tc>
+                  <a:txBody>
+                    <a:bodyPr/>
+                    <a:lstStyle/>
+                    <a:p>
+                      <a:pPr algn="ctr" fontAlgn="b"/>
+                      <a:r>
+                        <a:rPr lang="en-US" sz="1100" u="none" strike="noStrike" dirty="0">
+                          <a:effectLst/>
+                        </a:rPr>
+                        <a:t>28</a:t>
+                      </a:r>
+                      <a:endParaRPr lang="en-US" sz="1100" b="0" i="0" u="none" strike="noStrike" dirty="0">
+                        <a:solidFill>
+                          <a:srgbClr val="000000"/>
+                        </a:solidFill>
+                        <a:effectLst/>
+                        <a:latin typeface="Calibri"/>
+                      </a:endParaRPr>
+                    </a:p>
+                  </a:txBody>
+                  <a:tcPr marL="9525" marR="9525" marT="9525" marB="0" anchor="b"/>
+                </a:tc>
+                <a:tc>
+                  <a:txBody>
+                    <a:bodyPr/>
+                    <a:lstStyle/>
+                    <a:p>
+                      <a:pPr algn="ctr" fontAlgn="b"/>
+                      <a:r>
+                        <a:rPr lang="en-US" sz="1100" u="none" strike="noStrike" dirty="0">
+                          <a:effectLst/>
+                        </a:rPr>
+                        <a:t>160</a:t>
+                      </a:r>
+                      <a:endParaRPr lang="en-US" sz="1100" b="0" i="0" u="none" strike="noStrike" dirty="0">
+                        <a:solidFill>
+                          <a:srgbClr val="000000"/>
+                        </a:solidFill>
+                        <a:effectLst/>
+                        <a:latin typeface="Calibri"/>
+                      </a:endParaRPr>
+                    </a:p>
+                  </a:txBody>
+                  <a:tcPr marL="9525" marR="9525" marT="9525" marB="0" anchor="b"/>
+                </a:tc>
+                <a:tc>
+                  <a:txBody>
+                    <a:bodyPr/>
+                    <a:lstStyle/>
+                    <a:p>
+                      <a:pPr algn="ctr" fontAlgn="b"/>
+                      <a:r>
+                        <a:rPr lang="en-US" sz="1100" u="none" strike="noStrike" dirty="0" smtClean="0">
+                          <a:solidFill>
+                            <a:srgbClr val="00B050"/>
+                          </a:solidFill>
+                          <a:effectLst/>
+                        </a:rPr>
+                        <a:t>64</a:t>
+                      </a:r>
+                      <a:endParaRPr lang="en-US" sz="1100" b="0" i="0" u="none" strike="noStrike" dirty="0">
+                        <a:solidFill>
+                          <a:srgbClr val="00B050"/>
+                        </a:solidFill>
+                        <a:effectLst/>
+                        <a:latin typeface="Calibri"/>
+                      </a:endParaRPr>
+                    </a:p>
+                  </a:txBody>
+                  <a:tcPr marL="9525" marR="9525" marT="9525" marB="0" anchor="b"/>
+                </a:tc>
+              </a:tr>
+              <a:tr h="307255">
+                <a:tc>
+                  <a:txBody>
+                    <a:bodyPr/>
+                    <a:lstStyle/>
+                    <a:p>
+                      <a:pPr algn="ctr" fontAlgn="b"/>
+                      <a:r>
+                        <a:rPr lang="en-US" sz="1100" u="none" strike="noStrike">
+                          <a:effectLst/>
+                        </a:rPr>
+                        <a:t>20</a:t>
+                      </a:r>
+                      <a:endParaRPr lang="en-US" sz="1100" b="0" i="0" u="none" strike="noStrike">
+                        <a:solidFill>
+                          <a:srgbClr val="000000"/>
+                        </a:solidFill>
+                        <a:effectLst/>
+                        <a:latin typeface="Calibri"/>
+                      </a:endParaRPr>
+                    </a:p>
+                  </a:txBody>
+                  <a:tcPr marL="9525" marR="9525" marT="9525" marB="0" anchor="b"/>
+                </a:tc>
+                <a:tc>
+                  <a:txBody>
+                    <a:bodyPr/>
+                    <a:lstStyle/>
+                    <a:p>
+                      <a:pPr algn="ctr" fontAlgn="b"/>
+                      <a:r>
+                        <a:rPr lang="en-US" sz="1100" u="none" strike="noStrike" dirty="0">
+                          <a:effectLst/>
+                        </a:rPr>
+                        <a:t>155</a:t>
+                      </a:r>
+                      <a:endParaRPr lang="en-US" sz="1100" b="0" i="0" u="none" strike="noStrike" dirty="0">
+                        <a:solidFill>
+                          <a:srgbClr val="000000"/>
+                        </a:solidFill>
+                        <a:effectLst/>
+                        <a:latin typeface="Calibri"/>
+                      </a:endParaRPr>
+                    </a:p>
+                  </a:txBody>
+                  <a:tcPr marL="9525" marR="9525" marT="9525" marB="0" anchor="b"/>
+                </a:tc>
+                <a:tc>
+                  <a:txBody>
+                    <a:bodyPr/>
+                    <a:lstStyle/>
+                    <a:p>
+                      <a:pPr algn="ctr" fontAlgn="b"/>
+                      <a:r>
+                        <a:rPr lang="en-US" sz="1100" u="none" strike="noStrike" dirty="0">
+                          <a:effectLst/>
+                        </a:rPr>
+                        <a:t>65</a:t>
+                      </a:r>
+                      <a:endParaRPr lang="en-US" sz="1100" b="0" i="0" u="none" strike="noStrike" dirty="0">
+                        <a:solidFill>
+                          <a:srgbClr val="000000"/>
+                        </a:solidFill>
+                        <a:effectLst/>
+                        <a:latin typeface="Calibri"/>
+                      </a:endParaRPr>
+                    </a:p>
+                  </a:txBody>
+                  <a:tcPr marL="9525" marR="9525" marT="9525" marB="0" anchor="b"/>
+                </a:tc>
+              </a:tr>
+              <a:tr h="307255">
+                <a:tc>
+                  <a:txBody>
+                    <a:bodyPr/>
+                    <a:lstStyle/>
+                    <a:p>
+                      <a:pPr algn="ctr" fontAlgn="b"/>
+                      <a:r>
+                        <a:rPr lang="en-US" sz="1100" b="0" i="0" u="none" strike="noStrike" dirty="0" smtClean="0">
+                          <a:solidFill>
+                            <a:srgbClr val="000000"/>
+                          </a:solidFill>
+                          <a:effectLst/>
+                          <a:latin typeface="Calibri"/>
+                        </a:rPr>
+                        <a:t>⁞</a:t>
+                      </a:r>
+                      <a:endParaRPr lang="en-US" sz="1100" b="0" i="0" u="none" strike="noStrike" dirty="0">
+                        <a:solidFill>
+                          <a:srgbClr val="000000"/>
+                        </a:solidFill>
+                        <a:effectLst/>
+                        <a:latin typeface="Calibri"/>
+                      </a:endParaRPr>
+                    </a:p>
+                  </a:txBody>
+                  <a:tcPr marL="9525" marR="9525" marT="9525" marB="0" anchor="b"/>
+                </a:tc>
+                <a:tc>
+                  <a:txBody>
+                    <a:bodyPr/>
+                    <a:lstStyle/>
+                    <a:p>
+                      <a:pPr algn="ctr" fontAlgn="b"/>
+                      <a:r>
+                        <a:rPr lang="en-US" sz="1100" b="0" i="0" u="none" strike="noStrike" dirty="0" smtClean="0">
+                          <a:solidFill>
+                            <a:srgbClr val="000000"/>
+                          </a:solidFill>
+                          <a:effectLst/>
+                          <a:latin typeface="+mn-lt"/>
+                        </a:rPr>
+                        <a:t>⁞</a:t>
+                      </a:r>
+                    </a:p>
+                  </a:txBody>
+                  <a:tcPr marL="9525" marR="9525" marT="9525" marB="0" anchor="b"/>
+                </a:tc>
+                <a:tc>
+                  <a:txBody>
+                    <a:bodyPr/>
+                    <a:lstStyle/>
+                    <a:p>
+                      <a:pPr algn="ctr" fontAlgn="b"/>
+                      <a:r>
+                        <a:rPr lang="en-US" sz="1100" b="0" i="0" u="none" strike="noStrike" dirty="0" smtClean="0">
+                          <a:solidFill>
+                            <a:srgbClr val="000000"/>
+                          </a:solidFill>
+                          <a:effectLst/>
+                          <a:latin typeface="+mn-lt"/>
+                        </a:rPr>
+                        <a:t>⁞</a:t>
+                      </a:r>
+                      <a:endParaRPr lang="en-US" sz="1100" b="0" i="0" u="none" strike="noStrike" dirty="0">
+                        <a:solidFill>
+                          <a:srgbClr val="000000"/>
+                        </a:solidFill>
+                        <a:effectLst/>
+                        <a:latin typeface="Calibri"/>
+                      </a:endParaRPr>
+                    </a:p>
+                  </a:txBody>
+                  <a:tcPr marL="9525" marR="9525" marT="9525" marB="0" anchor="b"/>
+                </a:tc>
+              </a:tr>
+              <a:tr h="307255">
+                <a:tc>
+                  <a:txBody>
+                    <a:bodyPr/>
+                    <a:lstStyle/>
+                    <a:p>
+                      <a:pPr algn="ctr" fontAlgn="b"/>
+                      <a:r>
+                        <a:rPr lang="en-US" sz="1100" u="none" strike="noStrike" dirty="0">
+                          <a:effectLst/>
+                        </a:rPr>
+                        <a:t>24</a:t>
+                      </a:r>
+                      <a:endParaRPr lang="en-US" sz="1100" b="0" i="0" u="none" strike="noStrike" dirty="0">
+                        <a:solidFill>
+                          <a:srgbClr val="000000"/>
+                        </a:solidFill>
+                        <a:effectLst/>
+                        <a:latin typeface="Calibri"/>
+                      </a:endParaRPr>
+                    </a:p>
+                  </a:txBody>
+                  <a:tcPr marL="9525" marR="9525" marT="9525" marB="0" anchor="b"/>
+                </a:tc>
+                <a:tc>
+                  <a:txBody>
+                    <a:bodyPr/>
+                    <a:lstStyle/>
+                    <a:p>
+                      <a:pPr algn="ctr" fontAlgn="b"/>
+                      <a:r>
+                        <a:rPr lang="en-US" sz="1100" b="0" i="0" u="none" strike="noStrike" dirty="0" smtClean="0">
+                          <a:solidFill>
+                            <a:srgbClr val="00B050"/>
+                          </a:solidFill>
+                          <a:effectLst/>
+                          <a:latin typeface="+mn-lt"/>
+                        </a:rPr>
+                        <a:t>163</a:t>
+                      </a:r>
+                      <a:endParaRPr lang="en-US" sz="1100" b="0" i="0" u="none" strike="noStrike" dirty="0">
+                        <a:solidFill>
+                          <a:srgbClr val="00B050"/>
+                        </a:solidFill>
+                        <a:effectLst/>
+                        <a:latin typeface="Calibri"/>
+                      </a:endParaRPr>
+                    </a:p>
+                  </a:txBody>
+                  <a:tcPr marL="9525" marR="9525" marT="9525" marB="0" anchor="b"/>
+                </a:tc>
+                <a:tc>
+                  <a:txBody>
+                    <a:bodyPr/>
+                    <a:lstStyle/>
+                    <a:p>
+                      <a:pPr algn="ctr" fontAlgn="b"/>
+                      <a:r>
+                        <a:rPr lang="en-US" sz="1100" u="none" strike="noStrike">
+                          <a:effectLst/>
+                        </a:rPr>
+                        <a:t>70</a:t>
+                      </a:r>
+                      <a:endParaRPr lang="en-US" sz="1100" b="0" i="0" u="none" strike="noStrike">
+                        <a:solidFill>
+                          <a:srgbClr val="000000"/>
+                        </a:solidFill>
+                        <a:effectLst/>
+                        <a:latin typeface="Calibri"/>
+                      </a:endParaRPr>
+                    </a:p>
+                  </a:txBody>
+                  <a:tcPr marL="9525" marR="9525" marT="9525" marB="0" anchor="b"/>
+                </a:tc>
+              </a:tr>
+              <a:tr h="307255">
+                <a:tc>
+                  <a:txBody>
+                    <a:bodyPr/>
+                    <a:lstStyle/>
+                    <a:p>
+                      <a:pPr algn="ctr" fontAlgn="b"/>
+                      <a:r>
+                        <a:rPr lang="en-US" sz="1100" u="none" strike="noStrike" dirty="0">
+                          <a:effectLst/>
+                        </a:rPr>
+                        <a:t>28</a:t>
+                      </a:r>
+                      <a:endParaRPr lang="en-US" sz="1100" b="0" i="0" u="none" strike="noStrike" dirty="0">
+                        <a:solidFill>
+                          <a:srgbClr val="000000"/>
+                        </a:solidFill>
+                        <a:effectLst/>
+                        <a:latin typeface="Calibri"/>
+                      </a:endParaRPr>
+                    </a:p>
+                  </a:txBody>
+                  <a:tcPr marL="9525" marR="9525" marT="9525" marB="0" anchor="b"/>
+                </a:tc>
+                <a:tc>
+                  <a:txBody>
+                    <a:bodyPr/>
+                    <a:lstStyle/>
+                    <a:p>
+                      <a:pPr algn="ctr" fontAlgn="b"/>
+                      <a:r>
+                        <a:rPr lang="en-US" sz="1100" u="none" strike="noStrike">
+                          <a:effectLst/>
+                        </a:rPr>
+                        <a:t>160</a:t>
+                      </a:r>
+                      <a:endParaRPr lang="en-US" sz="1100" b="0" i="0" u="none" strike="noStrike">
+                        <a:solidFill>
+                          <a:srgbClr val="000000"/>
+                        </a:solidFill>
+                        <a:effectLst/>
+                        <a:latin typeface="Calibri"/>
+                      </a:endParaRPr>
+                    </a:p>
+                  </a:txBody>
+                  <a:tcPr marL="9525" marR="9525" marT="9525" marB="0" anchor="b"/>
+                </a:tc>
+                <a:tc>
+                  <a:txBody>
+                    <a:bodyPr/>
+                    <a:lstStyle/>
+                    <a:p>
+                      <a:pPr algn="ctr" fontAlgn="b"/>
+                      <a:r>
+                        <a:rPr lang="en-US" sz="1100" u="none" strike="noStrike" dirty="0" smtClean="0">
+                          <a:solidFill>
+                            <a:srgbClr val="00B050"/>
+                          </a:solidFill>
+                          <a:effectLst/>
+                        </a:rPr>
+                        <a:t>66</a:t>
+                      </a:r>
+                      <a:endParaRPr lang="en-US" sz="1100" b="0" i="0" u="none" strike="noStrike" dirty="0">
+                        <a:solidFill>
+                          <a:srgbClr val="00B050"/>
+                        </a:solidFill>
+                        <a:effectLst/>
+                        <a:latin typeface="Calibri"/>
+                      </a:endParaRPr>
+                    </a:p>
+                  </a:txBody>
+                  <a:tcPr marL="9525" marR="9525" marT="9525" marB="0" anchor="b"/>
+                </a:tc>
+              </a:tr>
+              <a:tr h="307255">
+                <a:tc>
+                  <a:txBody>
+                    <a:bodyPr/>
+                    <a:lstStyle/>
+                    <a:p>
+                      <a:pPr algn="ctr" fontAlgn="b"/>
+                      <a:r>
+                        <a:rPr lang="en-US" sz="1100" u="none" strike="noStrike">
+                          <a:effectLst/>
+                        </a:rPr>
+                        <a:t>20</a:t>
+                      </a:r>
+                      <a:endParaRPr lang="en-US" sz="1100" b="0" i="0" u="none" strike="noStrike">
+                        <a:solidFill>
+                          <a:srgbClr val="000000"/>
+                        </a:solidFill>
+                        <a:effectLst/>
+                        <a:latin typeface="Calibri"/>
+                      </a:endParaRPr>
+                    </a:p>
+                  </a:txBody>
+                  <a:tcPr marL="9525" marR="9525" marT="9525" marB="0" anchor="b"/>
+                </a:tc>
+                <a:tc>
+                  <a:txBody>
+                    <a:bodyPr/>
+                    <a:lstStyle/>
+                    <a:p>
+                      <a:pPr algn="ctr" fontAlgn="b"/>
+                      <a:r>
+                        <a:rPr lang="en-US" sz="1100" u="none" strike="noStrike" dirty="0">
+                          <a:effectLst/>
+                        </a:rPr>
+                        <a:t>155</a:t>
+                      </a:r>
+                      <a:endParaRPr lang="en-US" sz="1100" b="0" i="0" u="none" strike="noStrike" dirty="0">
+                        <a:solidFill>
+                          <a:srgbClr val="000000"/>
+                        </a:solidFill>
+                        <a:effectLst/>
+                        <a:latin typeface="Calibri"/>
+                      </a:endParaRPr>
+                    </a:p>
+                  </a:txBody>
+                  <a:tcPr marL="9525" marR="9525" marT="9525" marB="0" anchor="b"/>
+                </a:tc>
+                <a:tc>
+                  <a:txBody>
+                    <a:bodyPr/>
+                    <a:lstStyle/>
+                    <a:p>
+                      <a:pPr algn="ctr" fontAlgn="b"/>
+                      <a:r>
+                        <a:rPr lang="en-US" sz="1100" u="none" strike="noStrike" dirty="0">
+                          <a:effectLst/>
+                        </a:rPr>
+                        <a:t>65</a:t>
+                      </a:r>
+                      <a:endParaRPr lang="en-US" sz="1100" b="0" i="0" u="none" strike="noStrike" dirty="0">
+                        <a:solidFill>
+                          <a:srgbClr val="000000"/>
+                        </a:solidFill>
+                        <a:effectLst/>
+                        <a:latin typeface="Calibri"/>
+                      </a:endParaRPr>
+                    </a:p>
+                  </a:txBody>
+                  <a:tcPr marL="9525" marR="9525" marT="9525" marB="0" anchor="b"/>
+                </a:tc>
+              </a:tr>
+              <a:tr h="307255">
+                <a:tc>
+                  <a:txBody>
+                    <a:bodyPr/>
+                    <a:lstStyle/>
+                    <a:p>
+                      <a:pPr algn="ctr" fontAlgn="b"/>
+                      <a:r>
+                        <a:rPr lang="en-US" sz="1100" b="0" i="0" u="none" strike="noStrike" dirty="0" smtClean="0">
+                          <a:solidFill>
+                            <a:srgbClr val="000000"/>
+                          </a:solidFill>
+                          <a:effectLst/>
+                          <a:latin typeface="Calibri"/>
+                        </a:rPr>
+                        <a:t>⁞</a:t>
+                      </a:r>
+                      <a:endParaRPr lang="en-US" sz="1100" b="0" i="0" u="none" strike="noStrike" dirty="0">
+                        <a:solidFill>
+                          <a:srgbClr val="000000"/>
+                        </a:solidFill>
+                        <a:effectLst/>
+                        <a:latin typeface="Calibri"/>
+                      </a:endParaRPr>
+                    </a:p>
+                  </a:txBody>
+                  <a:tcPr marL="9525" marR="9525" marT="9525" marB="0" anchor="b"/>
+                </a:tc>
+                <a:tc>
+                  <a:txBody>
+                    <a:bodyPr/>
+                    <a:lstStyle/>
+                    <a:p>
+                      <a:pPr algn="ctr" fontAlgn="b"/>
+                      <a:r>
+                        <a:rPr lang="en-US" sz="1100" b="0" i="0" u="none" strike="noStrike" dirty="0" smtClean="0">
+                          <a:solidFill>
+                            <a:srgbClr val="000000"/>
+                          </a:solidFill>
+                          <a:effectLst/>
+                          <a:latin typeface="+mn-lt"/>
+                        </a:rPr>
+                        <a:t>⁞</a:t>
+                      </a:r>
+                    </a:p>
+                  </a:txBody>
+                  <a:tcPr marL="9525" marR="9525" marT="9525" marB="0" anchor="b"/>
+                </a:tc>
+                <a:tc>
+                  <a:txBody>
+                    <a:bodyPr/>
+                    <a:lstStyle/>
+                    <a:p>
+                      <a:pPr algn="ctr" fontAlgn="b"/>
+                      <a:r>
+                        <a:rPr lang="en-US" sz="1100" b="0" i="0" u="none" strike="noStrike" dirty="0" smtClean="0">
+                          <a:solidFill>
+                            <a:srgbClr val="000000"/>
+                          </a:solidFill>
+                          <a:effectLst/>
+                          <a:latin typeface="+mn-lt"/>
+                        </a:rPr>
+                        <a:t>⁞</a:t>
+                      </a:r>
+                      <a:endParaRPr lang="en-US" sz="1100" b="0" i="0" u="none" strike="noStrike" dirty="0">
+                        <a:solidFill>
+                          <a:srgbClr val="000000"/>
+                        </a:solidFill>
+                        <a:effectLst/>
+                        <a:latin typeface="Calibri"/>
+                      </a:endParaRPr>
+                    </a:p>
+                  </a:txBody>
+                  <a:tcPr marL="9525" marR="9525" marT="9525" marB="0" anchor="b"/>
+                </a:tc>
+              </a:tr>
+            </a:tbl>
+          </a:graphicData>
+        </a:graphic>
+      </p:graphicFrame>
+      <p:cxnSp>
+        <p:nvCxnSpPr>
+          <p:cNvPr id="3" name="Straight Connector 2"/>
+          <p:cNvCxnSpPr>
+            <a:endCxn id="25" idx="1"/>
+          </p:cNvCxnSpPr>
+          <p:nvPr/>
+        </p:nvCxnSpPr>
+        <p:spPr>
+          <a:xfrm>
+            <a:off x="3920569" y="2281553"/>
+            <a:ext cx="1184830" cy="1337945"/>
+          </a:xfrm>
+          <a:prstGeom prst="line">
+            <a:avLst/>
+          </a:prstGeom>
+        </p:spPr>
+        <p:style>
+          <a:lnRef idx="1">
+            <a:schemeClr val="accent1"/>
+          </a:lnRef>
+          <a:fillRef idx="0">
+            <a:schemeClr val="accent1"/>
+          </a:fillRef>
+          <a:effectRef idx="0">
+            <a:schemeClr val="accent1"/>
+          </a:effectRef>
+          <a:fontRef idx="minor">
+            <a:schemeClr val="tx1"/>
+          </a:fontRef>
+        </p:style>
+      </p:cxnSp>
+      <p:cxnSp>
+        <p:nvCxnSpPr>
+          <p:cNvPr id="5" name="Straight Connector 4"/>
+          <p:cNvCxnSpPr>
+            <a:stCxn id="8" idx="3"/>
+          </p:cNvCxnSpPr>
+          <p:nvPr/>
+        </p:nvCxnSpPr>
+        <p:spPr>
+          <a:xfrm>
+            <a:off x="3975987" y="3595325"/>
+            <a:ext cx="1129412" cy="28239"/>
+          </a:xfrm>
+          <a:prstGeom prst="line">
+            <a:avLst/>
+          </a:prstGeom>
+        </p:spPr>
+        <p:style>
+          <a:lnRef idx="1">
+            <a:schemeClr val="accent1"/>
+          </a:lnRef>
+          <a:fillRef idx="0">
+            <a:schemeClr val="accent1"/>
+          </a:fillRef>
+          <a:effectRef idx="0">
+            <a:schemeClr val="accent1"/>
+          </a:effectRef>
+          <a:fontRef idx="minor">
+            <a:schemeClr val="tx1"/>
+          </a:fontRef>
+        </p:style>
+      </p:cxnSp>
+      <p:cxnSp>
+        <p:nvCxnSpPr>
+          <p:cNvPr id="12" name="Straight Connector 11"/>
+          <p:cNvCxnSpPr/>
+          <p:nvPr/>
+        </p:nvCxnSpPr>
+        <p:spPr>
+          <a:xfrm flipV="1">
+            <a:off x="3899787" y="3645548"/>
+            <a:ext cx="1184830" cy="1379128"/>
+          </a:xfrm>
+          <a:prstGeom prst="line">
+            <a:avLst/>
+          </a:prstGeom>
+        </p:spPr>
+        <p:style>
+          <a:lnRef idx="1">
+            <a:schemeClr val="accent1"/>
+          </a:lnRef>
+          <a:fillRef idx="0">
+            <a:schemeClr val="accent1"/>
+          </a:fillRef>
+          <a:effectRef idx="0">
+            <a:schemeClr val="accent1"/>
+          </a:effectRef>
+          <a:fontRef idx="minor">
+            <a:schemeClr val="tx1"/>
+          </a:fontRef>
+        </p:style>
+      </p:cxnSp>
+      <p:sp>
+        <p:nvSpPr>
+          <p:cNvPr id="19" name="Rectangle 18"/>
+          <p:cNvSpPr/>
+          <p:nvPr/>
+        </p:nvSpPr>
+        <p:spPr>
+          <a:xfrm>
+            <a:off x="6967756" y="2483027"/>
+            <a:ext cx="1139275" cy="923330"/>
+          </a:xfrm>
+          <a:prstGeom prst="rect">
+            <a:avLst/>
+          </a:prstGeom>
+        </p:spPr>
+        <p:txBody>
+          <a:bodyPr wrap="square">
+            <a:spAutoFit/>
+          </a:bodyPr>
+          <a:lstStyle/>
+          <a:p>
+            <a:pPr algn="ctr"/>
+            <a:r>
+              <a:rPr lang="en-US" dirty="0"/>
+              <a:t>Regress Age on Weight</a:t>
+            </a:r>
+            <a:endParaRPr lang="en-US" dirty="0"/>
+          </a:p>
+        </p:txBody>
+      </p:sp>
+      <p:cxnSp>
+        <p:nvCxnSpPr>
+          <p:cNvPr id="21" name="Straight Connector 20"/>
+          <p:cNvCxnSpPr/>
+          <p:nvPr/>
+        </p:nvCxnSpPr>
+        <p:spPr>
+          <a:xfrm>
+            <a:off x="6721839" y="3595252"/>
+            <a:ext cx="1295400" cy="0"/>
+          </a:xfrm>
+          <a:prstGeom prst="line">
+            <a:avLst/>
+          </a:prstGeom>
+        </p:spPr>
+        <p:style>
+          <a:lnRef idx="1">
+            <a:schemeClr val="accent1"/>
+          </a:lnRef>
+          <a:fillRef idx="0">
+            <a:schemeClr val="accent1"/>
+          </a:fillRef>
+          <a:effectRef idx="0">
+            <a:schemeClr val="accent1"/>
+          </a:effectRef>
+          <a:fontRef idx="minor">
+            <a:schemeClr val="tx1"/>
+          </a:fontRef>
+        </p:style>
+      </p:cxnSp>
+      <mc:AlternateContent xmlns:mc="http://schemas.openxmlformats.org/markup-compatibility/2006">
+        <mc:Choice xmlns:a14="http://schemas.microsoft.com/office/drawing/2010/main" Requires="a14">
+          <p:sp>
+            <p:nvSpPr>
+              <p:cNvPr id="38" name="Rectangle 37"/>
+              <p:cNvSpPr/>
+              <p:nvPr/>
+            </p:nvSpPr>
+            <p:spPr>
+              <a:xfrm>
+                <a:off x="8017239" y="3061648"/>
+                <a:ext cx="1036969" cy="1067354"/>
+              </a:xfrm>
+              <a:prstGeom prst="rect">
+                <a:avLst/>
+              </a:prstGeom>
+            </p:spPr>
+            <p:style>
+              <a:lnRef idx="2">
+                <a:schemeClr val="accent1">
+                  <a:shade val="50000"/>
+                </a:schemeClr>
+              </a:lnRef>
+              <a:fillRef idx="1">
+                <a:schemeClr val="accent1"/>
+              </a:fillRef>
+              <a:effectRef idx="0">
+                <a:schemeClr val="accent1"/>
+              </a:effectRef>
+              <a:fontRef idx="minor">
+                <a:schemeClr val="lt1"/>
+              </a:fontRef>
+            </p:style>
+            <p:txBody>
+              <a:bodyPr rtlCol="0" anchor="ctr"/>
+              <a:lstStyle/>
+              <a:p>
+                <a:pPr algn="ctr"/>
+                <a14:m>
+                  <m:oMathPara xmlns:m="http://schemas.openxmlformats.org/officeDocument/2006/math">
+                    <m:oMathParaPr>
+                      <m:jc m:val="centerGroup"/>
+                    </m:oMathParaPr>
+                    <m:oMath xmlns:m="http://schemas.openxmlformats.org/officeDocument/2006/math">
+                      <m:sSub>
+                        <m:sSubPr>
+                          <m:ctrlPr>
+                            <a:rPr lang="en-US" i="1" smtClean="0">
+                              <a:latin typeface="Cambria Math"/>
+                            </a:rPr>
+                          </m:ctrlPr>
+                        </m:sSubPr>
+                        <m:e>
+                          <m:acc>
+                            <m:accPr>
+                              <m:chr m:val="̂"/>
+                              <m:ctrlPr>
+                                <a:rPr lang="en-US" i="1" smtClean="0">
+                                  <a:latin typeface="Cambria Math"/>
+                                </a:rPr>
+                              </m:ctrlPr>
+                            </m:accPr>
+                            <m:e>
+                              <m:r>
+                                <m:rPr>
+                                  <m:sty m:val="p"/>
+                                </m:rPr>
+                                <a:rPr lang="en-US" i="1">
+                                  <a:latin typeface="Cambria Math"/>
+                                </a:rPr>
+                                <m:t>β</m:t>
+                              </m:r>
+                            </m:e>
+                          </m:acc>
+                        </m:e>
+                        <m:sub>
+                          <m:r>
+                            <a:rPr lang="en-US" b="0" i="1" smtClean="0">
+                              <a:latin typeface="Cambria Math"/>
+                            </a:rPr>
+                            <m:t>𝑠𝑡𝑎𝑐𝑘</m:t>
+                          </m:r>
+                        </m:sub>
+                      </m:sSub>
+                      <m:r>
+                        <a:rPr lang="en-US" b="0" i="1" smtClean="0">
+                          <a:latin typeface="Cambria Math"/>
+                        </a:rPr>
+                        <m:t>=</m:t>
+                      </m:r>
+                    </m:oMath>
+                  </m:oMathPara>
+                </a14:m>
+                <a:endParaRPr lang="en-US" b="0" i="1" dirty="0" smtClean="0">
+                  <a:latin typeface="Cambria Math"/>
+                </a:endParaRPr>
+              </a:p>
+              <a:p>
+                <a:pPr algn="ctr"/>
+                <a:r>
+                  <a:rPr lang="en-US" b="0" i="1" dirty="0" smtClean="0">
+                    <a:latin typeface="Cambria Math"/>
+                  </a:rPr>
+                  <a:t>.</a:t>
+                </a:r>
+                <a:r>
+                  <a:rPr lang="en-US" b="0" i="1" dirty="0" smtClean="0">
+                    <a:latin typeface="Cambria Math"/>
+                  </a:rPr>
+                  <a:t>17</a:t>
+                </a:r>
+                <a:endParaRPr lang="en-US" b="0" i="1" dirty="0" smtClean="0">
+                  <a:latin typeface="Cambria Math"/>
+                </a:endParaRPr>
+              </a:p>
+            </p:txBody>
+          </p:sp>
+        </mc:Choice>
+        <mc:Fallback>
+          <p:sp>
+            <p:nvSpPr>
+              <p:cNvPr id="38" name="Rectangle 37"/>
+              <p:cNvSpPr>
+                <a:spLocks noRot="1" noChangeAspect="1" noMove="1" noResize="1" noEditPoints="1" noAdjustHandles="1" noChangeArrowheads="1" noChangeShapeType="1" noTextEdit="1"/>
+              </p:cNvSpPr>
+              <p:nvPr/>
+            </p:nvSpPr>
+            <p:spPr>
+              <a:xfrm>
+                <a:off x="8017239" y="3061648"/>
+                <a:ext cx="1036969" cy="1067354"/>
+              </a:xfrm>
+              <a:prstGeom prst="rect">
+                <a:avLst/>
+              </a:prstGeom>
+              <a:blipFill rotWithShape="1">
+                <a:blip r:embed="rId2"/>
+                <a:stretch>
+                  <a:fillRect/>
+                </a:stretch>
+              </a:blipFill>
+            </p:spPr>
+            <p:txBody>
+              <a:bodyPr/>
+              <a:lstStyle/>
+              <a:p>
+                <a:r>
+                  <a:rPr lang="en-US">
+                    <a:noFill/>
+                  </a:rPr>
+                  <a:t> </a:t>
+                </a:r>
+              </a:p>
+            </p:txBody>
+          </p:sp>
+        </mc:Fallback>
+      </mc:AlternateContent>
+      <p:sp>
+        <p:nvSpPr>
+          <p:cNvPr id="40" name="TextBox 39"/>
+          <p:cNvSpPr txBox="1"/>
+          <p:nvPr/>
+        </p:nvSpPr>
+        <p:spPr>
+          <a:xfrm>
+            <a:off x="8016583" y="2483026"/>
+            <a:ext cx="1253839" cy="646331"/>
+          </a:xfrm>
+          <a:prstGeom prst="rect">
+            <a:avLst/>
+          </a:prstGeom>
+          <a:noFill/>
+        </p:spPr>
+        <p:txBody>
+          <a:bodyPr wrap="square" rtlCol="0">
+            <a:spAutoFit/>
+          </a:bodyPr>
+          <a:lstStyle/>
+          <a:p>
+            <a:pPr algn="ctr"/>
+            <a:r>
+              <a:rPr lang="en-US" dirty="0" smtClean="0"/>
+              <a:t>Pooled Result</a:t>
+            </a:r>
+            <a:endParaRPr lang="en-US" dirty="0"/>
+          </a:p>
+        </p:txBody>
+      </p:sp>
+      <p:cxnSp>
+        <p:nvCxnSpPr>
+          <p:cNvPr id="42" name="Straight Connector 41"/>
+          <p:cNvCxnSpPr>
+            <a:endCxn id="8" idx="1"/>
+          </p:cNvCxnSpPr>
+          <p:nvPr/>
+        </p:nvCxnSpPr>
+        <p:spPr>
+          <a:xfrm>
+            <a:off x="1734880" y="3595252"/>
+            <a:ext cx="869507" cy="73"/>
+          </a:xfrm>
+          <a:prstGeom prst="line">
+            <a:avLst/>
+          </a:prstGeom>
+        </p:spPr>
+        <p:style>
+          <a:lnRef idx="1">
+            <a:schemeClr val="accent1"/>
+          </a:lnRef>
+          <a:fillRef idx="0">
+            <a:schemeClr val="accent1"/>
+          </a:fillRef>
+          <a:effectRef idx="0">
+            <a:schemeClr val="accent1"/>
+          </a:effectRef>
+          <a:fontRef idx="minor">
+            <a:schemeClr val="tx1"/>
+          </a:fontRef>
+        </p:style>
+      </p:cxnSp>
+    </p:spTree>
+    <p:extLst>
+      <p:ext uri="{BB962C8B-B14F-4D97-AF65-F5344CB8AC3E}">
+        <p14:creationId xmlns:p14="http://schemas.microsoft.com/office/powerpoint/2010/main" val="1523247836"/>
       </p:ext>
     </p:extLst>
   </p:cSld>

</xml_diff>

<commit_message>
Added more pix to ppt
</commit_message>
<xml_diff>
--- a/mi_picture.pptx
+++ b/mi_picture.pptx
@@ -7,6 +7,8 @@
   <p:sldIdLst>
     <p:sldId id="256" r:id="rId2"/>
     <p:sldId id="258" r:id="rId3"/>
+    <p:sldId id="259" r:id="rId4"/>
+    <p:sldId id="260" r:id="rId5"/>
   </p:sldIdLst>
   <p:sldSz cx="9144000" cy="6858000" type="screen4x3"/>
   <p:notesSz cx="6858000" cy="9144000"/>
@@ -289,7 +291,7 @@
           <a:p>
             <a:fld id="{B17F4E78-F3C6-4442-AD2E-D4916562ED88}" type="datetimeFigureOut">
               <a:rPr lang="en-US" smtClean="0"/>
-              <a:t>10/30/2015</a:t>
+              <a:t>11/12/2015</a:t>
             </a:fld>
             <a:endParaRPr lang="en-US"/>
           </a:p>
@@ -459,7 +461,7 @@
           <a:p>
             <a:fld id="{B17F4E78-F3C6-4442-AD2E-D4916562ED88}" type="datetimeFigureOut">
               <a:rPr lang="en-US" smtClean="0"/>
-              <a:t>10/30/2015</a:t>
+              <a:t>11/12/2015</a:t>
             </a:fld>
             <a:endParaRPr lang="en-US"/>
           </a:p>
@@ -639,7 +641,7 @@
           <a:p>
             <a:fld id="{B17F4E78-F3C6-4442-AD2E-D4916562ED88}" type="datetimeFigureOut">
               <a:rPr lang="en-US" smtClean="0"/>
-              <a:t>10/30/2015</a:t>
+              <a:t>11/12/2015</a:t>
             </a:fld>
             <a:endParaRPr lang="en-US"/>
           </a:p>
@@ -809,7 +811,7 @@
           <a:p>
             <a:fld id="{B17F4E78-F3C6-4442-AD2E-D4916562ED88}" type="datetimeFigureOut">
               <a:rPr lang="en-US" smtClean="0"/>
-              <a:t>10/30/2015</a:t>
+              <a:t>11/12/2015</a:t>
             </a:fld>
             <a:endParaRPr lang="en-US"/>
           </a:p>
@@ -1055,7 +1057,7 @@
           <a:p>
             <a:fld id="{B17F4E78-F3C6-4442-AD2E-D4916562ED88}" type="datetimeFigureOut">
               <a:rPr lang="en-US" smtClean="0"/>
-              <a:t>10/30/2015</a:t>
+              <a:t>11/12/2015</a:t>
             </a:fld>
             <a:endParaRPr lang="en-US"/>
           </a:p>
@@ -1343,7 +1345,7 @@
           <a:p>
             <a:fld id="{B17F4E78-F3C6-4442-AD2E-D4916562ED88}" type="datetimeFigureOut">
               <a:rPr lang="en-US" smtClean="0"/>
-              <a:t>10/30/2015</a:t>
+              <a:t>11/12/2015</a:t>
             </a:fld>
             <a:endParaRPr lang="en-US"/>
           </a:p>
@@ -1765,7 +1767,7 @@
           <a:p>
             <a:fld id="{B17F4E78-F3C6-4442-AD2E-D4916562ED88}" type="datetimeFigureOut">
               <a:rPr lang="en-US" smtClean="0"/>
-              <a:t>10/30/2015</a:t>
+              <a:t>11/12/2015</a:t>
             </a:fld>
             <a:endParaRPr lang="en-US"/>
           </a:p>
@@ -1883,7 +1885,7 @@
           <a:p>
             <a:fld id="{B17F4E78-F3C6-4442-AD2E-D4916562ED88}" type="datetimeFigureOut">
               <a:rPr lang="en-US" smtClean="0"/>
-              <a:t>10/30/2015</a:t>
+              <a:t>11/12/2015</a:t>
             </a:fld>
             <a:endParaRPr lang="en-US"/>
           </a:p>
@@ -1978,7 +1980,7 @@
           <a:p>
             <a:fld id="{B17F4E78-F3C6-4442-AD2E-D4916562ED88}" type="datetimeFigureOut">
               <a:rPr lang="en-US" smtClean="0"/>
-              <a:t>10/30/2015</a:t>
+              <a:t>11/12/2015</a:t>
             </a:fld>
             <a:endParaRPr lang="en-US"/>
           </a:p>
@@ -2255,7 +2257,7 @@
           <a:p>
             <a:fld id="{B17F4E78-F3C6-4442-AD2E-D4916562ED88}" type="datetimeFigureOut">
               <a:rPr lang="en-US" smtClean="0"/>
-              <a:t>10/30/2015</a:t>
+              <a:t>11/12/2015</a:t>
             </a:fld>
             <a:endParaRPr lang="en-US"/>
           </a:p>
@@ -2508,7 +2510,7 @@
           <a:p>
             <a:fld id="{B17F4E78-F3C6-4442-AD2E-D4916562ED88}" type="datetimeFigureOut">
               <a:rPr lang="en-US" smtClean="0"/>
-              <a:t>10/30/2015</a:t>
+              <a:t>11/12/2015</a:t>
             </a:fld>
             <a:endParaRPr lang="en-US"/>
           </a:p>
@@ -2721,7 +2723,7 @@
           <a:p>
             <a:fld id="{B17F4E78-F3C6-4442-AD2E-D4916562ED88}" type="datetimeFigureOut">
               <a:rPr lang="en-US" smtClean="0"/>
-              <a:t>10/30/2015</a:t>
+              <a:t>11/12/2015</a:t>
             </a:fld>
             <a:endParaRPr lang="en-US"/>
           </a:p>
@@ -8682,7 +8684,6 @@
               <a:rPr lang="en-US" dirty="0"/>
               <a:t>Regress Age on Weight</a:t>
             </a:r>
-            <a:endParaRPr lang="en-US" dirty="0"/>
           </a:p>
         </p:txBody>
       </p:sp>
@@ -8716,8 +8717,8 @@
           </a:fontRef>
         </p:style>
       </p:cxnSp>
-      <mc:AlternateContent xmlns:mc="http://schemas.openxmlformats.org/markup-compatibility/2006">
-        <mc:Choice xmlns:a14="http://schemas.microsoft.com/office/drawing/2010/main" Requires="a14">
+      <mc:AlternateContent xmlns:mc="http://schemas.openxmlformats.org/markup-compatibility/2006" xmlns:a14="http://schemas.microsoft.com/office/drawing/2010/main">
+        <mc:Choice Requires="a14">
           <p:sp>
             <p:nvSpPr>
               <p:cNvPr id="38" name="Rectangle 37"/>
@@ -8819,22 +8820,13 @@
                   <a:rPr lang="en-US" b="0" i="1" dirty="0" smtClean="0">
                     <a:latin typeface="Cambria Math"/>
                   </a:rPr>
-                  <a:t>.</a:t>
+                  <a:t>.17</a:t>
                 </a:r>
-                <a:r>
-                  <a:rPr lang="en-US" b="0" i="1" dirty="0" smtClean="0">
-                    <a:latin typeface="Cambria Math"/>
-                  </a:rPr>
-                  <a:t>17</a:t>
-                </a:r>
-                <a:endParaRPr lang="en-US" b="0" i="1" dirty="0" smtClean="0">
-                  <a:latin typeface="Cambria Math"/>
-                </a:endParaRPr>
               </a:p>
             </p:txBody>
           </p:sp>
         </mc:Choice>
-        <mc:Fallback>
+        <mc:Fallback xmlns="">
           <p:sp>
             <p:nvSpPr>
               <p:cNvPr id="38" name="Rectangle 37"/>
@@ -8940,6 +8932,673 @@
     <p:extLst>
       <p:ext uri="{BB962C8B-B14F-4D97-AF65-F5344CB8AC3E}">
         <p14:creationId xmlns:p14="http://schemas.microsoft.com/office/powerpoint/2010/main" val="1523247836"/>
+      </p:ext>
+    </p:extLst>
+  </p:cSld>
+  <p:clrMapOvr>
+    <a:masterClrMapping/>
+  </p:clrMapOvr>
+  <p:timing>
+    <p:tnLst>
+      <p:par>
+        <p:cTn id="1" dur="indefinite" restart="never" nodeType="tmRoot"/>
+      </p:par>
+    </p:tnLst>
+  </p:timing>
+</p:sld>
+</file>
+
+<file path=ppt/slides/slide3.xml><?xml version="1.0" encoding="utf-8"?>
+<p:sld xmlns:a="http://schemas.openxmlformats.org/drawingml/2006/main" xmlns:r="http://schemas.openxmlformats.org/officeDocument/2006/relationships" xmlns:p="http://schemas.openxmlformats.org/presentationml/2006/main">
+  <p:cSld>
+    <p:spTree>
+      <p:nvGrpSpPr>
+        <p:cNvPr id="1" name=""/>
+        <p:cNvGrpSpPr/>
+        <p:nvPr/>
+      </p:nvGrpSpPr>
+      <p:grpSpPr>
+        <a:xfrm>
+          <a:off x="0" y="0"/>
+          <a:ext cx="0" cy="0"/>
+          <a:chOff x="0" y="0"/>
+          <a:chExt cx="0" cy="0"/>
+        </a:xfrm>
+      </p:grpSpPr>
+      <p:pic>
+        <p:nvPicPr>
+          <p:cNvPr id="1026" name="Picture 2"/>
+          <p:cNvPicPr>
+            <a:picLocks noChangeAspect="1" noChangeArrowheads="1"/>
+          </p:cNvPicPr>
+          <p:nvPr/>
+        </p:nvPicPr>
+        <p:blipFill rotWithShape="1">
+          <a:blip r:embed="rId2">
+            <a:extLst>
+              <a:ext uri="{28A0092B-C50C-407E-A947-70E740481C1C}">
+                <a14:useLocalDpi xmlns:a14="http://schemas.microsoft.com/office/drawing/2010/main" val="0"/>
+              </a:ext>
+            </a:extLst>
+          </a:blip>
+          <a:srcRect r="2671"/>
+          <a:stretch/>
+        </p:blipFill>
+        <p:spPr bwMode="auto">
+          <a:xfrm>
+            <a:off x="0" y="641927"/>
+            <a:ext cx="4470235" cy="3062659"/>
+          </a:xfrm>
+          <a:prstGeom prst="rect">
+            <a:avLst/>
+          </a:prstGeom>
+          <a:noFill/>
+          <a:ln>
+            <a:noFill/>
+          </a:ln>
+          <a:extLst>
+            <a:ext uri="{909E8E84-426E-40DD-AFC4-6F175D3DCCD1}">
+              <a14:hiddenFill xmlns:a14="http://schemas.microsoft.com/office/drawing/2010/main">
+                <a:solidFill>
+                  <a:schemeClr val="accent1"/>
+                </a:solidFill>
+              </a14:hiddenFill>
+            </a:ext>
+            <a:ext uri="{91240B29-F687-4F45-9708-019B960494DF}">
+              <a14:hiddenLine xmlns:a14="http://schemas.microsoft.com/office/drawing/2010/main" w="9525">
+                <a:solidFill>
+                  <a:schemeClr val="tx1"/>
+                </a:solidFill>
+                <a:miter lim="800000"/>
+                <a:headEnd/>
+                <a:tailEnd/>
+              </a14:hiddenLine>
+            </a:ext>
+          </a:extLst>
+        </p:spPr>
+      </p:pic>
+      <p:pic>
+        <p:nvPicPr>
+          <p:cNvPr id="1027" name="Picture 3"/>
+          <p:cNvPicPr>
+            <a:picLocks noChangeAspect="1" noChangeArrowheads="1"/>
+          </p:cNvPicPr>
+          <p:nvPr/>
+        </p:nvPicPr>
+        <p:blipFill rotWithShape="1">
+          <a:blip r:embed="rId3">
+            <a:extLst>
+              <a:ext uri="{28A0092B-C50C-407E-A947-70E740481C1C}">
+                <a14:useLocalDpi xmlns:a14="http://schemas.microsoft.com/office/drawing/2010/main" val="0"/>
+              </a:ext>
+            </a:extLst>
+          </a:blip>
+          <a:srcRect r="2593"/>
+          <a:stretch/>
+        </p:blipFill>
+        <p:spPr bwMode="auto">
+          <a:xfrm>
+            <a:off x="4676710" y="640245"/>
+            <a:ext cx="4467290" cy="3058188"/>
+          </a:xfrm>
+          <a:prstGeom prst="rect">
+            <a:avLst/>
+          </a:prstGeom>
+          <a:noFill/>
+          <a:ln>
+            <a:noFill/>
+          </a:ln>
+          <a:extLst>
+            <a:ext uri="{909E8E84-426E-40DD-AFC4-6F175D3DCCD1}">
+              <a14:hiddenFill xmlns:a14="http://schemas.microsoft.com/office/drawing/2010/main">
+                <a:solidFill>
+                  <a:schemeClr val="accent1"/>
+                </a:solidFill>
+              </a14:hiddenFill>
+            </a:ext>
+            <a:ext uri="{91240B29-F687-4F45-9708-019B960494DF}">
+              <a14:hiddenLine xmlns:a14="http://schemas.microsoft.com/office/drawing/2010/main" w="9525">
+                <a:solidFill>
+                  <a:schemeClr val="tx1"/>
+                </a:solidFill>
+                <a:miter lim="800000"/>
+                <a:headEnd/>
+                <a:tailEnd/>
+              </a14:hiddenLine>
+            </a:ext>
+          </a:extLst>
+        </p:spPr>
+      </p:pic>
+    </p:spTree>
+    <p:extLst>
+      <p:ext uri="{BB962C8B-B14F-4D97-AF65-F5344CB8AC3E}">
+        <p14:creationId xmlns:p14="http://schemas.microsoft.com/office/powerpoint/2010/main" val="206410071"/>
+      </p:ext>
+    </p:extLst>
+  </p:cSld>
+  <p:clrMapOvr>
+    <a:masterClrMapping/>
+  </p:clrMapOvr>
+</p:sld>
+</file>
+
+<file path=ppt/slides/slide4.xml><?xml version="1.0" encoding="utf-8"?>
+<p:sld xmlns:a="http://schemas.openxmlformats.org/drawingml/2006/main" xmlns:r="http://schemas.openxmlformats.org/officeDocument/2006/relationships" xmlns:p="http://schemas.openxmlformats.org/presentationml/2006/main">
+  <p:cSld>
+    <p:spTree>
+      <p:nvGrpSpPr>
+        <p:cNvPr id="1" name=""/>
+        <p:cNvGrpSpPr/>
+        <p:nvPr/>
+      </p:nvGrpSpPr>
+      <p:grpSpPr>
+        <a:xfrm>
+          <a:off x="0" y="0"/>
+          <a:ext cx="0" cy="0"/>
+          <a:chOff x="0" y="0"/>
+          <a:chExt cx="0" cy="0"/>
+        </a:xfrm>
+      </p:grpSpPr>
+      <p:pic>
+        <p:nvPicPr>
+          <p:cNvPr id="1027" name="Picture 3"/>
+          <p:cNvPicPr>
+            <a:picLocks noChangeAspect="1" noChangeArrowheads="1"/>
+          </p:cNvPicPr>
+          <p:nvPr/>
+        </p:nvPicPr>
+        <p:blipFill rotWithShape="1">
+          <a:blip r:embed="rId2">
+            <a:extLst>
+              <a:ext uri="{28A0092B-C50C-407E-A947-70E740481C1C}">
+                <a14:useLocalDpi xmlns:a14="http://schemas.microsoft.com/office/drawing/2010/main" val="0"/>
+              </a:ext>
+            </a:extLst>
+          </a:blip>
+          <a:srcRect t="12420"/>
+          <a:stretch/>
+        </p:blipFill>
+        <p:spPr bwMode="auto">
+          <a:xfrm>
+            <a:off x="215264" y="2713120"/>
+            <a:ext cx="3128835" cy="1853904"/>
+          </a:xfrm>
+          <a:prstGeom prst="rect">
+            <a:avLst/>
+          </a:prstGeom>
+          <a:noFill/>
+          <a:ln>
+            <a:noFill/>
+          </a:ln>
+          <a:extLst>
+            <a:ext uri="{909E8E84-426E-40DD-AFC4-6F175D3DCCD1}">
+              <a14:hiddenFill xmlns:a14="http://schemas.microsoft.com/office/drawing/2010/main">
+                <a:solidFill>
+                  <a:schemeClr val="accent1"/>
+                </a:solidFill>
+              </a14:hiddenFill>
+            </a:ext>
+            <a:ext uri="{91240B29-F687-4F45-9708-019B960494DF}">
+              <a14:hiddenLine xmlns:a14="http://schemas.microsoft.com/office/drawing/2010/main" w="9525">
+                <a:solidFill>
+                  <a:schemeClr val="tx1"/>
+                </a:solidFill>
+                <a:miter lim="800000"/>
+                <a:headEnd/>
+                <a:tailEnd/>
+              </a14:hiddenLine>
+            </a:ext>
+          </a:extLst>
+        </p:spPr>
+      </p:pic>
+      <p:pic>
+        <p:nvPicPr>
+          <p:cNvPr id="1029" name="Picture 5"/>
+          <p:cNvPicPr>
+            <a:picLocks noChangeAspect="1" noChangeArrowheads="1"/>
+          </p:cNvPicPr>
+          <p:nvPr/>
+        </p:nvPicPr>
+        <p:blipFill rotWithShape="1">
+          <a:blip r:embed="rId3">
+            <a:extLst>
+              <a:ext uri="{28A0092B-C50C-407E-A947-70E740481C1C}">
+                <a14:useLocalDpi xmlns:a14="http://schemas.microsoft.com/office/drawing/2010/main" val="0"/>
+              </a:ext>
+            </a:extLst>
+          </a:blip>
+          <a:srcRect t="15311"/>
+          <a:stretch/>
+        </p:blipFill>
+        <p:spPr bwMode="auto">
+          <a:xfrm>
+            <a:off x="320688" y="637103"/>
+            <a:ext cx="3023411" cy="1636525"/>
+          </a:xfrm>
+          <a:prstGeom prst="rect">
+            <a:avLst/>
+          </a:prstGeom>
+          <a:noFill/>
+          <a:ln>
+            <a:noFill/>
+          </a:ln>
+          <a:extLst>
+            <a:ext uri="{909E8E84-426E-40DD-AFC4-6F175D3DCCD1}">
+              <a14:hiddenFill xmlns:a14="http://schemas.microsoft.com/office/drawing/2010/main">
+                <a:solidFill>
+                  <a:schemeClr val="accent1"/>
+                </a:solidFill>
+              </a14:hiddenFill>
+            </a:ext>
+            <a:ext uri="{91240B29-F687-4F45-9708-019B960494DF}">
+              <a14:hiddenLine xmlns:a14="http://schemas.microsoft.com/office/drawing/2010/main" w="9525">
+                <a:solidFill>
+                  <a:schemeClr val="tx1"/>
+                </a:solidFill>
+                <a:miter lim="800000"/>
+                <a:headEnd/>
+                <a:tailEnd/>
+              </a14:hiddenLine>
+            </a:ext>
+          </a:extLst>
+        </p:spPr>
+      </p:pic>
+      <p:pic>
+        <p:nvPicPr>
+          <p:cNvPr id="1030" name="Picture 6"/>
+          <p:cNvPicPr>
+            <a:picLocks noChangeAspect="1" noChangeArrowheads="1"/>
+          </p:cNvPicPr>
+          <p:nvPr/>
+        </p:nvPicPr>
+        <p:blipFill rotWithShape="1">
+          <a:blip r:embed="rId4">
+            <a:extLst>
+              <a:ext uri="{28A0092B-C50C-407E-A947-70E740481C1C}">
+                <a14:useLocalDpi xmlns:a14="http://schemas.microsoft.com/office/drawing/2010/main" val="0"/>
+              </a:ext>
+            </a:extLst>
+          </a:blip>
+          <a:srcRect t="17430"/>
+          <a:stretch/>
+        </p:blipFill>
+        <p:spPr bwMode="auto">
+          <a:xfrm>
+            <a:off x="242972" y="4854470"/>
+            <a:ext cx="3262227" cy="1987354"/>
+          </a:xfrm>
+          <a:prstGeom prst="rect">
+            <a:avLst/>
+          </a:prstGeom>
+          <a:noFill/>
+          <a:ln>
+            <a:noFill/>
+          </a:ln>
+          <a:extLst>
+            <a:ext uri="{909E8E84-426E-40DD-AFC4-6F175D3DCCD1}">
+              <a14:hiddenFill xmlns:a14="http://schemas.microsoft.com/office/drawing/2010/main">
+                <a:solidFill>
+                  <a:schemeClr val="accent1"/>
+                </a:solidFill>
+              </a14:hiddenFill>
+            </a:ext>
+            <a:ext uri="{91240B29-F687-4F45-9708-019B960494DF}">
+              <a14:hiddenLine xmlns:a14="http://schemas.microsoft.com/office/drawing/2010/main" w="9525">
+                <a:solidFill>
+                  <a:schemeClr val="tx1"/>
+                </a:solidFill>
+                <a:miter lim="800000"/>
+                <a:headEnd/>
+                <a:tailEnd/>
+              </a14:hiddenLine>
+            </a:ext>
+          </a:extLst>
+        </p:spPr>
+      </p:pic>
+      <p:sp>
+        <p:nvSpPr>
+          <p:cNvPr id="5" name="TextBox 4"/>
+          <p:cNvSpPr txBox="1"/>
+          <p:nvPr/>
+        </p:nvSpPr>
+        <p:spPr>
+          <a:xfrm>
+            <a:off x="885567" y="267771"/>
+            <a:ext cx="2087099" cy="369332"/>
+          </a:xfrm>
+          <a:prstGeom prst="rect">
+            <a:avLst/>
+          </a:prstGeom>
+          <a:noFill/>
+        </p:spPr>
+        <p:txBody>
+          <a:bodyPr wrap="square" rtlCol="0">
+            <a:spAutoFit/>
+          </a:bodyPr>
+          <a:lstStyle/>
+          <a:p>
+            <a:pPr algn="ctr"/>
+            <a:r>
+              <a:rPr lang="en-US" dirty="0" smtClean="0"/>
+              <a:t>Cape. Vs. Other</a:t>
+            </a:r>
+            <a:endParaRPr lang="en-US" dirty="0"/>
+          </a:p>
+        </p:txBody>
+      </p:sp>
+      <p:sp>
+        <p:nvSpPr>
+          <p:cNvPr id="11" name="TextBox 10"/>
+          <p:cNvSpPr txBox="1"/>
+          <p:nvPr/>
+        </p:nvSpPr>
+        <p:spPr>
+          <a:xfrm>
+            <a:off x="788843" y="4485138"/>
+            <a:ext cx="2087099" cy="369332"/>
+          </a:xfrm>
+          <a:prstGeom prst="rect">
+            <a:avLst/>
+          </a:prstGeom>
+          <a:noFill/>
+        </p:spPr>
+        <p:txBody>
+          <a:bodyPr wrap="square" rtlCol="0">
+            <a:spAutoFit/>
+          </a:bodyPr>
+          <a:lstStyle/>
+          <a:p>
+            <a:pPr algn="ctr"/>
+            <a:r>
+              <a:rPr lang="en-US" dirty="0" smtClean="0"/>
+              <a:t>Other Vs. None</a:t>
+            </a:r>
+            <a:endParaRPr lang="en-US" dirty="0"/>
+          </a:p>
+        </p:txBody>
+      </p:sp>
+      <p:sp>
+        <p:nvSpPr>
+          <p:cNvPr id="6" name="Rectangle 5"/>
+          <p:cNvSpPr/>
+          <p:nvPr/>
+        </p:nvSpPr>
+        <p:spPr>
+          <a:xfrm>
+            <a:off x="1144542" y="2343788"/>
+            <a:ext cx="1569148" cy="369332"/>
+          </a:xfrm>
+          <a:prstGeom prst="rect">
+            <a:avLst/>
+          </a:prstGeom>
+        </p:spPr>
+        <p:txBody>
+          <a:bodyPr wrap="none">
+            <a:spAutoFit/>
+          </a:bodyPr>
+          <a:lstStyle/>
+          <a:p>
+            <a:pPr algn="ctr"/>
+            <a:r>
+              <a:rPr lang="en-US" dirty="0" smtClean="0"/>
+              <a:t>Cape. Vs. none</a:t>
+            </a:r>
+            <a:endParaRPr lang="en-US" dirty="0"/>
+          </a:p>
+        </p:txBody>
+      </p:sp>
+      <p:pic>
+        <p:nvPicPr>
+          <p:cNvPr id="1031" name="Picture 7"/>
+          <p:cNvPicPr>
+            <a:picLocks noChangeAspect="1" noChangeArrowheads="1"/>
+          </p:cNvPicPr>
+          <p:nvPr/>
+        </p:nvPicPr>
+        <p:blipFill rotWithShape="1">
+          <a:blip r:embed="rId5">
+            <a:extLst>
+              <a:ext uri="{28A0092B-C50C-407E-A947-70E740481C1C}">
+                <a14:useLocalDpi xmlns:a14="http://schemas.microsoft.com/office/drawing/2010/main" val="0"/>
+              </a:ext>
+            </a:extLst>
+          </a:blip>
+          <a:srcRect t="16486"/>
+          <a:stretch/>
+        </p:blipFill>
+        <p:spPr bwMode="auto">
+          <a:xfrm>
+            <a:off x="3344099" y="4889106"/>
+            <a:ext cx="3148708" cy="1790858"/>
+          </a:xfrm>
+          <a:prstGeom prst="rect">
+            <a:avLst/>
+          </a:prstGeom>
+          <a:noFill/>
+          <a:ln>
+            <a:noFill/>
+          </a:ln>
+          <a:extLst>
+            <a:ext uri="{909E8E84-426E-40DD-AFC4-6F175D3DCCD1}">
+              <a14:hiddenFill xmlns:a14="http://schemas.microsoft.com/office/drawing/2010/main">
+                <a:solidFill>
+                  <a:schemeClr val="accent1"/>
+                </a:solidFill>
+              </a14:hiddenFill>
+            </a:ext>
+            <a:ext uri="{91240B29-F687-4F45-9708-019B960494DF}">
+              <a14:hiddenLine xmlns:a14="http://schemas.microsoft.com/office/drawing/2010/main" w="9525">
+                <a:solidFill>
+                  <a:schemeClr val="tx1"/>
+                </a:solidFill>
+                <a:miter lim="800000"/>
+                <a:headEnd/>
+                <a:tailEnd/>
+              </a14:hiddenLine>
+            </a:ext>
+          </a:extLst>
+        </p:spPr>
+      </p:pic>
+      <p:pic>
+        <p:nvPicPr>
+          <p:cNvPr id="1032" name="Picture 8"/>
+          <p:cNvPicPr>
+            <a:picLocks noChangeAspect="1" noChangeArrowheads="1"/>
+          </p:cNvPicPr>
+          <p:nvPr/>
+        </p:nvPicPr>
+        <p:blipFill rotWithShape="1">
+          <a:blip r:embed="rId6">
+            <a:extLst>
+              <a:ext uri="{28A0092B-C50C-407E-A947-70E740481C1C}">
+                <a14:useLocalDpi xmlns:a14="http://schemas.microsoft.com/office/drawing/2010/main" val="0"/>
+              </a:ext>
+            </a:extLst>
+          </a:blip>
+          <a:srcRect t="13493"/>
+          <a:stretch/>
+        </p:blipFill>
+        <p:spPr bwMode="auto">
+          <a:xfrm>
+            <a:off x="3358971" y="2678484"/>
+            <a:ext cx="3133836" cy="1705790"/>
+          </a:xfrm>
+          <a:prstGeom prst="rect">
+            <a:avLst/>
+          </a:prstGeom>
+          <a:noFill/>
+          <a:ln>
+            <a:noFill/>
+          </a:ln>
+          <a:extLst>
+            <a:ext uri="{909E8E84-426E-40DD-AFC4-6F175D3DCCD1}">
+              <a14:hiddenFill xmlns:a14="http://schemas.microsoft.com/office/drawing/2010/main">
+                <a:solidFill>
+                  <a:schemeClr val="accent1"/>
+                </a:solidFill>
+              </a14:hiddenFill>
+            </a:ext>
+            <a:ext uri="{91240B29-F687-4F45-9708-019B960494DF}">
+              <a14:hiddenLine xmlns:a14="http://schemas.microsoft.com/office/drawing/2010/main" w="9525">
+                <a:solidFill>
+                  <a:schemeClr val="tx1"/>
+                </a:solidFill>
+                <a:miter lim="800000"/>
+                <a:headEnd/>
+                <a:tailEnd/>
+              </a14:hiddenLine>
+            </a:ext>
+          </a:extLst>
+        </p:spPr>
+      </p:pic>
+      <p:pic>
+        <p:nvPicPr>
+          <p:cNvPr id="1033" name="Picture 9"/>
+          <p:cNvPicPr>
+            <a:picLocks noChangeAspect="1" noChangeArrowheads="1"/>
+          </p:cNvPicPr>
+          <p:nvPr/>
+        </p:nvPicPr>
+        <p:blipFill rotWithShape="1">
+          <a:blip r:embed="rId7">
+            <a:extLst>
+              <a:ext uri="{28A0092B-C50C-407E-A947-70E740481C1C}">
+                <a14:useLocalDpi xmlns:a14="http://schemas.microsoft.com/office/drawing/2010/main" val="0"/>
+              </a:ext>
+            </a:extLst>
+          </a:blip>
+          <a:srcRect t="12468"/>
+          <a:stretch/>
+        </p:blipFill>
+        <p:spPr bwMode="auto">
+          <a:xfrm>
+            <a:off x="3358971" y="583373"/>
+            <a:ext cx="3010819" cy="1676400"/>
+          </a:xfrm>
+          <a:prstGeom prst="rect">
+            <a:avLst/>
+          </a:prstGeom>
+          <a:noFill/>
+          <a:ln>
+            <a:noFill/>
+          </a:ln>
+          <a:extLst>
+            <a:ext uri="{909E8E84-426E-40DD-AFC4-6F175D3DCCD1}">
+              <a14:hiddenFill xmlns:a14="http://schemas.microsoft.com/office/drawing/2010/main">
+                <a:solidFill>
+                  <a:schemeClr val="accent1"/>
+                </a:solidFill>
+              </a14:hiddenFill>
+            </a:ext>
+            <a:ext uri="{91240B29-F687-4F45-9708-019B960494DF}">
+              <a14:hiddenLine xmlns:a14="http://schemas.microsoft.com/office/drawing/2010/main" w="9525">
+                <a:solidFill>
+                  <a:schemeClr val="tx1"/>
+                </a:solidFill>
+                <a:miter lim="800000"/>
+                <a:headEnd/>
+                <a:tailEnd/>
+              </a14:hiddenLine>
+            </a:ext>
+          </a:extLst>
+        </p:spPr>
+      </p:pic>
+      <p:sp>
+        <p:nvSpPr>
+          <p:cNvPr id="16" name="TextBox 15"/>
+          <p:cNvSpPr txBox="1"/>
+          <p:nvPr/>
+        </p:nvSpPr>
+        <p:spPr>
+          <a:xfrm>
+            <a:off x="3957899" y="223110"/>
+            <a:ext cx="2087099" cy="369332"/>
+          </a:xfrm>
+          <a:prstGeom prst="rect">
+            <a:avLst/>
+          </a:prstGeom>
+          <a:noFill/>
+        </p:spPr>
+        <p:txBody>
+          <a:bodyPr wrap="square" rtlCol="0">
+            <a:spAutoFit/>
+          </a:bodyPr>
+          <a:lstStyle/>
+          <a:p>
+            <a:pPr algn="ctr"/>
+            <a:r>
+              <a:rPr lang="en-US" dirty="0" smtClean="0"/>
+              <a:t>Cape. Vs. Other</a:t>
+            </a:r>
+            <a:endParaRPr lang="en-US" dirty="0"/>
+          </a:p>
+        </p:txBody>
+      </p:sp>
+      <p:sp>
+        <p:nvSpPr>
+          <p:cNvPr id="17" name="Rectangle 16"/>
+          <p:cNvSpPr/>
+          <p:nvPr/>
+        </p:nvSpPr>
+        <p:spPr>
+          <a:xfrm>
+            <a:off x="4216875" y="2343788"/>
+            <a:ext cx="1569148" cy="369332"/>
+          </a:xfrm>
+          <a:prstGeom prst="rect">
+            <a:avLst/>
+          </a:prstGeom>
+        </p:spPr>
+        <p:txBody>
+          <a:bodyPr wrap="none">
+            <a:spAutoFit/>
+          </a:bodyPr>
+          <a:lstStyle/>
+          <a:p>
+            <a:pPr algn="ctr"/>
+            <a:r>
+              <a:rPr lang="en-US" dirty="0" smtClean="0"/>
+              <a:t>Cape. Vs. none</a:t>
+            </a:r>
+            <a:endParaRPr lang="en-US" dirty="0"/>
+          </a:p>
+        </p:txBody>
+      </p:sp>
+      <p:sp>
+        <p:nvSpPr>
+          <p:cNvPr id="18" name="TextBox 17"/>
+          <p:cNvSpPr txBox="1"/>
+          <p:nvPr/>
+        </p:nvSpPr>
+        <p:spPr>
+          <a:xfrm>
+            <a:off x="3957899" y="4519774"/>
+            <a:ext cx="2087099" cy="369332"/>
+          </a:xfrm>
+          <a:prstGeom prst="rect">
+            <a:avLst/>
+          </a:prstGeom>
+          <a:noFill/>
+        </p:spPr>
+        <p:txBody>
+          <a:bodyPr wrap="square" rtlCol="0">
+            <a:spAutoFit/>
+          </a:bodyPr>
+          <a:lstStyle/>
+          <a:p>
+            <a:pPr algn="ctr"/>
+            <a:r>
+              <a:rPr lang="en-US" dirty="0" smtClean="0"/>
+              <a:t>Other Vs. None</a:t>
+            </a:r>
+            <a:endParaRPr lang="en-US" dirty="0"/>
+          </a:p>
+        </p:txBody>
+      </p:sp>
+    </p:spTree>
+    <p:extLst>
+      <p:ext uri="{BB962C8B-B14F-4D97-AF65-F5344CB8AC3E}">
+        <p14:creationId xmlns:p14="http://schemas.microsoft.com/office/powerpoint/2010/main" val="1705698445"/>
       </p:ext>
     </p:extLst>
   </p:cSld>

</xml_diff>

<commit_message>
Added my silly face to pictues
</commit_message>
<xml_diff>
--- a/mi_picture.pptx
+++ b/mi_picture.pptx
@@ -9,6 +9,7 @@
     <p:sldId id="258" r:id="rId3"/>
     <p:sldId id="259" r:id="rId4"/>
     <p:sldId id="260" r:id="rId5"/>
+    <p:sldId id="261" r:id="rId6"/>
   </p:sldIdLst>
   <p:sldSz cx="9144000" cy="6858000" type="screen4x3"/>
   <p:notesSz cx="6858000" cy="9144000"/>
@@ -291,7 +292,7 @@
           <a:p>
             <a:fld id="{B17F4E78-F3C6-4442-AD2E-D4916562ED88}" type="datetimeFigureOut">
               <a:rPr lang="en-US" smtClean="0"/>
-              <a:t>11/12/2015</a:t>
+              <a:t>11/13/2015</a:t>
             </a:fld>
             <a:endParaRPr lang="en-US"/>
           </a:p>
@@ -461,7 +462,7 @@
           <a:p>
             <a:fld id="{B17F4E78-F3C6-4442-AD2E-D4916562ED88}" type="datetimeFigureOut">
               <a:rPr lang="en-US" smtClean="0"/>
-              <a:t>11/12/2015</a:t>
+              <a:t>11/13/2015</a:t>
             </a:fld>
             <a:endParaRPr lang="en-US"/>
           </a:p>
@@ -641,7 +642,7 @@
           <a:p>
             <a:fld id="{B17F4E78-F3C6-4442-AD2E-D4916562ED88}" type="datetimeFigureOut">
               <a:rPr lang="en-US" smtClean="0"/>
-              <a:t>11/12/2015</a:t>
+              <a:t>11/13/2015</a:t>
             </a:fld>
             <a:endParaRPr lang="en-US"/>
           </a:p>
@@ -811,7 +812,7 @@
           <a:p>
             <a:fld id="{B17F4E78-F3C6-4442-AD2E-D4916562ED88}" type="datetimeFigureOut">
               <a:rPr lang="en-US" smtClean="0"/>
-              <a:t>11/12/2015</a:t>
+              <a:t>11/13/2015</a:t>
             </a:fld>
             <a:endParaRPr lang="en-US"/>
           </a:p>
@@ -1057,7 +1058,7 @@
           <a:p>
             <a:fld id="{B17F4E78-F3C6-4442-AD2E-D4916562ED88}" type="datetimeFigureOut">
               <a:rPr lang="en-US" smtClean="0"/>
-              <a:t>11/12/2015</a:t>
+              <a:t>11/13/2015</a:t>
             </a:fld>
             <a:endParaRPr lang="en-US"/>
           </a:p>
@@ -1345,7 +1346,7 @@
           <a:p>
             <a:fld id="{B17F4E78-F3C6-4442-AD2E-D4916562ED88}" type="datetimeFigureOut">
               <a:rPr lang="en-US" smtClean="0"/>
-              <a:t>11/12/2015</a:t>
+              <a:t>11/13/2015</a:t>
             </a:fld>
             <a:endParaRPr lang="en-US"/>
           </a:p>
@@ -1767,7 +1768,7 @@
           <a:p>
             <a:fld id="{B17F4E78-F3C6-4442-AD2E-D4916562ED88}" type="datetimeFigureOut">
               <a:rPr lang="en-US" smtClean="0"/>
-              <a:t>11/12/2015</a:t>
+              <a:t>11/13/2015</a:t>
             </a:fld>
             <a:endParaRPr lang="en-US"/>
           </a:p>
@@ -1885,7 +1886,7 @@
           <a:p>
             <a:fld id="{B17F4E78-F3C6-4442-AD2E-D4916562ED88}" type="datetimeFigureOut">
               <a:rPr lang="en-US" smtClean="0"/>
-              <a:t>11/12/2015</a:t>
+              <a:t>11/13/2015</a:t>
             </a:fld>
             <a:endParaRPr lang="en-US"/>
           </a:p>
@@ -1980,7 +1981,7 @@
           <a:p>
             <a:fld id="{B17F4E78-F3C6-4442-AD2E-D4916562ED88}" type="datetimeFigureOut">
               <a:rPr lang="en-US" smtClean="0"/>
-              <a:t>11/12/2015</a:t>
+              <a:t>11/13/2015</a:t>
             </a:fld>
             <a:endParaRPr lang="en-US"/>
           </a:p>
@@ -2257,7 +2258,7 @@
           <a:p>
             <a:fld id="{B17F4E78-F3C6-4442-AD2E-D4916562ED88}" type="datetimeFigureOut">
               <a:rPr lang="en-US" smtClean="0"/>
-              <a:t>11/12/2015</a:t>
+              <a:t>11/13/2015</a:t>
             </a:fld>
             <a:endParaRPr lang="en-US"/>
           </a:p>
@@ -2510,7 +2511,7 @@
           <a:p>
             <a:fld id="{B17F4E78-F3C6-4442-AD2E-D4916562ED88}" type="datetimeFigureOut">
               <a:rPr lang="en-US" smtClean="0"/>
-              <a:t>11/12/2015</a:t>
+              <a:t>11/13/2015</a:t>
             </a:fld>
             <a:endParaRPr lang="en-US"/>
           </a:p>
@@ -2723,7 +2724,7 @@
           <a:p>
             <a:fld id="{B17F4E78-F3C6-4442-AD2E-D4916562ED88}" type="datetimeFigureOut">
               <a:rPr lang="en-US" smtClean="0"/>
-              <a:t>11/12/2015</a:t>
+              <a:t>11/13/2015</a:t>
             </a:fld>
             <a:endParaRPr lang="en-US"/>
           </a:p>
@@ -9079,6 +9080,13 @@
   <p:clrMapOvr>
     <a:masterClrMapping/>
   </p:clrMapOvr>
+  <p:timing>
+    <p:tnLst>
+      <p:par>
+        <p:cTn id="1" dur="indefinite" restart="never" nodeType="tmRoot"/>
+      </p:par>
+    </p:tnLst>
+  </p:timing>
 </p:sld>
 </file>
 
@@ -9599,6 +9607,553 @@
     <p:extLst>
       <p:ext uri="{BB962C8B-B14F-4D97-AF65-F5344CB8AC3E}">
         <p14:creationId xmlns:p14="http://schemas.microsoft.com/office/powerpoint/2010/main" val="1705698445"/>
+      </p:ext>
+    </p:extLst>
+  </p:cSld>
+  <p:clrMapOvr>
+    <a:masterClrMapping/>
+  </p:clrMapOvr>
+  <p:timing>
+    <p:tnLst>
+      <p:par>
+        <p:cTn id="1" dur="indefinite" restart="never" nodeType="tmRoot"/>
+      </p:par>
+    </p:tnLst>
+  </p:timing>
+</p:sld>
+</file>
+
+<file path=ppt/slides/slide5.xml><?xml version="1.0" encoding="utf-8"?>
+<p:sld xmlns:a="http://schemas.openxmlformats.org/drawingml/2006/main" xmlns:r="http://schemas.openxmlformats.org/officeDocument/2006/relationships" xmlns:p="http://schemas.openxmlformats.org/presentationml/2006/main">
+  <p:cSld>
+    <p:spTree>
+      <p:nvGrpSpPr>
+        <p:cNvPr id="1" name=""/>
+        <p:cNvGrpSpPr/>
+        <p:nvPr/>
+      </p:nvGrpSpPr>
+      <p:grpSpPr>
+        <a:xfrm>
+          <a:off x="0" y="0"/>
+          <a:ext cx="0" cy="0"/>
+          <a:chOff x="0" y="0"/>
+          <a:chExt cx="0" cy="0"/>
+        </a:xfrm>
+      </p:grpSpPr>
+      <p:cxnSp>
+        <p:nvCxnSpPr>
+          <p:cNvPr id="5" name="Straight Arrow Connector 4"/>
+          <p:cNvCxnSpPr/>
+          <p:nvPr/>
+        </p:nvCxnSpPr>
+        <p:spPr>
+          <a:xfrm flipV="1">
+            <a:off x="1524000" y="762000"/>
+            <a:ext cx="0" cy="3886200"/>
+          </a:xfrm>
+          <a:prstGeom prst="straightConnector1">
+            <a:avLst/>
+          </a:prstGeom>
+          <a:ln>
+            <a:tailEnd type="arrow"/>
+          </a:ln>
+        </p:spPr>
+        <p:style>
+          <a:lnRef idx="1">
+            <a:schemeClr val="accent1"/>
+          </a:lnRef>
+          <a:fillRef idx="0">
+            <a:schemeClr val="accent1"/>
+          </a:fillRef>
+          <a:effectRef idx="0">
+            <a:schemeClr val="accent1"/>
+          </a:effectRef>
+          <a:fontRef idx="minor">
+            <a:schemeClr val="tx1"/>
+          </a:fontRef>
+        </p:style>
+      </p:cxnSp>
+      <p:cxnSp>
+        <p:nvCxnSpPr>
+          <p:cNvPr id="7" name="Straight Connector 6"/>
+          <p:cNvCxnSpPr/>
+          <p:nvPr/>
+        </p:nvCxnSpPr>
+        <p:spPr>
+          <a:xfrm>
+            <a:off x="1524000" y="4648200"/>
+            <a:ext cx="5715000" cy="0"/>
+          </a:xfrm>
+          <a:prstGeom prst="line">
+            <a:avLst/>
+          </a:prstGeom>
+        </p:spPr>
+        <p:style>
+          <a:lnRef idx="1">
+            <a:schemeClr val="accent1"/>
+          </a:lnRef>
+          <a:fillRef idx="0">
+            <a:schemeClr val="accent1"/>
+          </a:fillRef>
+          <a:effectRef idx="0">
+            <a:schemeClr val="accent1"/>
+          </a:effectRef>
+          <a:fontRef idx="minor">
+            <a:schemeClr val="tx1"/>
+          </a:fontRef>
+        </p:style>
+      </p:cxnSp>
+      <p:sp>
+        <p:nvSpPr>
+          <p:cNvPr id="8" name="TextBox 7"/>
+          <p:cNvSpPr txBox="1"/>
+          <p:nvPr/>
+        </p:nvSpPr>
+        <p:spPr>
+          <a:xfrm>
+            <a:off x="533400" y="2679700"/>
+            <a:ext cx="855362" cy="369332"/>
+          </a:xfrm>
+          <a:prstGeom prst="rect">
+            <a:avLst/>
+          </a:prstGeom>
+          <a:noFill/>
+        </p:spPr>
+        <p:txBody>
+          <a:bodyPr wrap="none" rtlCol="0">
+            <a:spAutoFit/>
+          </a:bodyPr>
+          <a:lstStyle/>
+          <a:p>
+            <a:r>
+              <a:rPr lang="en-US" dirty="0" smtClean="0"/>
+              <a:t>Weight</a:t>
+            </a:r>
+            <a:endParaRPr lang="en-US" dirty="0"/>
+          </a:p>
+        </p:txBody>
+      </p:sp>
+      <p:cxnSp>
+        <p:nvCxnSpPr>
+          <p:cNvPr id="10" name="Straight Connector 9"/>
+          <p:cNvCxnSpPr/>
+          <p:nvPr/>
+        </p:nvCxnSpPr>
+        <p:spPr>
+          <a:xfrm>
+            <a:off x="2590800" y="4648200"/>
+            <a:ext cx="0" cy="152400"/>
+          </a:xfrm>
+          <a:prstGeom prst="line">
+            <a:avLst/>
+          </a:prstGeom>
+        </p:spPr>
+        <p:style>
+          <a:lnRef idx="1">
+            <a:schemeClr val="accent1"/>
+          </a:lnRef>
+          <a:fillRef idx="0">
+            <a:schemeClr val="accent1"/>
+          </a:fillRef>
+          <a:effectRef idx="0">
+            <a:schemeClr val="accent1"/>
+          </a:effectRef>
+          <a:fontRef idx="minor">
+            <a:schemeClr val="tx1"/>
+          </a:fontRef>
+        </p:style>
+      </p:cxnSp>
+      <p:sp>
+        <p:nvSpPr>
+          <p:cNvPr id="11" name="TextBox 10"/>
+          <p:cNvSpPr txBox="1"/>
+          <p:nvPr/>
+        </p:nvSpPr>
+        <p:spPr>
+          <a:xfrm>
+            <a:off x="1866900" y="4992132"/>
+            <a:ext cx="1447800" cy="381000"/>
+          </a:xfrm>
+          <a:prstGeom prst="rect">
+            <a:avLst/>
+          </a:prstGeom>
+          <a:noFill/>
+        </p:spPr>
+        <p:txBody>
+          <a:bodyPr wrap="square" rtlCol="0">
+            <a:spAutoFit/>
+          </a:bodyPr>
+          <a:lstStyle/>
+          <a:p>
+            <a:r>
+              <a:rPr lang="en-US" dirty="0" smtClean="0"/>
+              <a:t>Pretreatment</a:t>
+            </a:r>
+            <a:endParaRPr lang="en-US" dirty="0"/>
+          </a:p>
+        </p:txBody>
+      </p:sp>
+      <p:cxnSp>
+        <p:nvCxnSpPr>
+          <p:cNvPr id="15" name="Straight Connector 14"/>
+          <p:cNvCxnSpPr/>
+          <p:nvPr/>
+        </p:nvCxnSpPr>
+        <p:spPr>
+          <a:xfrm>
+            <a:off x="5943600" y="4648200"/>
+            <a:ext cx="0" cy="152400"/>
+          </a:xfrm>
+          <a:prstGeom prst="line">
+            <a:avLst/>
+          </a:prstGeom>
+        </p:spPr>
+        <p:style>
+          <a:lnRef idx="1">
+            <a:schemeClr val="accent1"/>
+          </a:lnRef>
+          <a:fillRef idx="0">
+            <a:schemeClr val="accent1"/>
+          </a:fillRef>
+          <a:effectRef idx="0">
+            <a:schemeClr val="accent1"/>
+          </a:effectRef>
+          <a:fontRef idx="minor">
+            <a:schemeClr val="tx1"/>
+          </a:fontRef>
+        </p:style>
+      </p:cxnSp>
+      <p:sp>
+        <p:nvSpPr>
+          <p:cNvPr id="16" name="TextBox 15"/>
+          <p:cNvSpPr txBox="1"/>
+          <p:nvPr/>
+        </p:nvSpPr>
+        <p:spPr>
+          <a:xfrm>
+            <a:off x="4991100" y="5003800"/>
+            <a:ext cx="1905000" cy="369332"/>
+          </a:xfrm>
+          <a:prstGeom prst="rect">
+            <a:avLst/>
+          </a:prstGeom>
+          <a:noFill/>
+        </p:spPr>
+        <p:txBody>
+          <a:bodyPr wrap="square" rtlCol="0">
+            <a:spAutoFit/>
+          </a:bodyPr>
+          <a:lstStyle/>
+          <a:p>
+            <a:pPr algn="ctr"/>
+            <a:r>
+              <a:rPr lang="en-US" dirty="0" smtClean="0"/>
+              <a:t>Post treatment</a:t>
+            </a:r>
+            <a:endParaRPr lang="en-US" dirty="0"/>
+          </a:p>
+        </p:txBody>
+      </p:sp>
+      <p:pic>
+        <p:nvPicPr>
+          <p:cNvPr id="1026" name="Picture 2"/>
+          <p:cNvPicPr>
+            <a:picLocks noChangeAspect="1" noChangeArrowheads="1"/>
+          </p:cNvPicPr>
+          <p:nvPr/>
+        </p:nvPicPr>
+        <p:blipFill>
+          <a:blip r:embed="rId2" cstate="print">
+            <a:extLst>
+              <a:ext uri="{28A0092B-C50C-407E-A947-70E740481C1C}">
+                <a14:useLocalDpi xmlns:a14="http://schemas.microsoft.com/office/drawing/2010/main" val="0"/>
+              </a:ext>
+            </a:extLst>
+          </a:blip>
+          <a:srcRect/>
+          <a:stretch>
+            <a:fillRect/>
+          </a:stretch>
+        </p:blipFill>
+        <p:spPr bwMode="auto">
+          <a:xfrm>
+            <a:off x="2045493" y="1893062"/>
+            <a:ext cx="888969" cy="1266328"/>
+          </a:xfrm>
+          <a:prstGeom prst="rect">
+            <a:avLst/>
+          </a:prstGeom>
+          <a:noFill/>
+          <a:ln>
+            <a:noFill/>
+          </a:ln>
+          <a:extLst>
+            <a:ext uri="{909E8E84-426E-40DD-AFC4-6F175D3DCCD1}">
+              <a14:hiddenFill xmlns:a14="http://schemas.microsoft.com/office/drawing/2010/main">
+                <a:solidFill>
+                  <a:schemeClr val="accent1"/>
+                </a:solidFill>
+              </a14:hiddenFill>
+            </a:ext>
+            <a:ext uri="{91240B29-F687-4F45-9708-019B960494DF}">
+              <a14:hiddenLine xmlns:a14="http://schemas.microsoft.com/office/drawing/2010/main" w="9525">
+                <a:solidFill>
+                  <a:schemeClr val="tx1"/>
+                </a:solidFill>
+                <a:miter lim="800000"/>
+                <a:headEnd/>
+                <a:tailEnd/>
+              </a14:hiddenLine>
+            </a:ext>
+          </a:extLst>
+        </p:spPr>
+      </p:pic>
+      <p:pic>
+        <p:nvPicPr>
+          <p:cNvPr id="1027" name="Picture 3"/>
+          <p:cNvPicPr>
+            <a:picLocks noChangeAspect="1" noChangeArrowheads="1"/>
+          </p:cNvPicPr>
+          <p:nvPr/>
+        </p:nvPicPr>
+        <p:blipFill>
+          <a:blip r:embed="rId3" cstate="print">
+            <a:extLst>
+              <a:ext uri="{28A0092B-C50C-407E-A947-70E740481C1C}">
+                <a14:useLocalDpi xmlns:a14="http://schemas.microsoft.com/office/drawing/2010/main" val="0"/>
+              </a:ext>
+            </a:extLst>
+          </a:blip>
+          <a:srcRect/>
+          <a:stretch>
+            <a:fillRect/>
+          </a:stretch>
+        </p:blipFill>
+        <p:spPr bwMode="auto">
+          <a:xfrm>
+            <a:off x="5518150" y="609600"/>
+            <a:ext cx="1308957" cy="1219200"/>
+          </a:xfrm>
+          <a:prstGeom prst="rect">
+            <a:avLst/>
+          </a:prstGeom>
+          <a:noFill/>
+          <a:ln>
+            <a:noFill/>
+          </a:ln>
+          <a:extLst>
+            <a:ext uri="{909E8E84-426E-40DD-AFC4-6F175D3DCCD1}">
+              <a14:hiddenFill xmlns:a14="http://schemas.microsoft.com/office/drawing/2010/main">
+                <a:solidFill>
+                  <a:schemeClr val="accent1"/>
+                </a:solidFill>
+              </a14:hiddenFill>
+            </a:ext>
+            <a:ext uri="{91240B29-F687-4F45-9708-019B960494DF}">
+              <a14:hiddenLine xmlns:a14="http://schemas.microsoft.com/office/drawing/2010/main" w="9525">
+                <a:solidFill>
+                  <a:schemeClr val="tx1"/>
+                </a:solidFill>
+                <a:miter lim="800000"/>
+                <a:headEnd/>
+                <a:tailEnd/>
+              </a14:hiddenLine>
+            </a:ext>
+          </a:extLst>
+        </p:spPr>
+      </p:pic>
+      <p:pic>
+        <p:nvPicPr>
+          <p:cNvPr id="1028" name="Picture 4"/>
+          <p:cNvPicPr>
+            <a:picLocks noChangeAspect="1" noChangeArrowheads="1"/>
+          </p:cNvPicPr>
+          <p:nvPr/>
+        </p:nvPicPr>
+        <p:blipFill rotWithShape="1">
+          <a:blip r:embed="rId4">
+            <a:extLst>
+              <a:ext uri="{28A0092B-C50C-407E-A947-70E740481C1C}">
+                <a14:useLocalDpi xmlns:a14="http://schemas.microsoft.com/office/drawing/2010/main" val="0"/>
+              </a:ext>
+            </a:extLst>
+          </a:blip>
+          <a:srcRect r="12388"/>
+          <a:stretch/>
+        </p:blipFill>
+        <p:spPr bwMode="auto">
+          <a:xfrm>
+            <a:off x="5518150" y="3105666"/>
+            <a:ext cx="1263650" cy="1434178"/>
+          </a:xfrm>
+          <a:prstGeom prst="rect">
+            <a:avLst/>
+          </a:prstGeom>
+          <a:noFill/>
+          <a:ln>
+            <a:noFill/>
+          </a:ln>
+          <a:extLst>
+            <a:ext uri="{909E8E84-426E-40DD-AFC4-6F175D3DCCD1}">
+              <a14:hiddenFill xmlns:a14="http://schemas.microsoft.com/office/drawing/2010/main">
+                <a:solidFill>
+                  <a:schemeClr val="accent1"/>
+                </a:solidFill>
+              </a14:hiddenFill>
+            </a:ext>
+            <a:ext uri="{91240B29-F687-4F45-9708-019B960494DF}">
+              <a14:hiddenLine xmlns:a14="http://schemas.microsoft.com/office/drawing/2010/main" w="9525">
+                <a:solidFill>
+                  <a:schemeClr val="tx1"/>
+                </a:solidFill>
+                <a:miter lim="800000"/>
+                <a:headEnd/>
+                <a:tailEnd/>
+              </a14:hiddenLine>
+            </a:ext>
+          </a:extLst>
+        </p:spPr>
+      </p:pic>
+      <p:cxnSp>
+        <p:nvCxnSpPr>
+          <p:cNvPr id="18" name="Straight Arrow Connector 17"/>
+          <p:cNvCxnSpPr>
+            <a:endCxn id="1027" idx="1"/>
+          </p:cNvCxnSpPr>
+          <p:nvPr/>
+        </p:nvCxnSpPr>
+        <p:spPr>
+          <a:xfrm flipV="1">
+            <a:off x="2934462" y="1219200"/>
+            <a:ext cx="2583688" cy="1460502"/>
+          </a:xfrm>
+          <a:prstGeom prst="straightConnector1">
+            <a:avLst/>
+          </a:prstGeom>
+          <a:ln>
+            <a:solidFill>
+              <a:schemeClr val="accent2"/>
+            </a:solidFill>
+            <a:prstDash val="dashDot"/>
+            <a:tailEnd type="arrow"/>
+          </a:ln>
+        </p:spPr>
+        <p:style>
+          <a:lnRef idx="1">
+            <a:schemeClr val="accent1"/>
+          </a:lnRef>
+          <a:fillRef idx="0">
+            <a:schemeClr val="accent1"/>
+          </a:fillRef>
+          <a:effectRef idx="0">
+            <a:schemeClr val="accent1"/>
+          </a:effectRef>
+          <a:fontRef idx="minor">
+            <a:schemeClr val="tx1"/>
+          </a:fontRef>
+        </p:style>
+      </p:cxnSp>
+      <p:cxnSp>
+        <p:nvCxnSpPr>
+          <p:cNvPr id="20" name="Straight Arrow Connector 19"/>
+          <p:cNvCxnSpPr>
+            <a:endCxn id="1028" idx="1"/>
+          </p:cNvCxnSpPr>
+          <p:nvPr/>
+        </p:nvCxnSpPr>
+        <p:spPr>
+          <a:xfrm>
+            <a:off x="2934462" y="2705100"/>
+            <a:ext cx="2583688" cy="1117655"/>
+          </a:xfrm>
+          <a:prstGeom prst="straightConnector1">
+            <a:avLst/>
+          </a:prstGeom>
+          <a:ln>
+            <a:tailEnd type="arrow"/>
+          </a:ln>
+        </p:spPr>
+        <p:style>
+          <a:lnRef idx="1">
+            <a:schemeClr val="accent1"/>
+          </a:lnRef>
+          <a:fillRef idx="0">
+            <a:schemeClr val="accent1"/>
+          </a:fillRef>
+          <a:effectRef idx="0">
+            <a:schemeClr val="accent1"/>
+          </a:effectRef>
+          <a:fontRef idx="minor">
+            <a:schemeClr val="tx1"/>
+          </a:fontRef>
+        </p:style>
+      </p:cxnSp>
+      <p:sp>
+        <p:nvSpPr>
+          <p:cNvPr id="21" name="TextBox 20"/>
+          <p:cNvSpPr txBox="1"/>
+          <p:nvPr/>
+        </p:nvSpPr>
+        <p:spPr>
+          <a:xfrm>
+            <a:off x="2787650" y="928164"/>
+            <a:ext cx="2730500" cy="646331"/>
+          </a:xfrm>
+          <a:prstGeom prst="rect">
+            <a:avLst/>
+          </a:prstGeom>
+          <a:noFill/>
+        </p:spPr>
+        <p:txBody>
+          <a:bodyPr wrap="square" rtlCol="0">
+            <a:spAutoFit/>
+          </a:bodyPr>
+          <a:lstStyle/>
+          <a:p>
+            <a:pPr algn="ctr"/>
+            <a:r>
+              <a:rPr lang="en-US" dirty="0" smtClean="0"/>
+              <a:t>Placebo: Counterfactual (unobserved)</a:t>
+            </a:r>
+            <a:endParaRPr lang="en-US" dirty="0"/>
+          </a:p>
+        </p:txBody>
+      </p:sp>
+      <p:sp>
+        <p:nvSpPr>
+          <p:cNvPr id="22" name="TextBox 21"/>
+          <p:cNvSpPr txBox="1"/>
+          <p:nvPr/>
+        </p:nvSpPr>
+        <p:spPr>
+          <a:xfrm>
+            <a:off x="3048571" y="3625334"/>
+            <a:ext cx="2197100" cy="369332"/>
+          </a:xfrm>
+          <a:prstGeom prst="rect">
+            <a:avLst/>
+          </a:prstGeom>
+          <a:noFill/>
+        </p:spPr>
+        <p:txBody>
+          <a:bodyPr wrap="square" rtlCol="0">
+            <a:spAutoFit/>
+          </a:bodyPr>
+          <a:lstStyle/>
+          <a:p>
+            <a:pPr algn="ctr"/>
+            <a:r>
+              <a:rPr lang="en-US" dirty="0" smtClean="0"/>
+              <a:t>Drug: Observed</a:t>
+            </a:r>
+            <a:endParaRPr lang="en-US" dirty="0"/>
+          </a:p>
+        </p:txBody>
+      </p:sp>
+    </p:spTree>
+    <p:extLst>
+      <p:ext uri="{BB962C8B-B14F-4D97-AF65-F5344CB8AC3E}">
+        <p14:creationId xmlns:p14="http://schemas.microsoft.com/office/powerpoint/2010/main" val="2953971539"/>
       </p:ext>
     </p:extLst>
   </p:cSld>

</xml_diff>

<commit_message>
added hazard pic to the ppt file
</commit_message>
<xml_diff>
--- a/mi_picture.pptx
+++ b/mi_picture.pptx
@@ -10,6 +10,7 @@
     <p:sldId id="259" r:id="rId4"/>
     <p:sldId id="260" r:id="rId5"/>
     <p:sldId id="261" r:id="rId6"/>
+    <p:sldId id="262" r:id="rId7"/>
   </p:sldIdLst>
   <p:sldSz cx="9144000" cy="6858000" type="screen4x3"/>
   <p:notesSz cx="6858000" cy="9144000"/>
@@ -292,7 +293,7 @@
           <a:p>
             <a:fld id="{B17F4E78-F3C6-4442-AD2E-D4916562ED88}" type="datetimeFigureOut">
               <a:rPr lang="en-US" smtClean="0"/>
-              <a:t>11/13/2015</a:t>
+              <a:t>11/14/2015</a:t>
             </a:fld>
             <a:endParaRPr lang="en-US"/>
           </a:p>
@@ -462,7 +463,7 @@
           <a:p>
             <a:fld id="{B17F4E78-F3C6-4442-AD2E-D4916562ED88}" type="datetimeFigureOut">
               <a:rPr lang="en-US" smtClean="0"/>
-              <a:t>11/13/2015</a:t>
+              <a:t>11/14/2015</a:t>
             </a:fld>
             <a:endParaRPr lang="en-US"/>
           </a:p>
@@ -642,7 +643,7 @@
           <a:p>
             <a:fld id="{B17F4E78-F3C6-4442-AD2E-D4916562ED88}" type="datetimeFigureOut">
               <a:rPr lang="en-US" smtClean="0"/>
-              <a:t>11/13/2015</a:t>
+              <a:t>11/14/2015</a:t>
             </a:fld>
             <a:endParaRPr lang="en-US"/>
           </a:p>
@@ -812,7 +813,7 @@
           <a:p>
             <a:fld id="{B17F4E78-F3C6-4442-AD2E-D4916562ED88}" type="datetimeFigureOut">
               <a:rPr lang="en-US" smtClean="0"/>
-              <a:t>11/13/2015</a:t>
+              <a:t>11/14/2015</a:t>
             </a:fld>
             <a:endParaRPr lang="en-US"/>
           </a:p>
@@ -1058,7 +1059,7 @@
           <a:p>
             <a:fld id="{B17F4E78-F3C6-4442-AD2E-D4916562ED88}" type="datetimeFigureOut">
               <a:rPr lang="en-US" smtClean="0"/>
-              <a:t>11/13/2015</a:t>
+              <a:t>11/14/2015</a:t>
             </a:fld>
             <a:endParaRPr lang="en-US"/>
           </a:p>
@@ -1346,7 +1347,7 @@
           <a:p>
             <a:fld id="{B17F4E78-F3C6-4442-AD2E-D4916562ED88}" type="datetimeFigureOut">
               <a:rPr lang="en-US" smtClean="0"/>
-              <a:t>11/13/2015</a:t>
+              <a:t>11/14/2015</a:t>
             </a:fld>
             <a:endParaRPr lang="en-US"/>
           </a:p>
@@ -1768,7 +1769,7 @@
           <a:p>
             <a:fld id="{B17F4E78-F3C6-4442-AD2E-D4916562ED88}" type="datetimeFigureOut">
               <a:rPr lang="en-US" smtClean="0"/>
-              <a:t>11/13/2015</a:t>
+              <a:t>11/14/2015</a:t>
             </a:fld>
             <a:endParaRPr lang="en-US"/>
           </a:p>
@@ -1886,7 +1887,7 @@
           <a:p>
             <a:fld id="{B17F4E78-F3C6-4442-AD2E-D4916562ED88}" type="datetimeFigureOut">
               <a:rPr lang="en-US" smtClean="0"/>
-              <a:t>11/13/2015</a:t>
+              <a:t>11/14/2015</a:t>
             </a:fld>
             <a:endParaRPr lang="en-US"/>
           </a:p>
@@ -1981,7 +1982,7 @@
           <a:p>
             <a:fld id="{B17F4E78-F3C6-4442-AD2E-D4916562ED88}" type="datetimeFigureOut">
               <a:rPr lang="en-US" smtClean="0"/>
-              <a:t>11/13/2015</a:t>
+              <a:t>11/14/2015</a:t>
             </a:fld>
             <a:endParaRPr lang="en-US"/>
           </a:p>
@@ -2258,7 +2259,7 @@
           <a:p>
             <a:fld id="{B17F4E78-F3C6-4442-AD2E-D4916562ED88}" type="datetimeFigureOut">
               <a:rPr lang="en-US" smtClean="0"/>
-              <a:t>11/13/2015</a:t>
+              <a:t>11/14/2015</a:t>
             </a:fld>
             <a:endParaRPr lang="en-US"/>
           </a:p>
@@ -2511,7 +2512,7 @@
           <a:p>
             <a:fld id="{B17F4E78-F3C6-4442-AD2E-D4916562ED88}" type="datetimeFigureOut">
               <a:rPr lang="en-US" smtClean="0"/>
-              <a:t>11/13/2015</a:t>
+              <a:t>11/14/2015</a:t>
             </a:fld>
             <a:endParaRPr lang="en-US"/>
           </a:p>
@@ -2724,7 +2725,7 @@
           <a:p>
             <a:fld id="{B17F4E78-F3C6-4442-AD2E-D4916562ED88}" type="datetimeFigureOut">
               <a:rPr lang="en-US" smtClean="0"/>
-              <a:t>11/13/2015</a:t>
+              <a:t>11/14/2015</a:t>
             </a:fld>
             <a:endParaRPr lang="en-US"/>
           </a:p>
@@ -10170,6 +10171,312 @@
 </p:sld>
 </file>
 
+<file path=ppt/slides/slide6.xml><?xml version="1.0" encoding="utf-8"?>
+<p:sld xmlns:a="http://schemas.openxmlformats.org/drawingml/2006/main" xmlns:r="http://schemas.openxmlformats.org/officeDocument/2006/relationships" xmlns:p="http://schemas.openxmlformats.org/presentationml/2006/main">
+  <p:cSld>
+    <p:spTree>
+      <p:nvGrpSpPr>
+        <p:cNvPr id="1" name=""/>
+        <p:cNvGrpSpPr/>
+        <p:nvPr/>
+      </p:nvGrpSpPr>
+      <p:grpSpPr>
+        <a:xfrm>
+          <a:off x="0" y="0"/>
+          <a:ext cx="0" cy="0"/>
+          <a:chOff x="0" y="0"/>
+          <a:chExt cx="0" cy="0"/>
+        </a:xfrm>
+      </p:grpSpPr>
+      <p:pic>
+        <p:nvPicPr>
+          <p:cNvPr id="1030" name="Picture 6"/>
+          <p:cNvPicPr>
+            <a:picLocks noChangeAspect="1" noChangeArrowheads="1"/>
+          </p:cNvPicPr>
+          <p:nvPr/>
+        </p:nvPicPr>
+        <p:blipFill rotWithShape="1">
+          <a:blip r:embed="rId2">
+            <a:extLst>
+              <a:ext uri="{28A0092B-C50C-407E-A947-70E740481C1C}">
+                <a14:useLocalDpi xmlns:a14="http://schemas.microsoft.com/office/drawing/2010/main" val="0"/>
+              </a:ext>
+            </a:extLst>
+          </a:blip>
+          <a:srcRect l="5251" b="4016"/>
+          <a:stretch/>
+        </p:blipFill>
+        <p:spPr bwMode="auto">
+          <a:xfrm>
+            <a:off x="1816100" y="838201"/>
+            <a:ext cx="5270500" cy="3441700"/>
+          </a:xfrm>
+          <a:prstGeom prst="rect">
+            <a:avLst/>
+          </a:prstGeom>
+          <a:noFill/>
+          <a:ln>
+            <a:noFill/>
+          </a:ln>
+          <a:extLst>
+            <a:ext uri="{909E8E84-426E-40DD-AFC4-6F175D3DCCD1}">
+              <a14:hiddenFill xmlns:a14="http://schemas.microsoft.com/office/drawing/2010/main">
+                <a:solidFill>
+                  <a:schemeClr val="accent1"/>
+                </a:solidFill>
+              </a14:hiddenFill>
+            </a:ext>
+            <a:ext uri="{91240B29-F687-4F45-9708-019B960494DF}">
+              <a14:hiddenLine xmlns:a14="http://schemas.microsoft.com/office/drawing/2010/main" w="9525">
+                <a:solidFill>
+                  <a:schemeClr val="tx1"/>
+                </a:solidFill>
+                <a:miter lim="800000"/>
+                <a:headEnd/>
+                <a:tailEnd/>
+              </a14:hiddenLine>
+            </a:ext>
+          </a:extLst>
+        </p:spPr>
+      </p:pic>
+      <p:sp>
+        <p:nvSpPr>
+          <p:cNvPr id="6" name="TextBox 5"/>
+          <p:cNvSpPr txBox="1"/>
+          <p:nvPr/>
+        </p:nvSpPr>
+        <p:spPr>
+          <a:xfrm>
+            <a:off x="3848100" y="2209800"/>
+            <a:ext cx="1219200" cy="369332"/>
+          </a:xfrm>
+          <a:prstGeom prst="rect">
+            <a:avLst/>
+          </a:prstGeom>
+          <a:noFill/>
+        </p:spPr>
+        <p:txBody>
+          <a:bodyPr wrap="square" rtlCol="0">
+            <a:spAutoFit/>
+          </a:bodyPr>
+          <a:lstStyle/>
+          <a:p>
+            <a:pPr algn="ctr"/>
+            <a:r>
+              <a:rPr lang="en-US" dirty="0" smtClean="0">
+                <a:solidFill>
+                  <a:srgbClr val="0070C0"/>
+                </a:solidFill>
+              </a:rPr>
+              <a:t>Bathtub</a:t>
+            </a:r>
+            <a:endParaRPr lang="en-US" dirty="0">
+              <a:solidFill>
+                <a:srgbClr val="0070C0"/>
+              </a:solidFill>
+            </a:endParaRPr>
+          </a:p>
+        </p:txBody>
+      </p:sp>
+      <p:sp>
+        <p:nvSpPr>
+          <p:cNvPr id="11" name="TextBox 10"/>
+          <p:cNvSpPr txBox="1"/>
+          <p:nvPr/>
+        </p:nvSpPr>
+        <p:spPr>
+          <a:xfrm>
+            <a:off x="3848100" y="2971800"/>
+            <a:ext cx="1219200" cy="369332"/>
+          </a:xfrm>
+          <a:prstGeom prst="rect">
+            <a:avLst/>
+          </a:prstGeom>
+          <a:noFill/>
+        </p:spPr>
+        <p:txBody>
+          <a:bodyPr wrap="square" rtlCol="0">
+            <a:spAutoFit/>
+          </a:bodyPr>
+          <a:lstStyle/>
+          <a:p>
+            <a:pPr algn="ctr"/>
+            <a:r>
+              <a:rPr lang="en-US" dirty="0" smtClean="0">
+                <a:solidFill>
+                  <a:srgbClr val="00B050"/>
+                </a:solidFill>
+              </a:rPr>
+              <a:t>Constant</a:t>
+            </a:r>
+            <a:endParaRPr lang="en-US" dirty="0">
+              <a:solidFill>
+                <a:srgbClr val="00B050"/>
+              </a:solidFill>
+            </a:endParaRPr>
+          </a:p>
+        </p:txBody>
+      </p:sp>
+      <p:sp>
+        <p:nvSpPr>
+          <p:cNvPr id="7" name="TextBox 6"/>
+          <p:cNvSpPr txBox="1"/>
+          <p:nvPr/>
+        </p:nvSpPr>
+        <p:spPr>
+          <a:xfrm>
+            <a:off x="2197100" y="2653268"/>
+            <a:ext cx="838200" cy="369332"/>
+          </a:xfrm>
+          <a:prstGeom prst="rect">
+            <a:avLst/>
+          </a:prstGeom>
+          <a:noFill/>
+        </p:spPr>
+        <p:txBody>
+          <a:bodyPr wrap="square" rtlCol="0">
+            <a:spAutoFit/>
+          </a:bodyPr>
+          <a:lstStyle/>
+          <a:p>
+            <a:pPr algn="ctr"/>
+            <a:r>
+              <a:rPr lang="en-US" dirty="0" smtClean="0">
+                <a:solidFill>
+                  <a:srgbClr val="C00000"/>
+                </a:solidFill>
+              </a:rPr>
+              <a:t>Early</a:t>
+            </a:r>
+            <a:endParaRPr lang="en-US" dirty="0">
+              <a:solidFill>
+                <a:srgbClr val="C00000"/>
+              </a:solidFill>
+            </a:endParaRPr>
+          </a:p>
+        </p:txBody>
+      </p:sp>
+      <p:sp>
+        <p:nvSpPr>
+          <p:cNvPr id="13" name="TextBox 12"/>
+          <p:cNvSpPr txBox="1"/>
+          <p:nvPr/>
+        </p:nvSpPr>
+        <p:spPr>
+          <a:xfrm>
+            <a:off x="6324600" y="2615168"/>
+            <a:ext cx="838200" cy="369332"/>
+          </a:xfrm>
+          <a:prstGeom prst="rect">
+            <a:avLst/>
+          </a:prstGeom>
+          <a:noFill/>
+        </p:spPr>
+        <p:txBody>
+          <a:bodyPr wrap="square" rtlCol="0">
+            <a:spAutoFit/>
+          </a:bodyPr>
+          <a:lstStyle/>
+          <a:p>
+            <a:pPr algn="ctr"/>
+            <a:r>
+              <a:rPr lang="en-US" dirty="0" smtClean="0">
+                <a:solidFill>
+                  <a:srgbClr val="FFC000"/>
+                </a:solidFill>
+              </a:rPr>
+              <a:t>Late</a:t>
+            </a:r>
+            <a:endParaRPr lang="en-US" dirty="0">
+              <a:solidFill>
+                <a:srgbClr val="FFC000"/>
+              </a:solidFill>
+            </a:endParaRPr>
+          </a:p>
+        </p:txBody>
+      </p:sp>
+      <p:sp>
+        <p:nvSpPr>
+          <p:cNvPr id="8" name="TextBox 7"/>
+          <p:cNvSpPr txBox="1"/>
+          <p:nvPr/>
+        </p:nvSpPr>
+        <p:spPr>
+          <a:xfrm>
+            <a:off x="3549650" y="4279901"/>
+            <a:ext cx="1828800" cy="369332"/>
+          </a:xfrm>
+          <a:prstGeom prst="rect">
+            <a:avLst/>
+          </a:prstGeom>
+          <a:noFill/>
+        </p:spPr>
+        <p:txBody>
+          <a:bodyPr wrap="square" rtlCol="0">
+            <a:spAutoFit/>
+          </a:bodyPr>
+          <a:lstStyle/>
+          <a:p>
+            <a:pPr algn="ctr"/>
+            <a:r>
+              <a:rPr lang="en-US" dirty="0" smtClean="0"/>
+              <a:t>Time</a:t>
+            </a:r>
+            <a:endParaRPr lang="en-US" dirty="0"/>
+          </a:p>
+        </p:txBody>
+      </p:sp>
+      <p:sp>
+        <p:nvSpPr>
+          <p:cNvPr id="9" name="TextBox 8"/>
+          <p:cNvSpPr txBox="1"/>
+          <p:nvPr/>
+        </p:nvSpPr>
+        <p:spPr>
+          <a:xfrm rot="16200000">
+            <a:off x="1263134" y="2374385"/>
+            <a:ext cx="838200" cy="369332"/>
+          </a:xfrm>
+          <a:prstGeom prst="rect">
+            <a:avLst/>
+          </a:prstGeom>
+          <a:noFill/>
+        </p:spPr>
+        <p:txBody>
+          <a:bodyPr wrap="square" rtlCol="0">
+            <a:spAutoFit/>
+          </a:bodyPr>
+          <a:lstStyle/>
+          <a:p>
+            <a:r>
+              <a:rPr lang="en-US" dirty="0" smtClean="0"/>
+              <a:t>Hazard</a:t>
+            </a:r>
+            <a:endParaRPr lang="en-US" dirty="0"/>
+          </a:p>
+        </p:txBody>
+      </p:sp>
+    </p:spTree>
+    <p:extLst>
+      <p:ext uri="{BB962C8B-B14F-4D97-AF65-F5344CB8AC3E}">
+        <p14:creationId xmlns:p14="http://schemas.microsoft.com/office/powerpoint/2010/main" val="3366388535"/>
+      </p:ext>
+    </p:extLst>
+  </p:cSld>
+  <p:clrMapOvr>
+    <a:masterClrMapping/>
+  </p:clrMapOvr>
+  <p:timing>
+    <p:tnLst>
+      <p:par>
+        <p:cTn id="1" dur="indefinite" restart="never" nodeType="tmRoot"/>
+      </p:par>
+    </p:tnLst>
+  </p:timing>
+</p:sld>
+</file>
+
 <file path=ppt/theme/theme1.xml><?xml version="1.0" encoding="utf-8"?>
 <a:theme xmlns:a="http://schemas.openxmlformats.org/drawingml/2006/main" name="Office Theme">
   <a:themeElements>

</xml_diff>

<commit_message>
updated mi examp picture
</commit_message>
<xml_diff>
--- a/mi_picture.pptx
+++ b/mi_picture.pptx
@@ -293,7 +293,7 @@
           <a:p>
             <a:fld id="{B17F4E78-F3C6-4442-AD2E-D4916562ED88}" type="datetimeFigureOut">
               <a:rPr lang="en-US" smtClean="0"/>
-              <a:t>11/14/2015</a:t>
+              <a:t>11/15/2015</a:t>
             </a:fld>
             <a:endParaRPr lang="en-US"/>
           </a:p>
@@ -463,7 +463,7 @@
           <a:p>
             <a:fld id="{B17F4E78-F3C6-4442-AD2E-D4916562ED88}" type="datetimeFigureOut">
               <a:rPr lang="en-US" smtClean="0"/>
-              <a:t>11/14/2015</a:t>
+              <a:t>11/15/2015</a:t>
             </a:fld>
             <a:endParaRPr lang="en-US"/>
           </a:p>
@@ -643,7 +643,7 @@
           <a:p>
             <a:fld id="{B17F4E78-F3C6-4442-AD2E-D4916562ED88}" type="datetimeFigureOut">
               <a:rPr lang="en-US" smtClean="0"/>
-              <a:t>11/14/2015</a:t>
+              <a:t>11/15/2015</a:t>
             </a:fld>
             <a:endParaRPr lang="en-US"/>
           </a:p>
@@ -813,7 +813,7 @@
           <a:p>
             <a:fld id="{B17F4E78-F3C6-4442-AD2E-D4916562ED88}" type="datetimeFigureOut">
               <a:rPr lang="en-US" smtClean="0"/>
-              <a:t>11/14/2015</a:t>
+              <a:t>11/15/2015</a:t>
             </a:fld>
             <a:endParaRPr lang="en-US"/>
           </a:p>
@@ -1059,7 +1059,7 @@
           <a:p>
             <a:fld id="{B17F4E78-F3C6-4442-AD2E-D4916562ED88}" type="datetimeFigureOut">
               <a:rPr lang="en-US" smtClean="0"/>
-              <a:t>11/14/2015</a:t>
+              <a:t>11/15/2015</a:t>
             </a:fld>
             <a:endParaRPr lang="en-US"/>
           </a:p>
@@ -1347,7 +1347,7 @@
           <a:p>
             <a:fld id="{B17F4E78-F3C6-4442-AD2E-D4916562ED88}" type="datetimeFigureOut">
               <a:rPr lang="en-US" smtClean="0"/>
-              <a:t>11/14/2015</a:t>
+              <a:t>11/15/2015</a:t>
             </a:fld>
             <a:endParaRPr lang="en-US"/>
           </a:p>
@@ -1769,7 +1769,7 @@
           <a:p>
             <a:fld id="{B17F4E78-F3C6-4442-AD2E-D4916562ED88}" type="datetimeFigureOut">
               <a:rPr lang="en-US" smtClean="0"/>
-              <a:t>11/14/2015</a:t>
+              <a:t>11/15/2015</a:t>
             </a:fld>
             <a:endParaRPr lang="en-US"/>
           </a:p>
@@ -1887,7 +1887,7 @@
           <a:p>
             <a:fld id="{B17F4E78-F3C6-4442-AD2E-D4916562ED88}" type="datetimeFigureOut">
               <a:rPr lang="en-US" smtClean="0"/>
-              <a:t>11/14/2015</a:t>
+              <a:t>11/15/2015</a:t>
             </a:fld>
             <a:endParaRPr lang="en-US"/>
           </a:p>
@@ -1982,7 +1982,7 @@
           <a:p>
             <a:fld id="{B17F4E78-F3C6-4442-AD2E-D4916562ED88}" type="datetimeFigureOut">
               <a:rPr lang="en-US" smtClean="0"/>
-              <a:t>11/14/2015</a:t>
+              <a:t>11/15/2015</a:t>
             </a:fld>
             <a:endParaRPr lang="en-US"/>
           </a:p>
@@ -2259,7 +2259,7 @@
           <a:p>
             <a:fld id="{B17F4E78-F3C6-4442-AD2E-D4916562ED88}" type="datetimeFigureOut">
               <a:rPr lang="en-US" smtClean="0"/>
-              <a:t>11/14/2015</a:t>
+              <a:t>11/15/2015</a:t>
             </a:fld>
             <a:endParaRPr lang="en-US"/>
           </a:p>
@@ -2512,7 +2512,7 @@
           <a:p>
             <a:fld id="{B17F4E78-F3C6-4442-AD2E-D4916562ED88}" type="datetimeFigureOut">
               <a:rPr lang="en-US" smtClean="0"/>
-              <a:t>11/14/2015</a:t>
+              <a:t>11/15/2015</a:t>
             </a:fld>
             <a:endParaRPr lang="en-US"/>
           </a:p>
@@ -2725,7 +2725,7 @@
           <a:p>
             <a:fld id="{B17F4E78-F3C6-4442-AD2E-D4916562ED88}" type="datetimeFigureOut">
               <a:rPr lang="en-US" smtClean="0"/>
-              <a:t>11/14/2015</a:t>
+              <a:t>11/15/2015</a:t>
             </a:fld>
             <a:endParaRPr lang="en-US"/>
           </a:p>
@@ -5610,8 +5610,8 @@
           </a:fontRef>
         </p:style>
       </p:cxnSp>
-      <mc:AlternateContent xmlns:mc="http://schemas.openxmlformats.org/markup-compatibility/2006" xmlns:a14="http://schemas.microsoft.com/office/drawing/2010/main">
-        <mc:Choice Requires="a14">
+      <mc:AlternateContent xmlns:mc="http://schemas.openxmlformats.org/markup-compatibility/2006">
+        <mc:Choice xmlns:a14="http://schemas.microsoft.com/office/drawing/2010/main" Requires="a14">
           <p:sp>
             <p:nvSpPr>
               <p:cNvPr id="53" name="Rectangle 52"/>
@@ -5620,8 +5620,8 @@
             </p:nvSpPr>
             <p:spPr>
               <a:xfrm>
-                <a:off x="7971555" y="3216147"/>
-                <a:ext cx="1000993" cy="993142"/>
+                <a:off x="7852061" y="3309665"/>
+                <a:ext cx="1253839" cy="806106"/>
               </a:xfrm>
               <a:prstGeom prst="rect">
                 <a:avLst/>
@@ -5649,77 +5649,143 @@
               <a:p>
                 <a:pPr algn="ctr"/>
                 <a14:m>
-                  <m:oMathPara xmlns:m="http://schemas.openxmlformats.org/officeDocument/2006/math">
-                    <m:oMathParaPr>
-                      <m:jc m:val="centerGroup"/>
-                    </m:oMathParaPr>
-                    <m:oMath xmlns:m="http://schemas.openxmlformats.org/officeDocument/2006/math">
-                      <m:sSub>
-                        <m:sSubPr>
-                          <m:ctrlPr>
-                            <a:rPr lang="en-US" i="1" smtClean="0">
-                              <a:latin typeface="Cambria Math"/>
-                            </a:rPr>
-                          </m:ctrlPr>
-                        </m:sSubPr>
-                        <m:e>
-                          <m:acc>
-                            <m:accPr>
-                              <m:chr m:val="̂"/>
-                              <m:ctrlPr>
-                                <a:rPr lang="en-US" i="1" smtClean="0">
-                                  <a:latin typeface="Cambria Math"/>
-                                </a:rPr>
-                              </m:ctrlPr>
-                            </m:accPr>
-                            <m:e>
-                              <m:r>
-                                <m:rPr>
-                                  <m:sty m:val="p"/>
-                                </m:rPr>
-                                <a:rPr lang="en-US" i="1">
-                                  <a:latin typeface="Cambria Math"/>
-                                </a:rPr>
-                                <m:t>β</m:t>
-                              </m:r>
-                            </m:e>
-                          </m:acc>
-                        </m:e>
-                        <m:sub>
-                          <m:r>
-                            <a:rPr lang="en-US" b="0" i="1" smtClean="0">
-                              <a:latin typeface="Cambria Math"/>
-                            </a:rPr>
-                            <m:t>𝑀𝐼</m:t>
-                          </m:r>
-                        </m:sub>
-                      </m:sSub>
-                      <m:r>
-                        <a:rPr lang="en-US" b="0" i="1" smtClean="0">
-                          <a:latin typeface="Cambria Math"/>
-                        </a:rPr>
-                        <m:t>=</m:t>
-                      </m:r>
-                    </m:oMath>
-                  </m:oMathPara>
+                  <m:oMath xmlns:m="http://schemas.openxmlformats.org/officeDocument/2006/math">
+                    <m:sSub>
+                      <m:sSubPr>
+                        <m:ctrlPr>
+                          <a:rPr lang="en-US" i="1" smtClean="0">
+                            <a:latin typeface="Cambria Math"/>
+                          </a:rPr>
+                        </m:ctrlPr>
+                      </m:sSubPr>
+                      <m:e>
+                        <m:acc>
+                          <m:accPr>
+                            <m:chr m:val="̂"/>
+                            <m:ctrlPr>
+                              <a:rPr lang="en-US" i="1" smtClean="0">
+                                <a:latin typeface="Cambria Math"/>
+                              </a:rPr>
+                            </m:ctrlPr>
+                          </m:accPr>
+                          <m:e>
+                            <m:r>
+                              <m:rPr>
+                                <m:sty m:val="p"/>
+                              </m:rPr>
+                              <a:rPr lang="en-US" i="1">
+                                <a:latin typeface="Cambria Math"/>
+                              </a:rPr>
+                              <m:t>β</m:t>
+                            </m:r>
+                          </m:e>
+                        </m:acc>
+                      </m:e>
+                      <m:sub>
+                        <m:r>
+                          <a:rPr lang="en-US" b="0" i="1" smtClean="0">
+                            <a:latin typeface="Cambria Math"/>
+                          </a:rPr>
+                          <m:t>𝑀𝐼</m:t>
+                        </m:r>
+                      </m:sub>
+                    </m:sSub>
+                    <m:r>
+                      <a:rPr lang="en-US" b="0" i="1" smtClean="0">
+                        <a:latin typeface="Cambria Math"/>
+                      </a:rPr>
+                      <m:t>=</m:t>
+                    </m:r>
+                  </m:oMath>
                 </a14:m>
-                <a:endParaRPr lang="en-US" b="0" i="1" dirty="0" smtClean="0">
+                <a:r>
+                  <a:rPr lang="en-US" b="0" i="1" dirty="0" smtClean="0">
+                    <a:latin typeface="Cambria Math"/>
+                  </a:rPr>
+                  <a:t>.</a:t>
+                </a:r>
+                <a:r>
+                  <a:rPr lang="en-US" b="0" i="1" dirty="0" smtClean="0">
+                    <a:latin typeface="Cambria Math"/>
+                  </a:rPr>
+                  <a:t>17</a:t>
+                </a:r>
+              </a:p>
+              <a:p>
+                <a:pPr algn="ctr"/>
+                <a14:m>
+                  <m:oMath xmlns:m="http://schemas.openxmlformats.org/officeDocument/2006/math">
+                    <m:sSub>
+                      <m:sSubPr>
+                        <m:ctrlPr>
+                          <a:rPr lang="el-GR" i="1" smtClean="0">
+                            <a:latin typeface="Cambria Math"/>
+                          </a:rPr>
+                        </m:ctrlPr>
+                      </m:sSubPr>
+                      <m:e>
+                        <m:acc>
+                          <m:accPr>
+                            <m:chr m:val="̂"/>
+                            <m:ctrlPr>
+                              <a:rPr lang="en-US" i="1">
+                                <a:latin typeface="Cambria Math"/>
+                              </a:rPr>
+                            </m:ctrlPr>
+                          </m:accPr>
+                          <m:e>
+                            <m:r>
+                              <m:rPr>
+                                <m:nor/>
+                              </m:rPr>
+                              <a:rPr lang="el-GR" i="1">
+                                <a:latin typeface="Cambria Math"/>
+                              </a:rPr>
+                              <m:t>σ</m:t>
+                            </m:r>
+                            <m:r>
+                              <m:rPr>
+                                <m:nor/>
+                              </m:rPr>
+                              <a:rPr lang="el-GR" i="1">
+                                <a:latin typeface="Cambria Math"/>
+                              </a:rPr>
+                              <m:t> </m:t>
+                            </m:r>
+                          </m:e>
+                        </m:acc>
+                      </m:e>
+                      <m:sub>
+                        <m:r>
+                          <a:rPr lang="en-US" b="0" i="1" smtClean="0">
+                            <a:latin typeface="Cambria Math"/>
+                          </a:rPr>
+                          <m:t>𝑀𝐼</m:t>
+                        </m:r>
+                      </m:sub>
+                    </m:sSub>
+                  </m:oMath>
+                </a14:m>
+                <a:r>
+                  <a:rPr lang="en-US" i="1" dirty="0" smtClean="0">
+                    <a:latin typeface="Cambria Math"/>
+                  </a:rPr>
+                  <a:t>=.051</a:t>
+                </a:r>
+                <a:endParaRPr lang="en-US" i="1" dirty="0">
                   <a:latin typeface="Cambria Math"/>
                 </a:endParaRPr>
               </a:p>
               <a:p>
                 <a:pPr algn="ctr"/>
-                <a:r>
-                  <a:rPr lang="en-US" b="0" i="1" dirty="0" smtClean="0">
-                    <a:latin typeface="Cambria Math"/>
-                  </a:rPr>
-                  <a:t>.176</a:t>
-                </a:r>
+                <a:endParaRPr lang="en-US" b="0" i="1" dirty="0" smtClean="0">
+                  <a:latin typeface="Cambria Math"/>
+                </a:endParaRPr>
               </a:p>
             </p:txBody>
           </p:sp>
         </mc:Choice>
-        <mc:Fallback xmlns="">
+        <mc:Fallback>
           <p:sp>
             <p:nvSpPr>
               <p:cNvPr id="53" name="Rectangle 52"/>
@@ -5730,8 +5796,8 @@
             </p:nvSpPr>
             <p:spPr>
               <a:xfrm>
-                <a:off x="7971555" y="3216147"/>
-                <a:ext cx="1000993" cy="993142"/>
+                <a:off x="7852061" y="3309665"/>
+                <a:ext cx="1253839" cy="806106"/>
               </a:xfrm>
               <a:prstGeom prst="rect">
                 <a:avLst/>
@@ -5739,7 +5805,7 @@
               <a:blipFill rotWithShape="1">
                 <a:blip r:embed="rId5"/>
                 <a:stretch>
-                  <a:fillRect/>
+                  <a:fillRect t="-8088" r="-952"/>
                 </a:stretch>
               </a:blipFill>
             </p:spPr>
@@ -5796,7 +5862,7 @@
         </p:nvSpPr>
         <p:spPr>
           <a:xfrm>
-            <a:off x="7890161" y="2466258"/>
+            <a:off x="7839361" y="2619005"/>
             <a:ext cx="1253839" cy="646331"/>
           </a:xfrm>
           <a:prstGeom prst="rect">
@@ -8969,13 +9035,13 @@
       </p:grpSpPr>
       <p:pic>
         <p:nvPicPr>
-          <p:cNvPr id="1026" name="Picture 2"/>
+          <p:cNvPr id="2" name="Picture 2"/>
           <p:cNvPicPr>
             <a:picLocks noChangeAspect="1" noChangeArrowheads="1"/>
           </p:cNvPicPr>
           <p:nvPr/>
         </p:nvPicPr>
-        <p:blipFill rotWithShape="1">
+        <p:blipFill>
           <a:blip r:embed="rId2">
             <a:extLst>
               <a:ext uri="{28A0092B-C50C-407E-A947-70E740481C1C}">
@@ -8983,13 +9049,15 @@
               </a:ext>
             </a:extLst>
           </a:blip>
-          <a:srcRect r="2671"/>
-          <a:stretch/>
+          <a:srcRect/>
+          <a:stretch>
+            <a:fillRect/>
+          </a:stretch>
         </p:blipFill>
         <p:spPr bwMode="auto">
           <a:xfrm>
-            <a:off x="0" y="641927"/>
-            <a:ext cx="4470235" cy="3062659"/>
+            <a:off x="0" y="0"/>
+            <a:ext cx="4492970" cy="2807208"/>
           </a:xfrm>
           <a:prstGeom prst="rect">
             <a:avLst/>
@@ -9021,13 +9089,13 @@
       </p:pic>
       <p:pic>
         <p:nvPicPr>
-          <p:cNvPr id="1027" name="Picture 3"/>
+          <p:cNvPr id="3" name="Picture 3"/>
           <p:cNvPicPr>
             <a:picLocks noChangeAspect="1" noChangeArrowheads="1"/>
           </p:cNvPicPr>
           <p:nvPr/>
         </p:nvPicPr>
-        <p:blipFill rotWithShape="1">
+        <p:blipFill>
           <a:blip r:embed="rId3">
             <a:extLst>
               <a:ext uri="{28A0092B-C50C-407E-A947-70E740481C1C}">
@@ -9035,13 +9103,15 @@
               </a:ext>
             </a:extLst>
           </a:blip>
-          <a:srcRect r="2593"/>
-          <a:stretch/>
+          <a:srcRect/>
+          <a:stretch>
+            <a:fillRect/>
+          </a:stretch>
         </p:blipFill>
         <p:spPr bwMode="auto">
           <a:xfrm>
-            <a:off x="4676710" y="640245"/>
-            <a:ext cx="4467290" cy="3058188"/>
+            <a:off x="4653306" y="0"/>
+            <a:ext cx="4490694" cy="2805786"/>
           </a:xfrm>
           <a:prstGeom prst="rect">
             <a:avLst/>

</xml_diff>

<commit_message>
Added bal checks to picture ppt
</commit_message>
<xml_diff>
--- a/mi_picture.pptx
+++ b/mi_picture.pptx
@@ -10582,8 +10582,8 @@
         </p:blipFill>
         <p:spPr bwMode="auto">
           <a:xfrm>
-            <a:off x="25401" y="25400"/>
-            <a:ext cx="4165600" cy="3470138"/>
+            <a:off x="200026" y="25400"/>
+            <a:ext cx="3617495" cy="3013541"/>
           </a:xfrm>
           <a:prstGeom prst="rect">
             <a:avLst/>
@@ -10636,8 +10636,8 @@
         </p:blipFill>
         <p:spPr bwMode="auto">
           <a:xfrm>
-            <a:off x="5235575" y="228600"/>
-            <a:ext cx="3908425" cy="3255900"/>
+            <a:off x="3860400" y="25400"/>
+            <a:ext cx="3622271" cy="3017520"/>
           </a:xfrm>
           <a:prstGeom prst="rect">
             <a:avLst/>
@@ -10690,8 +10690,8 @@
         </p:blipFill>
         <p:spPr bwMode="auto">
           <a:xfrm>
-            <a:off x="63501" y="3352800"/>
-            <a:ext cx="3810000" cy="3173907"/>
+            <a:off x="238128" y="3206687"/>
+            <a:ext cx="3622272" cy="3017520"/>
           </a:xfrm>
           <a:prstGeom prst="rect">
             <a:avLst/>
@@ -10744,8 +10744,8 @@
         </p:blipFill>
         <p:spPr bwMode="auto">
           <a:xfrm>
-            <a:off x="4800600" y="3495538"/>
-            <a:ext cx="3807665" cy="3171962"/>
+            <a:off x="3860399" y="3219387"/>
+            <a:ext cx="3622271" cy="3017520"/>
           </a:xfrm>
           <a:prstGeom prst="rect">
             <a:avLst/>

</xml_diff>

<commit_message>
up to mice algo for friends presentation edits
</commit_message>
<xml_diff>
--- a/mi_picture.pptx
+++ b/mi_picture.pptx
@@ -297,7 +297,7 @@
           <a:p>
             <a:fld id="{B17F4E78-F3C6-4442-AD2E-D4916562ED88}" type="datetimeFigureOut">
               <a:rPr lang="en-US" smtClean="0"/>
-              <a:t>11/16/2015</a:t>
+              <a:t>11/17/2015</a:t>
             </a:fld>
             <a:endParaRPr lang="en-US"/>
           </a:p>
@@ -467,7 +467,7 @@
           <a:p>
             <a:fld id="{B17F4E78-F3C6-4442-AD2E-D4916562ED88}" type="datetimeFigureOut">
               <a:rPr lang="en-US" smtClean="0"/>
-              <a:t>11/16/2015</a:t>
+              <a:t>11/17/2015</a:t>
             </a:fld>
             <a:endParaRPr lang="en-US"/>
           </a:p>
@@ -647,7 +647,7 @@
           <a:p>
             <a:fld id="{B17F4E78-F3C6-4442-AD2E-D4916562ED88}" type="datetimeFigureOut">
               <a:rPr lang="en-US" smtClean="0"/>
-              <a:t>11/16/2015</a:t>
+              <a:t>11/17/2015</a:t>
             </a:fld>
             <a:endParaRPr lang="en-US"/>
           </a:p>
@@ -817,7 +817,7 @@
           <a:p>
             <a:fld id="{B17F4E78-F3C6-4442-AD2E-D4916562ED88}" type="datetimeFigureOut">
               <a:rPr lang="en-US" smtClean="0"/>
-              <a:t>11/16/2015</a:t>
+              <a:t>11/17/2015</a:t>
             </a:fld>
             <a:endParaRPr lang="en-US"/>
           </a:p>
@@ -1063,7 +1063,7 @@
           <a:p>
             <a:fld id="{B17F4E78-F3C6-4442-AD2E-D4916562ED88}" type="datetimeFigureOut">
               <a:rPr lang="en-US" smtClean="0"/>
-              <a:t>11/16/2015</a:t>
+              <a:t>11/17/2015</a:t>
             </a:fld>
             <a:endParaRPr lang="en-US"/>
           </a:p>
@@ -1351,7 +1351,7 @@
           <a:p>
             <a:fld id="{B17F4E78-F3C6-4442-AD2E-D4916562ED88}" type="datetimeFigureOut">
               <a:rPr lang="en-US" smtClean="0"/>
-              <a:t>11/16/2015</a:t>
+              <a:t>11/17/2015</a:t>
             </a:fld>
             <a:endParaRPr lang="en-US"/>
           </a:p>
@@ -1773,7 +1773,7 @@
           <a:p>
             <a:fld id="{B17F4E78-F3C6-4442-AD2E-D4916562ED88}" type="datetimeFigureOut">
               <a:rPr lang="en-US" smtClean="0"/>
-              <a:t>11/16/2015</a:t>
+              <a:t>11/17/2015</a:t>
             </a:fld>
             <a:endParaRPr lang="en-US"/>
           </a:p>
@@ -1891,7 +1891,7 @@
           <a:p>
             <a:fld id="{B17F4E78-F3C6-4442-AD2E-D4916562ED88}" type="datetimeFigureOut">
               <a:rPr lang="en-US" smtClean="0"/>
-              <a:t>11/16/2015</a:t>
+              <a:t>11/17/2015</a:t>
             </a:fld>
             <a:endParaRPr lang="en-US"/>
           </a:p>
@@ -1986,7 +1986,7 @@
           <a:p>
             <a:fld id="{B17F4E78-F3C6-4442-AD2E-D4916562ED88}" type="datetimeFigureOut">
               <a:rPr lang="en-US" smtClean="0"/>
-              <a:t>11/16/2015</a:t>
+              <a:t>11/17/2015</a:t>
             </a:fld>
             <a:endParaRPr lang="en-US"/>
           </a:p>
@@ -2263,7 +2263,7 @@
           <a:p>
             <a:fld id="{B17F4E78-F3C6-4442-AD2E-D4916562ED88}" type="datetimeFigureOut">
               <a:rPr lang="en-US" smtClean="0"/>
-              <a:t>11/16/2015</a:t>
+              <a:t>11/17/2015</a:t>
             </a:fld>
             <a:endParaRPr lang="en-US"/>
           </a:p>
@@ -2516,7 +2516,7 @@
           <a:p>
             <a:fld id="{B17F4E78-F3C6-4442-AD2E-D4916562ED88}" type="datetimeFigureOut">
               <a:rPr lang="en-US" smtClean="0"/>
-              <a:t>11/16/2015</a:t>
+              <a:t>11/17/2015</a:t>
             </a:fld>
             <a:endParaRPr lang="en-US"/>
           </a:p>
@@ -2729,7 +2729,7 @@
           <a:p>
             <a:fld id="{B17F4E78-F3C6-4442-AD2E-D4916562ED88}" type="datetimeFigureOut">
               <a:rPr lang="en-US" smtClean="0"/>
-              <a:t>11/16/2015</a:t>
+              <a:t>11/17/2015</a:t>
             </a:fld>
             <a:endParaRPr lang="en-US"/>
           </a:p>
@@ -5929,7 +5929,7 @@
         <p:spPr>
           <a:xfrm>
             <a:off x="2286000" y="335846"/>
-            <a:ext cx="4572000" cy="6186309"/>
+            <a:ext cx="4572000" cy="13388280"/>
           </a:xfrm>
           <a:prstGeom prst="rect">
             <a:avLst/>
@@ -5951,7 +5951,44 @@
             </a:r>
             <a:r>
               <a:rPr lang="en-US" dirty="0"/>
-              <a:t>=c(1,3))</a:t>
+              <a:t>=c(2,2))</a:t>
+            </a:r>
+          </a:p>
+          <a:p>
+            <a:endParaRPr lang="en-US" dirty="0"/>
+          </a:p>
+          <a:p>
+            <a:r>
+              <a:rPr lang="en-US" dirty="0" err="1"/>
+              <a:t>xydat</a:t>
+            </a:r>
+            <a:r>
+              <a:rPr lang="en-US" dirty="0"/>
+              <a:t>=</a:t>
+            </a:r>
+            <a:r>
+              <a:rPr lang="en-US" dirty="0" err="1"/>
+              <a:t>data.frame</a:t>
+            </a:r>
+            <a:r>
+              <a:rPr lang="en-US" dirty="0"/>
+              <a:t>(x=</a:t>
+            </a:r>
+            <a:r>
+              <a:rPr lang="en-US" dirty="0" err="1"/>
+              <a:t>rnorm</a:t>
+            </a:r>
+            <a:r>
+              <a:rPr lang="en-US" dirty="0"/>
+              <a:t>(50),y=</a:t>
+            </a:r>
+            <a:r>
+              <a:rPr lang="en-US" dirty="0" err="1"/>
+              <a:t>rnorm</a:t>
+            </a:r>
+            <a:r>
+              <a:rPr lang="en-US" dirty="0"/>
+              <a:t>(50),col=rep(NA,50))</a:t>
             </a:r>
           </a:p>
           <a:p>
@@ -5976,7 +6013,7 @@
             </a:r>
             <a:r>
               <a:rPr lang="en-US" dirty="0" err="1"/>
-              <a:t>red","blue</a:t>
+              <a:t>red","black</a:t>
             </a:r>
             <a:r>
               <a:rPr lang="en-US" dirty="0"/>
@@ -6064,7 +6101,7 @@
             </a:r>
             <a:r>
               <a:rPr lang="en-US" dirty="0"/>
-              <a:t>&lt;0,"red","blue")</a:t>
+              <a:t>&lt;0,"red","black")</a:t>
             </a:r>
           </a:p>
           <a:p>
@@ -6143,7 +6180,7 @@
             </a:r>
             <a:r>
               <a:rPr lang="en-US" dirty="0"/>
-              <a:t>&lt;0,"red","blue")</a:t>
+              <a:t>&lt;0,"red","black")</a:t>
             </a:r>
           </a:p>
           <a:p>
@@ -6165,7 +6202,7 @@
             </a:r>
             <a:r>
               <a:rPr lang="en-US" dirty="0"/>
-              <a:t>="Data with missingness",</a:t>
+              <a:t>="",</a:t>
             </a:r>
           </a:p>
           <a:p>
@@ -6196,7 +6233,7 @@
           <a:p>
             <a:r>
               <a:rPr lang="en-US" dirty="0"/>
-              <a:t>legend(1,1,c("Observed", "Missing"), </a:t>
+              <a:t>#legend(1,1,c("Observed", "Missing"), </a:t>
             </a:r>
             <a:r>
               <a:rPr lang="en-US" dirty="0" err="1"/>
@@ -6208,12 +6245,260 @@
             </a:r>
             <a:r>
               <a:rPr lang="en-US" dirty="0" err="1"/>
-              <a:t>red","blue</a:t>
+              <a:t>red","black</a:t>
             </a:r>
             <a:r>
               <a:rPr lang="en-US" dirty="0"/>
               <a:t>"))</a:t>
             </a:r>
+          </a:p>
+          <a:p>
+            <a:endParaRPr lang="en-US" dirty="0"/>
+          </a:p>
+          <a:p>
+            <a:r>
+              <a:rPr lang="en-US" dirty="0" err="1"/>
+              <a:t>plot.new</a:t>
+            </a:r>
+            <a:r>
+              <a:rPr lang="en-US" dirty="0"/>
+              <a:t>()</a:t>
+            </a:r>
+          </a:p>
+          <a:p>
+            <a:r>
+              <a:rPr lang="en-US" dirty="0"/>
+              <a:t>legend("</a:t>
+            </a:r>
+            <a:r>
+              <a:rPr lang="en-US" dirty="0" err="1"/>
+              <a:t>top",c</a:t>
+            </a:r>
+            <a:r>
+              <a:rPr lang="en-US" dirty="0"/>
+              <a:t>("Observed", "Missing"), </a:t>
+            </a:r>
+            <a:r>
+              <a:rPr lang="en-US" dirty="0" err="1"/>
+              <a:t>pch</a:t>
+            </a:r>
+            <a:r>
+              <a:rPr lang="en-US" dirty="0"/>
+              <a:t> = c(1), col = c("</a:t>
+            </a:r>
+            <a:r>
+              <a:rPr lang="en-US" dirty="0" err="1"/>
+              <a:t>red","black</a:t>
+            </a:r>
+            <a:r>
+              <a:rPr lang="en-US" dirty="0"/>
+              <a:t>"))</a:t>
+            </a:r>
+          </a:p>
+          <a:p>
+            <a:endParaRPr lang="en-US" dirty="0"/>
+          </a:p>
+          <a:p>
+            <a:r>
+              <a:rPr lang="en-US" dirty="0"/>
+              <a:t># par(</a:t>
+            </a:r>
+            <a:r>
+              <a:rPr lang="en-US" dirty="0" err="1"/>
+              <a:t>oma</a:t>
+            </a:r>
+            <a:r>
+              <a:rPr lang="en-US" dirty="0"/>
+              <a:t> = c(4, 1, 1, 1))</a:t>
+            </a:r>
+          </a:p>
+          <a:p>
+            <a:r>
+              <a:rPr lang="en-US" dirty="0"/>
+              <a:t># par(fig = c(0, 1, 0, 1), </a:t>
+            </a:r>
+            <a:r>
+              <a:rPr lang="en-US" dirty="0" err="1"/>
+              <a:t>oma</a:t>
+            </a:r>
+            <a:r>
+              <a:rPr lang="en-US" dirty="0"/>
+              <a:t> = c(0, 0, 0, 0), mar = c(0, 0, 0, 0), new = TRUE)</a:t>
+            </a:r>
+          </a:p>
+          <a:p>
+            <a:r>
+              <a:rPr lang="en-US" dirty="0"/>
+              <a:t># plot(0, 0, type = "n", </a:t>
+            </a:r>
+            <a:r>
+              <a:rPr lang="en-US" dirty="0" err="1"/>
+              <a:t>bty</a:t>
+            </a:r>
+            <a:r>
+              <a:rPr lang="en-US" dirty="0"/>
+              <a:t> = "n", </a:t>
+            </a:r>
+            <a:r>
+              <a:rPr lang="en-US" dirty="0" err="1"/>
+              <a:t>xaxt</a:t>
+            </a:r>
+            <a:r>
+              <a:rPr lang="en-US" dirty="0"/>
+              <a:t> = "n", </a:t>
+            </a:r>
+            <a:r>
+              <a:rPr lang="en-US" dirty="0" err="1"/>
+              <a:t>yaxt</a:t>
+            </a:r>
+            <a:r>
+              <a:rPr lang="en-US" dirty="0"/>
+              <a:t> = "n")</a:t>
+            </a:r>
+          </a:p>
+          <a:p>
+            <a:r>
+              <a:rPr lang="en-US" dirty="0"/>
+              <a:t># legend("bottom", c("</a:t>
+            </a:r>
+            <a:r>
+              <a:rPr lang="en-US" dirty="0" err="1"/>
+              <a:t>observed","missing</a:t>
+            </a:r>
+            <a:r>
+              <a:rPr lang="en-US" dirty="0"/>
+              <a:t>"), </a:t>
+            </a:r>
+            <a:r>
+              <a:rPr lang="en-US" dirty="0" err="1"/>
+              <a:t>xpd</a:t>
+            </a:r>
+            <a:r>
+              <a:rPr lang="en-US" dirty="0"/>
+              <a:t> = TRUE, </a:t>
+            </a:r>
+            <a:r>
+              <a:rPr lang="en-US" dirty="0" err="1"/>
+              <a:t>horiz</a:t>
+            </a:r>
+            <a:r>
+              <a:rPr lang="en-US" dirty="0"/>
+              <a:t> = TRUE, inset = c(0, 0),</a:t>
+            </a:r>
+          </a:p>
+          <a:p>
+            <a:r>
+              <a:rPr lang="en-US" dirty="0"/>
+              <a:t>#        </a:t>
+            </a:r>
+            <a:r>
+              <a:rPr lang="en-US" dirty="0" err="1"/>
+              <a:t>bty</a:t>
+            </a:r>
+            <a:r>
+              <a:rPr lang="en-US" dirty="0"/>
+              <a:t> = "n", </a:t>
+            </a:r>
+            <a:r>
+              <a:rPr lang="en-US" dirty="0" err="1"/>
+              <a:t>pch</a:t>
+            </a:r>
+            <a:r>
+              <a:rPr lang="en-US" dirty="0"/>
+              <a:t> = 1, col = c("</a:t>
+            </a:r>
+            <a:r>
+              <a:rPr lang="en-US" dirty="0" err="1"/>
+              <a:t>red","black</a:t>
+            </a:r>
+            <a:r>
+              <a:rPr lang="en-US" dirty="0"/>
+              <a:t>"), </a:t>
+            </a:r>
+            <a:r>
+              <a:rPr lang="en-US" dirty="0" err="1"/>
+              <a:t>cex</a:t>
+            </a:r>
+            <a:r>
+              <a:rPr lang="en-US" dirty="0"/>
+              <a:t> = 2)</a:t>
+            </a:r>
+          </a:p>
+          <a:p>
+            <a:r>
+              <a:rPr lang="en-US" dirty="0"/>
+              <a:t># </a:t>
+            </a:r>
+            <a:r>
+              <a:rPr lang="en-US" dirty="0" err="1"/>
+              <a:t>xpd</a:t>
+            </a:r>
+            <a:r>
+              <a:rPr lang="en-US" dirty="0"/>
+              <a:t> = TRUE tells R that it is OK to plot outside the region </a:t>
+            </a:r>
+            <a:r>
+              <a:rPr lang="en-US" dirty="0" err="1"/>
+              <a:t>horiz</a:t>
+            </a:r>
+            <a:r>
+              <a:rPr lang="en-US" dirty="0"/>
+              <a:t> = TRUE</a:t>
+            </a:r>
+          </a:p>
+          <a:p>
+            <a:r>
+              <a:rPr lang="en-US" dirty="0"/>
+              <a:t># tells R that I want a horizontal legend inset = c(</a:t>
+            </a:r>
+            <a:r>
+              <a:rPr lang="en-US" dirty="0" err="1"/>
+              <a:t>x,y</a:t>
+            </a:r>
+            <a:r>
+              <a:rPr lang="en-US" dirty="0"/>
+              <a:t>) tells R how to move</a:t>
+            </a:r>
+          </a:p>
+          <a:p>
+            <a:r>
+              <a:rPr lang="en-US" dirty="0"/>
+              <a:t># the legend relative to the 'bottom' location </a:t>
+            </a:r>
+            <a:r>
+              <a:rPr lang="en-US" dirty="0" err="1"/>
+              <a:t>bty</a:t>
+            </a:r>
+            <a:r>
+              <a:rPr lang="en-US" dirty="0"/>
+              <a:t> = 'n' means that 'no' box</a:t>
+            </a:r>
+          </a:p>
+          <a:p>
+            <a:r>
+              <a:rPr lang="en-US" dirty="0"/>
+              <a:t># will be drawn around it </a:t>
+            </a:r>
+            <a:r>
+              <a:rPr lang="en-US" dirty="0" err="1"/>
+              <a:t>pch</a:t>
+            </a:r>
+            <a:r>
+              <a:rPr lang="en-US" dirty="0"/>
+              <a:t> and col are the types and colors of points </a:t>
+            </a:r>
+            <a:r>
+              <a:rPr lang="en-US" dirty="0" err="1"/>
+              <a:t>cex</a:t>
+            </a:r>
+            <a:endParaRPr lang="en-US" dirty="0"/>
+          </a:p>
+          <a:p>
+            <a:r>
+              <a:rPr lang="en-US" dirty="0"/>
+              <a:t># = 2 makes the legend twice as large as other fonts</a:t>
+            </a:r>
+            <a:endParaRPr lang="en-US" dirty="0"/>
           </a:p>
         </p:txBody>
       </p:sp>
@@ -11296,7 +11581,7 @@
         </p:nvSpPr>
         <p:spPr>
           <a:xfrm>
-            <a:off x="2514600" y="1371600"/>
+            <a:off x="2362200" y="1397000"/>
             <a:ext cx="1905000" cy="1905000"/>
           </a:xfrm>
           <a:prstGeom prst="rect">

</xml_diff>

<commit_message>
Updated ppt and line between arts and stats
</commit_message>
<xml_diff>
--- a/mi_picture.pptx
+++ b/mi_picture.pptx
@@ -297,7 +297,7 @@
           <a:p>
             <a:fld id="{B17F4E78-F3C6-4442-AD2E-D4916562ED88}" type="datetimeFigureOut">
               <a:rPr lang="en-US" smtClean="0"/>
-              <a:t>11/17/2015</a:t>
+              <a:t>11/18/2015</a:t>
             </a:fld>
             <a:endParaRPr lang="en-US"/>
           </a:p>
@@ -467,7 +467,7 @@
           <a:p>
             <a:fld id="{B17F4E78-F3C6-4442-AD2E-D4916562ED88}" type="datetimeFigureOut">
               <a:rPr lang="en-US" smtClean="0"/>
-              <a:t>11/17/2015</a:t>
+              <a:t>11/18/2015</a:t>
             </a:fld>
             <a:endParaRPr lang="en-US"/>
           </a:p>
@@ -647,7 +647,7 @@
           <a:p>
             <a:fld id="{B17F4E78-F3C6-4442-AD2E-D4916562ED88}" type="datetimeFigureOut">
               <a:rPr lang="en-US" smtClean="0"/>
-              <a:t>11/17/2015</a:t>
+              <a:t>11/18/2015</a:t>
             </a:fld>
             <a:endParaRPr lang="en-US"/>
           </a:p>
@@ -817,7 +817,7 @@
           <a:p>
             <a:fld id="{B17F4E78-F3C6-4442-AD2E-D4916562ED88}" type="datetimeFigureOut">
               <a:rPr lang="en-US" smtClean="0"/>
-              <a:t>11/17/2015</a:t>
+              <a:t>11/18/2015</a:t>
             </a:fld>
             <a:endParaRPr lang="en-US"/>
           </a:p>
@@ -1063,7 +1063,7 @@
           <a:p>
             <a:fld id="{B17F4E78-F3C6-4442-AD2E-D4916562ED88}" type="datetimeFigureOut">
               <a:rPr lang="en-US" smtClean="0"/>
-              <a:t>11/17/2015</a:t>
+              <a:t>11/18/2015</a:t>
             </a:fld>
             <a:endParaRPr lang="en-US"/>
           </a:p>
@@ -1351,7 +1351,7 @@
           <a:p>
             <a:fld id="{B17F4E78-F3C6-4442-AD2E-D4916562ED88}" type="datetimeFigureOut">
               <a:rPr lang="en-US" smtClean="0"/>
-              <a:t>11/17/2015</a:t>
+              <a:t>11/18/2015</a:t>
             </a:fld>
             <a:endParaRPr lang="en-US"/>
           </a:p>
@@ -1773,7 +1773,7 @@
           <a:p>
             <a:fld id="{B17F4E78-F3C6-4442-AD2E-D4916562ED88}" type="datetimeFigureOut">
               <a:rPr lang="en-US" smtClean="0"/>
-              <a:t>11/17/2015</a:t>
+              <a:t>11/18/2015</a:t>
             </a:fld>
             <a:endParaRPr lang="en-US"/>
           </a:p>
@@ -1891,7 +1891,7 @@
           <a:p>
             <a:fld id="{B17F4E78-F3C6-4442-AD2E-D4916562ED88}" type="datetimeFigureOut">
               <a:rPr lang="en-US" smtClean="0"/>
-              <a:t>11/17/2015</a:t>
+              <a:t>11/18/2015</a:t>
             </a:fld>
             <a:endParaRPr lang="en-US"/>
           </a:p>
@@ -1986,7 +1986,7 @@
           <a:p>
             <a:fld id="{B17F4E78-F3C6-4442-AD2E-D4916562ED88}" type="datetimeFigureOut">
               <a:rPr lang="en-US" smtClean="0"/>
-              <a:t>11/17/2015</a:t>
+              <a:t>11/18/2015</a:t>
             </a:fld>
             <a:endParaRPr lang="en-US"/>
           </a:p>
@@ -2263,7 +2263,7 @@
           <a:p>
             <a:fld id="{B17F4E78-F3C6-4442-AD2E-D4916562ED88}" type="datetimeFigureOut">
               <a:rPr lang="en-US" smtClean="0"/>
-              <a:t>11/17/2015</a:t>
+              <a:t>11/18/2015</a:t>
             </a:fld>
             <a:endParaRPr lang="en-US"/>
           </a:p>
@@ -2516,7 +2516,7 @@
           <a:p>
             <a:fld id="{B17F4E78-F3C6-4442-AD2E-D4916562ED88}" type="datetimeFigureOut">
               <a:rPr lang="en-US" smtClean="0"/>
-              <a:t>11/17/2015</a:t>
+              <a:t>11/18/2015</a:t>
             </a:fld>
             <a:endParaRPr lang="en-US"/>
           </a:p>
@@ -2729,7 +2729,7 @@
           <a:p>
             <a:fld id="{B17F4E78-F3C6-4442-AD2E-D4916562ED88}" type="datetimeFigureOut">
               <a:rPr lang="en-US" smtClean="0"/>
-              <a:t>11/17/2015</a:t>
+              <a:t>11/18/2015</a:t>
             </a:fld>
             <a:endParaRPr lang="en-US"/>
           </a:p>
@@ -6498,7 +6498,6 @@
               <a:rPr lang="en-US" dirty="0"/>
               <a:t># = 2 makes the legend twice as large as other fonts</a:t>
             </a:r>
-            <a:endParaRPr lang="en-US" dirty="0"/>
           </a:p>
         </p:txBody>
       </p:sp>
@@ -11581,8 +11580,8 @@
         </p:nvSpPr>
         <p:spPr>
           <a:xfrm>
-            <a:off x="2362200" y="1397000"/>
-            <a:ext cx="1905000" cy="1905000"/>
+            <a:off x="2336800" y="1397000"/>
+            <a:ext cx="2082800" cy="2032000"/>
           </a:xfrm>
           <a:prstGeom prst="rect">
             <a:avLst/>
@@ -11611,15 +11610,21 @@
             <a:pPr algn="ctr"/>
             <a:r>
               <a:rPr lang="en-US" dirty="0" smtClean="0"/>
-              <a:t>MI via FCS</a:t>
-            </a:r>
+              <a:t>Multiple Imputation:</a:t>
+            </a:r>
+            <a:endParaRPr lang="en-US" dirty="0" smtClean="0"/>
           </a:p>
           <a:p>
             <a:pPr algn="ctr"/>
             <a:r>
+              <a:rPr lang="en-US" dirty="0"/>
+              <a:t>m</a:t>
+            </a:r>
+            <a:r>
               <a:rPr lang="en-US" dirty="0" smtClean="0"/>
-              <a:t>M=50</a:t>
-            </a:r>
+              <a:t>=50</a:t>
+            </a:r>
+            <a:endParaRPr lang="en-US" dirty="0" smtClean="0"/>
           </a:p>
           <a:p>
             <a:pPr algn="ctr"/>
@@ -11639,8 +11644,8 @@
         </p:nvSpPr>
         <p:spPr>
           <a:xfrm>
-            <a:off x="4572000" y="1371600"/>
-            <a:ext cx="1905000" cy="1905000"/>
+            <a:off x="4622800" y="1397000"/>
+            <a:ext cx="2082800" cy="2032000"/>
           </a:xfrm>
           <a:prstGeom prst="rect">
             <a:avLst/>
@@ -11669,8 +11674,16 @@
             <a:pPr algn="ctr"/>
             <a:r>
               <a:rPr lang="en-US" dirty="0" smtClean="0"/>
+              <a:t>Survival Analysis:</a:t>
+            </a:r>
+          </a:p>
+          <a:p>
+            <a:pPr algn="ctr"/>
+            <a:r>
+              <a:rPr lang="en-US" dirty="0" smtClean="0"/>
               <a:t>Kaplan-Meier</a:t>
             </a:r>
+            <a:endParaRPr lang="en-US" dirty="0" smtClean="0"/>
           </a:p>
           <a:p>
             <a:pPr algn="ctr"/>
@@ -11697,8 +11710,8 @@
         </p:nvSpPr>
         <p:spPr>
           <a:xfrm>
-            <a:off x="6705600" y="1371600"/>
-            <a:ext cx="1905000" cy="1905000"/>
+            <a:off x="6908800" y="1397000"/>
+            <a:ext cx="2082800" cy="2032000"/>
           </a:xfrm>
           <a:prstGeom prst="rect">
             <a:avLst/>
@@ -11727,16 +11740,24 @@
             <a:pPr algn="ctr"/>
             <a:r>
               <a:rPr lang="en-US" dirty="0" smtClean="0"/>
-              <a:t>IPTW weighted Cox model</a:t>
+              <a:t>Causal Analysis:</a:t>
             </a:r>
           </a:p>
           <a:p>
             <a:pPr algn="ctr"/>
             <a:r>
               <a:rPr lang="en-US" dirty="0" smtClean="0"/>
-              <a:t>Doubly robust IPTW Cox Model</a:t>
-            </a:r>
-            <a:endParaRPr lang="en-US" dirty="0"/>
+              <a:t>IPTW </a:t>
+            </a:r>
+            <a:r>
+              <a:rPr lang="en-US" dirty="0" smtClean="0"/>
+              <a:t>weighted Cox </a:t>
+            </a:r>
+            <a:r>
+              <a:rPr lang="en-US" dirty="0" smtClean="0"/>
+              <a:t>model</a:t>
+            </a:r>
+            <a:endParaRPr lang="en-US" dirty="0" smtClean="0"/>
           </a:p>
         </p:txBody>
       </p:sp>
@@ -11748,8 +11769,8 @@
         </p:nvSpPr>
         <p:spPr>
           <a:xfrm>
-            <a:off x="228600" y="1397000"/>
-            <a:ext cx="1905000" cy="1905000"/>
+            <a:off x="63500" y="1397000"/>
+            <a:ext cx="2082800" cy="2032000"/>
           </a:xfrm>
           <a:prstGeom prst="rect">
             <a:avLst/>
@@ -11781,6 +11802,46 @@
               <a:t>Data obtained from MDACC</a:t>
             </a:r>
             <a:endParaRPr lang="en-US" dirty="0"/>
+          </a:p>
+        </p:txBody>
+      </p:sp>
+      <p:sp>
+        <p:nvSpPr>
+          <p:cNvPr id="2" name="Down Arrow 1"/>
+          <p:cNvSpPr/>
+          <p:nvPr/>
+        </p:nvSpPr>
+        <p:spPr>
+          <a:xfrm>
+            <a:off x="2882900" y="622300"/>
+            <a:ext cx="990600" cy="685800"/>
+          </a:xfrm>
+          <a:prstGeom prst="downArrow">
+            <a:avLst/>
+          </a:prstGeom>
+        </p:spPr>
+        <p:style>
+          <a:lnRef idx="2">
+            <a:schemeClr val="accent2">
+              <a:shade val="50000"/>
+            </a:schemeClr>
+          </a:lnRef>
+          <a:fillRef idx="1">
+            <a:schemeClr val="accent2"/>
+          </a:fillRef>
+          <a:effectRef idx="0">
+            <a:schemeClr val="accent2"/>
+          </a:effectRef>
+          <a:fontRef idx="minor">
+            <a:schemeClr val="lt1"/>
+          </a:fontRef>
+        </p:style>
+        <p:txBody>
+          <a:bodyPr rtlCol="0" anchor="ctr"/>
+          <a:lstStyle/>
+          <a:p>
+            <a:pPr algn="ctr"/>
+            <a:endParaRPr lang="en-US"/>
           </a:p>
         </p:txBody>
       </p:sp>

</xml_diff>

<commit_message>
New mi examp and fixed bal check image
</commit_message>
<xml_diff>
--- a/mi_picture.pptx
+++ b/mi_picture.pptx
@@ -297,7 +297,7 @@
           <a:p>
             <a:fld id="{B17F4E78-F3C6-4442-AD2E-D4916562ED88}" type="datetimeFigureOut">
               <a:rPr lang="en-US" smtClean="0"/>
-              <a:t>11/18/2015</a:t>
+              <a:t>11/23/2015</a:t>
             </a:fld>
             <a:endParaRPr lang="en-US"/>
           </a:p>
@@ -467,7 +467,7 @@
           <a:p>
             <a:fld id="{B17F4E78-F3C6-4442-AD2E-D4916562ED88}" type="datetimeFigureOut">
               <a:rPr lang="en-US" smtClean="0"/>
-              <a:t>11/18/2015</a:t>
+              <a:t>11/23/2015</a:t>
             </a:fld>
             <a:endParaRPr lang="en-US"/>
           </a:p>
@@ -647,7 +647,7 @@
           <a:p>
             <a:fld id="{B17F4E78-F3C6-4442-AD2E-D4916562ED88}" type="datetimeFigureOut">
               <a:rPr lang="en-US" smtClean="0"/>
-              <a:t>11/18/2015</a:t>
+              <a:t>11/23/2015</a:t>
             </a:fld>
             <a:endParaRPr lang="en-US"/>
           </a:p>
@@ -817,7 +817,7 @@
           <a:p>
             <a:fld id="{B17F4E78-F3C6-4442-AD2E-D4916562ED88}" type="datetimeFigureOut">
               <a:rPr lang="en-US" smtClean="0"/>
-              <a:t>11/18/2015</a:t>
+              <a:t>11/23/2015</a:t>
             </a:fld>
             <a:endParaRPr lang="en-US"/>
           </a:p>
@@ -1063,7 +1063,7 @@
           <a:p>
             <a:fld id="{B17F4E78-F3C6-4442-AD2E-D4916562ED88}" type="datetimeFigureOut">
               <a:rPr lang="en-US" smtClean="0"/>
-              <a:t>11/18/2015</a:t>
+              <a:t>11/23/2015</a:t>
             </a:fld>
             <a:endParaRPr lang="en-US"/>
           </a:p>
@@ -1351,7 +1351,7 @@
           <a:p>
             <a:fld id="{B17F4E78-F3C6-4442-AD2E-D4916562ED88}" type="datetimeFigureOut">
               <a:rPr lang="en-US" smtClean="0"/>
-              <a:t>11/18/2015</a:t>
+              <a:t>11/23/2015</a:t>
             </a:fld>
             <a:endParaRPr lang="en-US"/>
           </a:p>
@@ -1773,7 +1773,7 @@
           <a:p>
             <a:fld id="{B17F4E78-F3C6-4442-AD2E-D4916562ED88}" type="datetimeFigureOut">
               <a:rPr lang="en-US" smtClean="0"/>
-              <a:t>11/18/2015</a:t>
+              <a:t>11/23/2015</a:t>
             </a:fld>
             <a:endParaRPr lang="en-US"/>
           </a:p>
@@ -1891,7 +1891,7 @@
           <a:p>
             <a:fld id="{B17F4E78-F3C6-4442-AD2E-D4916562ED88}" type="datetimeFigureOut">
               <a:rPr lang="en-US" smtClean="0"/>
-              <a:t>11/18/2015</a:t>
+              <a:t>11/23/2015</a:t>
             </a:fld>
             <a:endParaRPr lang="en-US"/>
           </a:p>
@@ -1986,7 +1986,7 @@
           <a:p>
             <a:fld id="{B17F4E78-F3C6-4442-AD2E-D4916562ED88}" type="datetimeFigureOut">
               <a:rPr lang="en-US" smtClean="0"/>
-              <a:t>11/18/2015</a:t>
+              <a:t>11/23/2015</a:t>
             </a:fld>
             <a:endParaRPr lang="en-US"/>
           </a:p>
@@ -2263,7 +2263,7 @@
           <a:p>
             <a:fld id="{B17F4E78-F3C6-4442-AD2E-D4916562ED88}" type="datetimeFigureOut">
               <a:rPr lang="en-US" smtClean="0"/>
-              <a:t>11/18/2015</a:t>
+              <a:t>11/23/2015</a:t>
             </a:fld>
             <a:endParaRPr lang="en-US"/>
           </a:p>
@@ -2516,7 +2516,7 @@
           <a:p>
             <a:fld id="{B17F4E78-F3C6-4442-AD2E-D4916562ED88}" type="datetimeFigureOut">
               <a:rPr lang="en-US" smtClean="0"/>
-              <a:t>11/18/2015</a:t>
+              <a:t>11/23/2015</a:t>
             </a:fld>
             <a:endParaRPr lang="en-US"/>
           </a:p>
@@ -2729,7 +2729,7 @@
           <a:p>
             <a:fld id="{B17F4E78-F3C6-4442-AD2E-D4916562ED88}" type="datetimeFigureOut">
               <a:rPr lang="en-US" smtClean="0"/>
-              <a:t>11/18/2015</a:t>
+              <a:t>11/23/2015</a:t>
             </a:fld>
             <a:endParaRPr lang="en-US"/>
           </a:p>
@@ -3113,20 +3113,20 @@
           <p:nvPr>
             <p:extLst>
               <p:ext uri="{D42A27DB-BD31-4B8C-83A1-F6EECF244321}">
-                <p14:modId xmlns:p14="http://schemas.microsoft.com/office/powerpoint/2010/main" val="228736865"/>
+                <p14:modId xmlns:p14="http://schemas.microsoft.com/office/powerpoint/2010/main" val="2368917195"/>
               </p:ext>
             </p:extLst>
           </p:nvPr>
         </p:nvGraphicFramePr>
         <p:xfrm>
-          <a:off x="609600" y="3276600"/>
+          <a:off x="381000" y="3276600"/>
           <a:ext cx="1371600" cy="958368"/>
         </p:xfrm>
         <a:graphic>
           <a:graphicData uri="http://schemas.openxmlformats.org/drawingml/2006/table">
             <a:tbl>
               <a:tblPr firstRow="1" bandRow="1">
-                <a:tableStyleId>{5C22544A-7EE6-4342-B048-85BDC9FD1C3A}</a:tableStyleId>
+                <a:tableStyleId>{073A0DAA-6AF3-43AB-8588-CEC1D06C72B9}</a:tableStyleId>
               </a:tblPr>
               <a:tblGrid>
                 <a:gridCol w="461216"/>
@@ -3235,7 +3235,7 @@
                     <a:p>
                       <a:pPr algn="ctr" fontAlgn="b"/>
                       <a:r>
-                        <a:rPr lang="en-US" sz="1100" u="none" strike="noStrike" dirty="0">
+                        <a:rPr lang="en-US" sz="1100" b="1" u="sng" strike="noStrike" dirty="0">
                           <a:solidFill>
                             <a:srgbClr val="FF0000"/>
                           </a:solidFill>
@@ -3243,7 +3243,7 @@
                         </a:rPr>
                         <a:t>?</a:t>
                       </a:r>
-                      <a:endParaRPr lang="en-US" sz="1100" b="0" i="0" u="none" strike="noStrike" dirty="0">
+                      <a:endParaRPr lang="en-US" sz="1100" b="1" i="0" u="sng" strike="noStrike" dirty="0">
                         <a:solidFill>
                           <a:srgbClr val="FF0000"/>
                         </a:solidFill>
@@ -3332,7 +3332,7 @@
                     <a:p>
                       <a:pPr algn="ctr" fontAlgn="b"/>
                       <a:r>
-                        <a:rPr lang="en-US" sz="1100" u="none" strike="noStrike" dirty="0">
+                        <a:rPr lang="en-US" sz="1100" b="1" u="sng" strike="noStrike" dirty="0">
                           <a:solidFill>
                             <a:srgbClr val="FF0000"/>
                           </a:solidFill>
@@ -3340,7 +3340,7 @@
                         </a:rPr>
                         <a:t>?</a:t>
                       </a:r>
-                      <a:endParaRPr lang="en-US" sz="1100" b="0" i="0" u="none" strike="noStrike" dirty="0">
+                      <a:endParaRPr lang="en-US" sz="1100" b="1" i="0" u="sng" strike="noStrike" dirty="0">
                         <a:solidFill>
                           <a:srgbClr val="FF0000"/>
                         </a:solidFill>
@@ -3431,12 +3431,8 @@
                     <a:p>
                       <a:pPr algn="ctr" fontAlgn="b"/>
                       <a:r>
-                        <a:rPr lang="en-US" sz="1100" b="0" i="0" u="none" strike="noStrike" dirty="0" smtClean="0">
-                          <a:solidFill>
-                            <a:srgbClr val="000000"/>
-                          </a:solidFill>
-                          <a:effectLst/>
-                          <a:latin typeface="Calibri"/>
+                        <a:rPr lang="en-US" sz="1100" u="none" strike="noStrike" dirty="0" smtClean="0">
+                          <a:effectLst/>
                         </a:rPr>
                         <a:t>⁞</a:t>
                       </a:r>
@@ -3458,32 +3454,31 @@
                     <a:p>
                       <a:pPr algn="ctr" fontAlgn="b"/>
                       <a:r>
-                        <a:rPr lang="en-US" sz="1100" b="0" i="0" u="none" strike="noStrike" dirty="0" smtClean="0">
-                          <a:solidFill>
-                            <a:srgbClr val="000000"/>
-                          </a:solidFill>
-                          <a:effectLst/>
-                          <a:latin typeface="+mn-lt"/>
+                        <a:rPr lang="en-US" sz="1100" u="none" strike="noStrike" dirty="0" smtClean="0">
+                          <a:effectLst/>
                         </a:rPr>
                         <a:t>⁞</a:t>
                       </a:r>
-                    </a:p>
-                  </a:txBody>
-                  <a:tcPr marL="9525" marR="9525" marT="9525" marB="0" anchor="b"/>
-                </a:tc>
-                <a:tc>
-                  <a:txBody>
-                    <a:bodyPr/>
-                    <a:lstStyle/>
-                    <a:p>
-                      <a:pPr algn="ctr" fontAlgn="b"/>
-                      <a:r>
-                        <a:rPr lang="en-US" sz="1100" b="0" i="0" u="none" strike="noStrike" dirty="0" smtClean="0">
-                          <a:solidFill>
-                            <a:srgbClr val="000000"/>
-                          </a:solidFill>
-                          <a:effectLst/>
-                          <a:latin typeface="+mn-lt"/>
+                      <a:endParaRPr lang="en-US" sz="1100" b="0" i="0" u="none" strike="noStrike" dirty="0" smtClean="0">
+                        <a:solidFill>
+                          <a:srgbClr val="000000"/>
+                        </a:solidFill>
+                        <a:effectLst/>
+                        <a:latin typeface="+mn-lt"/>
+                      </a:endParaRPr>
+                    </a:p>
+                  </a:txBody>
+                  <a:tcPr marL="9525" marR="9525" marT="9525" marB="0" anchor="b"/>
+                </a:tc>
+                <a:tc>
+                  <a:txBody>
+                    <a:bodyPr/>
+                    <a:lstStyle/>
+                    <a:p>
+                      <a:pPr algn="ctr" fontAlgn="b"/>
+                      <a:r>
+                        <a:rPr lang="en-US" sz="1100" u="none" strike="noStrike" dirty="0" smtClean="0">
+                          <a:effectLst/>
                         </a:rPr>
                         <a:t>⁞</a:t>
                       </a:r>
@@ -3512,20 +3507,20 @@
           <p:nvPr>
             <p:extLst>
               <p:ext uri="{D42A27DB-BD31-4B8C-83A1-F6EECF244321}">
-                <p14:modId xmlns:p14="http://schemas.microsoft.com/office/powerpoint/2010/main" val="2014382172"/>
+                <p14:modId xmlns:p14="http://schemas.microsoft.com/office/powerpoint/2010/main" val="2864342762"/>
               </p:ext>
             </p:extLst>
           </p:nvPr>
         </p:nvGraphicFramePr>
         <p:xfrm>
-          <a:off x="2895600" y="2133600"/>
+          <a:off x="2667000" y="2133600"/>
           <a:ext cx="1371600" cy="958368"/>
         </p:xfrm>
         <a:graphic>
           <a:graphicData uri="http://schemas.openxmlformats.org/drawingml/2006/table">
             <a:tbl>
               <a:tblPr firstRow="1" bandRow="1">
-                <a:tableStyleId>{5C22544A-7EE6-4342-B048-85BDC9FD1C3A}</a:tableStyleId>
+                <a:tableStyleId>{073A0DAA-6AF3-43AB-8588-CEC1D06C72B9}</a:tableStyleId>
               </a:tblPr>
               <a:tblGrid>
                 <a:gridCol w="461216"/>
@@ -3611,12 +3606,12 @@
                     <a:p>
                       <a:pPr algn="ctr" fontAlgn="b"/>
                       <a:r>
-                        <a:rPr lang="en-US" sz="1100" u="none" strike="noStrike">
+                        <a:rPr lang="en-US" sz="1100" u="none" strike="noStrike" dirty="0">
                           <a:effectLst/>
                         </a:rPr>
                         <a:t>24</a:t>
                       </a:r>
-                      <a:endParaRPr lang="en-US" sz="1100" b="0" i="0" u="none" strike="noStrike">
+                      <a:endParaRPr lang="en-US" sz="1100" b="0" i="0" u="none" strike="noStrike" dirty="0">
                         <a:solidFill>
                           <a:srgbClr val="000000"/>
                         </a:solidFill>
@@ -3634,17 +3629,17 @@
                     <a:p>
                       <a:pPr algn="ctr" fontAlgn="b"/>
                       <a:r>
-                        <a:rPr lang="en-US" sz="1100" u="none" strike="noStrike" dirty="0" smtClean="0">
+                        <a:rPr lang="en-US" sz="1100" b="1" u="sng" strike="noStrike" dirty="0" smtClean="0">
                           <a:solidFill>
-                            <a:srgbClr val="00B050"/>
+                            <a:srgbClr val="41B319"/>
                           </a:solidFill>
                           <a:effectLst/>
                         </a:rPr>
                         <a:t>170</a:t>
                       </a:r>
-                      <a:endParaRPr lang="en-US" sz="1100" b="0" i="0" u="none" strike="noStrike" dirty="0">
-                        <a:solidFill>
-                          <a:srgbClr val="00B050"/>
+                      <a:endParaRPr lang="en-US" sz="1100" b="1" i="0" u="sng" strike="noStrike" dirty="0">
+                        <a:solidFill>
+                          <a:srgbClr val="41B319"/>
                         </a:solidFill>
                         <a:effectLst/>
                         <a:latin typeface="Calibri"/>
@@ -3729,23 +3724,27 @@
                     <a:bodyPr/>
                     <a:lstStyle/>
                     <a:p>
-                      <a:pPr algn="ctr" fontAlgn="b"/>
-                      <a:r>
-                        <a:rPr lang="en-US" sz="1100" b="0" i="0" u="none" strike="noStrike" dirty="0" smtClean="0">
+                      <a:pPr marL="0" algn="ctr" defTabSz="914400" rtl="0" eaLnBrk="1" fontAlgn="b" latinLnBrk="0" hangingPunct="1"/>
+                      <a:r>
+                        <a:rPr lang="en-US" sz="1100" b="1" u="sng" strike="noStrike" kern="1200" dirty="0" smtClean="0">
                           <a:solidFill>
-                            <a:srgbClr val="00B050"/>
+                            <a:srgbClr val="41B319"/>
                           </a:solidFill>
                           <a:effectLst/>
                           <a:latin typeface="+mn-lt"/>
+                          <a:ea typeface="+mn-ea"/>
+                          <a:cs typeface="+mn-cs"/>
                         </a:rPr>
                         <a:t>68</a:t>
                       </a:r>
-                      <a:endParaRPr lang="en-US" sz="1100" b="0" i="0" u="none" strike="noStrike" dirty="0">
-                        <a:solidFill>
-                          <a:srgbClr val="00B050"/>
-                        </a:solidFill>
-                        <a:effectLst/>
-                        <a:latin typeface="Calibri"/>
+                      <a:endParaRPr lang="en-US" sz="1100" b="1" u="sng" strike="noStrike" kern="1200" dirty="0">
+                        <a:solidFill>
+                          <a:srgbClr val="41B319"/>
+                        </a:solidFill>
+                        <a:effectLst/>
+                        <a:latin typeface="+mn-lt"/>
+                        <a:ea typeface="+mn-ea"/>
+                        <a:cs typeface="+mn-cs"/>
                       </a:endParaRPr>
                     </a:p>
                   </a:txBody>
@@ -3831,12 +3830,8 @@
                     <a:p>
                       <a:pPr algn="ctr" fontAlgn="b"/>
                       <a:r>
-                        <a:rPr lang="en-US" sz="1100" b="0" i="0" u="none" strike="noStrike" dirty="0" smtClean="0">
-                          <a:solidFill>
-                            <a:srgbClr val="000000"/>
-                          </a:solidFill>
-                          <a:effectLst/>
-                          <a:latin typeface="Calibri"/>
+                        <a:rPr lang="en-US" sz="1100" u="none" strike="noStrike" dirty="0" smtClean="0">
+                          <a:effectLst/>
                         </a:rPr>
                         <a:t>⁞</a:t>
                       </a:r>
@@ -3858,32 +3853,31 @@
                     <a:p>
                       <a:pPr algn="ctr" fontAlgn="b"/>
                       <a:r>
-                        <a:rPr lang="en-US" sz="1100" b="0" i="0" u="none" strike="noStrike" dirty="0" smtClean="0">
-                          <a:solidFill>
-                            <a:srgbClr val="000000"/>
-                          </a:solidFill>
-                          <a:effectLst/>
-                          <a:latin typeface="+mn-lt"/>
+                        <a:rPr lang="en-US" sz="1100" u="none" strike="noStrike" dirty="0" smtClean="0">
+                          <a:effectLst/>
                         </a:rPr>
                         <a:t>⁞</a:t>
                       </a:r>
-                    </a:p>
-                  </a:txBody>
-                  <a:tcPr marL="9525" marR="9525" marT="9525" marB="0" anchor="b"/>
-                </a:tc>
-                <a:tc>
-                  <a:txBody>
-                    <a:bodyPr/>
-                    <a:lstStyle/>
-                    <a:p>
-                      <a:pPr algn="ctr" fontAlgn="b"/>
-                      <a:r>
-                        <a:rPr lang="en-US" sz="1100" b="0" i="0" u="none" strike="noStrike" dirty="0" smtClean="0">
-                          <a:solidFill>
-                            <a:srgbClr val="000000"/>
-                          </a:solidFill>
-                          <a:effectLst/>
-                          <a:latin typeface="+mn-lt"/>
+                      <a:endParaRPr lang="en-US" sz="1100" b="0" i="0" u="none" strike="noStrike" dirty="0" smtClean="0">
+                        <a:solidFill>
+                          <a:srgbClr val="000000"/>
+                        </a:solidFill>
+                        <a:effectLst/>
+                        <a:latin typeface="+mn-lt"/>
+                      </a:endParaRPr>
+                    </a:p>
+                  </a:txBody>
+                  <a:tcPr marL="9525" marR="9525" marT="9525" marB="0" anchor="b"/>
+                </a:tc>
+                <a:tc>
+                  <a:txBody>
+                    <a:bodyPr/>
+                    <a:lstStyle/>
+                    <a:p>
+                      <a:pPr algn="ctr" fontAlgn="b"/>
+                      <a:r>
+                        <a:rPr lang="en-US" sz="1100" u="none" strike="noStrike" dirty="0" smtClean="0">
+                          <a:effectLst/>
                         </a:rPr>
                         <a:t>⁞</a:t>
                       </a:r>
@@ -3912,20 +3906,20 @@
           <p:nvPr>
             <p:extLst>
               <p:ext uri="{D42A27DB-BD31-4B8C-83A1-F6EECF244321}">
-                <p14:modId xmlns:p14="http://schemas.microsoft.com/office/powerpoint/2010/main" val="3220933304"/>
+                <p14:modId xmlns:p14="http://schemas.microsoft.com/office/powerpoint/2010/main" val="3630197457"/>
               </p:ext>
             </p:extLst>
           </p:nvPr>
         </p:nvGraphicFramePr>
         <p:xfrm>
-          <a:off x="2895600" y="3276600"/>
+          <a:off x="2667000" y="3276600"/>
           <a:ext cx="1371600" cy="958368"/>
         </p:xfrm>
         <a:graphic>
           <a:graphicData uri="http://schemas.openxmlformats.org/drawingml/2006/table">
             <a:tbl>
               <a:tblPr firstRow="1" bandRow="1">
-                <a:tableStyleId>{5C22544A-7EE6-4342-B048-85BDC9FD1C3A}</a:tableStyleId>
+                <a:tableStyleId>{073A0DAA-6AF3-43AB-8588-CEC1D06C72B9}</a:tableStyleId>
               </a:tblPr>
               <a:tblGrid>
                 <a:gridCol w="461216"/>
@@ -3963,12 +3957,12 @@
                     <a:p>
                       <a:pPr algn="ctr" fontAlgn="b"/>
                       <a:r>
-                        <a:rPr lang="en-US" sz="1100" u="none" strike="noStrike">
+                        <a:rPr lang="en-US" sz="1100" u="none" strike="noStrike" dirty="0">
                           <a:effectLst/>
                         </a:rPr>
                         <a:t>Weight</a:t>
                       </a:r>
-                      <a:endParaRPr lang="en-US" sz="1100" b="1" i="0" u="none" strike="noStrike">
+                      <a:endParaRPr lang="en-US" sz="1100" b="1" i="0" u="none" strike="noStrike" dirty="0">
                         <a:solidFill>
                           <a:srgbClr val="FFFFFF"/>
                         </a:solidFill>
@@ -4032,22 +4026,27 @@
                     <a:bodyPr/>
                     <a:lstStyle/>
                     <a:p>
-                      <a:pPr algn="ctr" fontAlgn="b"/>
-                      <a:r>
-                        <a:rPr lang="en-US" sz="1100" u="none" strike="noStrike" dirty="0" smtClean="0">
+                      <a:pPr marL="0" algn="ctr" defTabSz="914400" rtl="0" eaLnBrk="1" fontAlgn="b" latinLnBrk="0" hangingPunct="1"/>
+                      <a:r>
+                        <a:rPr lang="en-US" sz="1100" b="1" u="sng" strike="noStrike" kern="1200" dirty="0" smtClean="0">
                           <a:solidFill>
-                            <a:srgbClr val="00B050"/>
+                            <a:srgbClr val="41B319"/>
                           </a:solidFill>
                           <a:effectLst/>
+                          <a:latin typeface="+mn-lt"/>
+                          <a:ea typeface="+mn-ea"/>
+                          <a:cs typeface="+mn-cs"/>
                         </a:rPr>
                         <a:t>150</a:t>
                       </a:r>
-                      <a:endParaRPr lang="en-US" sz="1100" b="0" i="0" u="none" strike="noStrike" dirty="0">
-                        <a:solidFill>
-                          <a:srgbClr val="00B050"/>
-                        </a:solidFill>
-                        <a:effectLst/>
-                        <a:latin typeface="Calibri"/>
+                      <a:endParaRPr lang="en-US" sz="1100" b="1" u="sng" strike="noStrike" kern="1200" dirty="0">
+                        <a:solidFill>
+                          <a:srgbClr val="41B319"/>
+                        </a:solidFill>
+                        <a:effectLst/>
+                        <a:latin typeface="+mn-lt"/>
+                        <a:ea typeface="+mn-ea"/>
+                        <a:cs typeface="+mn-cs"/>
                       </a:endParaRPr>
                     </a:p>
                   </a:txBody>
@@ -4129,22 +4128,27 @@
                     <a:bodyPr/>
                     <a:lstStyle/>
                     <a:p>
-                      <a:pPr algn="ctr" fontAlgn="b"/>
-                      <a:r>
-                        <a:rPr lang="en-US" sz="1100" u="none" strike="noStrike" dirty="0" smtClean="0">
+                      <a:pPr marL="0" algn="ctr" defTabSz="914400" rtl="0" eaLnBrk="1" fontAlgn="b" latinLnBrk="0" hangingPunct="1"/>
+                      <a:r>
+                        <a:rPr lang="en-US" sz="1100" b="1" u="sng" strike="noStrike" kern="1200" dirty="0" smtClean="0">
                           <a:solidFill>
-                            <a:srgbClr val="00B050"/>
+                            <a:srgbClr val="41B319"/>
                           </a:solidFill>
                           <a:effectLst/>
+                          <a:latin typeface="+mn-lt"/>
+                          <a:ea typeface="+mn-ea"/>
+                          <a:cs typeface="+mn-cs"/>
                         </a:rPr>
                         <a:t>64</a:t>
                       </a:r>
-                      <a:endParaRPr lang="en-US" sz="1100" b="0" i="0" u="none" strike="noStrike" dirty="0">
-                        <a:solidFill>
-                          <a:srgbClr val="00B050"/>
-                        </a:solidFill>
-                        <a:effectLst/>
-                        <a:latin typeface="Calibri"/>
+                      <a:endParaRPr lang="en-US" sz="1100" b="1" u="sng" strike="noStrike" kern="1200" dirty="0">
+                        <a:solidFill>
+                          <a:srgbClr val="41B319"/>
+                        </a:solidFill>
+                        <a:effectLst/>
+                        <a:latin typeface="+mn-lt"/>
+                        <a:ea typeface="+mn-ea"/>
+                        <a:cs typeface="+mn-cs"/>
                       </a:endParaRPr>
                     </a:p>
                   </a:txBody>
@@ -4230,12 +4234,8 @@
                     <a:p>
                       <a:pPr algn="ctr" fontAlgn="b"/>
                       <a:r>
-                        <a:rPr lang="en-US" sz="1100" b="0" i="0" u="none" strike="noStrike" dirty="0" smtClean="0">
-                          <a:solidFill>
-                            <a:srgbClr val="000000"/>
-                          </a:solidFill>
-                          <a:effectLst/>
-                          <a:latin typeface="Calibri"/>
+                        <a:rPr lang="en-US" sz="1100" u="none" strike="noStrike" dirty="0" smtClean="0">
+                          <a:effectLst/>
                         </a:rPr>
                         <a:t>⁞</a:t>
                       </a:r>
@@ -4257,32 +4257,31 @@
                     <a:p>
                       <a:pPr algn="ctr" fontAlgn="b"/>
                       <a:r>
-                        <a:rPr lang="en-US" sz="1100" b="0" i="0" u="none" strike="noStrike" dirty="0" smtClean="0">
-                          <a:solidFill>
-                            <a:srgbClr val="000000"/>
-                          </a:solidFill>
-                          <a:effectLst/>
-                          <a:latin typeface="+mn-lt"/>
+                        <a:rPr lang="en-US" sz="1100" u="none" strike="noStrike" dirty="0" smtClean="0">
+                          <a:effectLst/>
                         </a:rPr>
                         <a:t>⁞</a:t>
                       </a:r>
-                    </a:p>
-                  </a:txBody>
-                  <a:tcPr marL="9525" marR="9525" marT="9525" marB="0" anchor="b"/>
-                </a:tc>
-                <a:tc>
-                  <a:txBody>
-                    <a:bodyPr/>
-                    <a:lstStyle/>
-                    <a:p>
-                      <a:pPr algn="ctr" fontAlgn="b"/>
-                      <a:r>
-                        <a:rPr lang="en-US" sz="1100" b="0" i="0" u="none" strike="noStrike" dirty="0" smtClean="0">
-                          <a:solidFill>
-                            <a:srgbClr val="000000"/>
-                          </a:solidFill>
-                          <a:effectLst/>
-                          <a:latin typeface="+mn-lt"/>
+                      <a:endParaRPr lang="en-US" sz="1100" b="0" i="0" u="none" strike="noStrike" dirty="0" smtClean="0">
+                        <a:solidFill>
+                          <a:srgbClr val="000000"/>
+                        </a:solidFill>
+                        <a:effectLst/>
+                        <a:latin typeface="+mn-lt"/>
+                      </a:endParaRPr>
+                    </a:p>
+                  </a:txBody>
+                  <a:tcPr marL="9525" marR="9525" marT="9525" marB="0" anchor="b"/>
+                </a:tc>
+                <a:tc>
+                  <a:txBody>
+                    <a:bodyPr/>
+                    <a:lstStyle/>
+                    <a:p>
+                      <a:pPr algn="ctr" fontAlgn="b"/>
+                      <a:r>
+                        <a:rPr lang="en-US" sz="1100" u="none" strike="noStrike" dirty="0" smtClean="0">
+                          <a:effectLst/>
                         </a:rPr>
                         <a:t>⁞</a:t>
                       </a:r>
@@ -4311,20 +4310,20 @@
           <p:nvPr>
             <p:extLst>
               <p:ext uri="{D42A27DB-BD31-4B8C-83A1-F6EECF244321}">
-                <p14:modId xmlns:p14="http://schemas.microsoft.com/office/powerpoint/2010/main" val="1872567808"/>
+                <p14:modId xmlns:p14="http://schemas.microsoft.com/office/powerpoint/2010/main" val="844930547"/>
               </p:ext>
             </p:extLst>
           </p:nvPr>
         </p:nvGraphicFramePr>
         <p:xfrm>
-          <a:off x="2895600" y="4572000"/>
+          <a:off x="2667000" y="4572000"/>
           <a:ext cx="1371600" cy="958368"/>
         </p:xfrm>
         <a:graphic>
           <a:graphicData uri="http://schemas.openxmlformats.org/drawingml/2006/table">
             <a:tbl>
               <a:tblPr firstRow="1" bandRow="1">
-                <a:tableStyleId>{5C22544A-7EE6-4342-B048-85BDC9FD1C3A}</a:tableStyleId>
+                <a:tableStyleId>{073A0DAA-6AF3-43AB-8588-CEC1D06C72B9}</a:tableStyleId>
               </a:tblPr>
               <a:tblGrid>
                 <a:gridCol w="461216"/>
@@ -4431,23 +4430,27 @@
                     <a:bodyPr/>
                     <a:lstStyle/>
                     <a:p>
-                      <a:pPr algn="ctr" fontAlgn="b"/>
-                      <a:r>
-                        <a:rPr lang="en-US" sz="1100" b="0" i="0" u="none" strike="noStrike" dirty="0" smtClean="0">
+                      <a:pPr marL="0" algn="ctr" defTabSz="914400" rtl="0" eaLnBrk="1" fontAlgn="b" latinLnBrk="0" hangingPunct="1"/>
+                      <a:r>
+                        <a:rPr lang="en-US" sz="1100" b="1" u="sng" strike="noStrike" kern="1200" dirty="0" smtClean="0">
                           <a:solidFill>
-                            <a:srgbClr val="00B050"/>
+                            <a:srgbClr val="41B319"/>
                           </a:solidFill>
                           <a:effectLst/>
                           <a:latin typeface="+mn-lt"/>
+                          <a:ea typeface="+mn-ea"/>
+                          <a:cs typeface="+mn-cs"/>
                         </a:rPr>
                         <a:t>163</a:t>
                       </a:r>
-                      <a:endParaRPr lang="en-US" sz="1100" b="0" i="0" u="none" strike="noStrike" dirty="0">
-                        <a:solidFill>
-                          <a:srgbClr val="00B050"/>
-                        </a:solidFill>
-                        <a:effectLst/>
-                        <a:latin typeface="Calibri"/>
+                      <a:endParaRPr lang="en-US" sz="1100" b="1" u="sng" strike="noStrike" kern="1200" dirty="0">
+                        <a:solidFill>
+                          <a:srgbClr val="41B319"/>
+                        </a:solidFill>
+                        <a:effectLst/>
+                        <a:latin typeface="+mn-lt"/>
+                        <a:ea typeface="+mn-ea"/>
+                        <a:cs typeface="+mn-cs"/>
                       </a:endParaRPr>
                     </a:p>
                   </a:txBody>
@@ -4529,22 +4532,27 @@
                     <a:bodyPr/>
                     <a:lstStyle/>
                     <a:p>
-                      <a:pPr algn="ctr" fontAlgn="b"/>
-                      <a:r>
-                        <a:rPr lang="en-US" sz="1100" u="none" strike="noStrike" dirty="0" smtClean="0">
+                      <a:pPr marL="0" algn="ctr" defTabSz="914400" rtl="0" eaLnBrk="1" fontAlgn="b" latinLnBrk="0" hangingPunct="1"/>
+                      <a:r>
+                        <a:rPr lang="en-US" sz="1100" b="1" u="sng" strike="noStrike" kern="1200" dirty="0" smtClean="0">
                           <a:solidFill>
-                            <a:srgbClr val="00B050"/>
+                            <a:srgbClr val="41B319"/>
                           </a:solidFill>
                           <a:effectLst/>
+                          <a:latin typeface="+mn-lt"/>
+                          <a:ea typeface="+mn-ea"/>
+                          <a:cs typeface="+mn-cs"/>
                         </a:rPr>
                         <a:t>66</a:t>
                       </a:r>
-                      <a:endParaRPr lang="en-US" sz="1100" b="0" i="0" u="none" strike="noStrike" dirty="0">
-                        <a:solidFill>
-                          <a:srgbClr val="00B050"/>
-                        </a:solidFill>
-                        <a:effectLst/>
-                        <a:latin typeface="Calibri"/>
+                      <a:endParaRPr lang="en-US" sz="1100" b="1" u="sng" strike="noStrike" kern="1200" dirty="0">
+                        <a:solidFill>
+                          <a:srgbClr val="41B319"/>
+                        </a:solidFill>
+                        <a:effectLst/>
+                        <a:latin typeface="+mn-lt"/>
+                        <a:ea typeface="+mn-ea"/>
+                        <a:cs typeface="+mn-cs"/>
                       </a:endParaRPr>
                     </a:p>
                   </a:txBody>
@@ -4630,12 +4638,8 @@
                     <a:p>
                       <a:pPr algn="ctr" fontAlgn="b"/>
                       <a:r>
-                        <a:rPr lang="en-US" sz="1100" b="0" i="0" u="none" strike="noStrike" dirty="0" smtClean="0">
-                          <a:solidFill>
-                            <a:srgbClr val="000000"/>
-                          </a:solidFill>
-                          <a:effectLst/>
-                          <a:latin typeface="Calibri"/>
+                        <a:rPr lang="en-US" sz="1100" u="none" strike="noStrike" dirty="0" smtClean="0">
+                          <a:effectLst/>
                         </a:rPr>
                         <a:t>⁞</a:t>
                       </a:r>
@@ -4657,32 +4661,31 @@
                     <a:p>
                       <a:pPr algn="ctr" fontAlgn="b"/>
                       <a:r>
-                        <a:rPr lang="en-US" sz="1100" b="0" i="0" u="none" strike="noStrike" dirty="0" smtClean="0">
-                          <a:solidFill>
-                            <a:srgbClr val="000000"/>
-                          </a:solidFill>
-                          <a:effectLst/>
-                          <a:latin typeface="+mn-lt"/>
+                        <a:rPr lang="en-US" sz="1100" u="none" strike="noStrike" dirty="0" smtClean="0">
+                          <a:effectLst/>
                         </a:rPr>
                         <a:t>⁞</a:t>
                       </a:r>
-                    </a:p>
-                  </a:txBody>
-                  <a:tcPr marL="9525" marR="9525" marT="9525" marB="0" anchor="b"/>
-                </a:tc>
-                <a:tc>
-                  <a:txBody>
-                    <a:bodyPr/>
-                    <a:lstStyle/>
-                    <a:p>
-                      <a:pPr algn="ctr" fontAlgn="b"/>
-                      <a:r>
-                        <a:rPr lang="en-US" sz="1100" b="0" i="0" u="none" strike="noStrike" dirty="0" smtClean="0">
-                          <a:solidFill>
-                            <a:srgbClr val="000000"/>
-                          </a:solidFill>
-                          <a:effectLst/>
-                          <a:latin typeface="+mn-lt"/>
+                      <a:endParaRPr lang="en-US" sz="1100" b="0" i="0" u="none" strike="noStrike" dirty="0" smtClean="0">
+                        <a:solidFill>
+                          <a:srgbClr val="000000"/>
+                        </a:solidFill>
+                        <a:effectLst/>
+                        <a:latin typeface="+mn-lt"/>
+                      </a:endParaRPr>
+                    </a:p>
+                  </a:txBody>
+                  <a:tcPr marL="9525" marR="9525" marT="9525" marB="0" anchor="b"/>
+                </a:tc>
+                <a:tc>
+                  <a:txBody>
+                    <a:bodyPr/>
+                    <a:lstStyle/>
+                    <a:p>
+                      <a:pPr algn="ctr" fontAlgn="b"/>
+                      <a:r>
+                        <a:rPr lang="en-US" sz="1100" u="none" strike="noStrike" dirty="0" smtClean="0">
+                          <a:effectLst/>
                         </a:rPr>
                         <a:t>⁞</a:t>
                       </a:r>
@@ -4712,7 +4715,7 @@
         </p:nvCxnSpPr>
         <p:spPr>
           <a:xfrm flipV="1">
-            <a:off x="1981200" y="2612784"/>
+            <a:off x="1752600" y="2612784"/>
             <a:ext cx="914400" cy="663816"/>
           </a:xfrm>
           <a:prstGeom prst="line">
@@ -4744,7 +4747,7 @@
         </p:nvCxnSpPr>
         <p:spPr>
           <a:xfrm>
-            <a:off x="1981200" y="3733800"/>
+            <a:off x="1752600" y="3733800"/>
             <a:ext cx="914400" cy="21984"/>
           </a:xfrm>
           <a:prstGeom prst="line">
@@ -4776,7 +4779,7 @@
         </p:nvCxnSpPr>
         <p:spPr>
           <a:xfrm>
-            <a:off x="1981200" y="4191000"/>
+            <a:off x="1752600" y="4191000"/>
             <a:ext cx="914400" cy="860184"/>
           </a:xfrm>
           <a:prstGeom prst="line">
@@ -4806,7 +4809,7 @@
         </p:nvSpPr>
         <p:spPr>
           <a:xfrm>
-            <a:off x="630649" y="2910657"/>
+            <a:off x="367413" y="2864490"/>
             <a:ext cx="1385187" cy="369332"/>
           </a:xfrm>
           <a:prstGeom prst="rect">
@@ -4836,8 +4839,8 @@
         </p:nvSpPr>
         <p:spPr>
           <a:xfrm>
-            <a:off x="2971801" y="1447800"/>
-            <a:ext cx="1295400" cy="646331"/>
+            <a:off x="2667000" y="1447799"/>
+            <a:ext cx="1358900" cy="646331"/>
           </a:xfrm>
           <a:prstGeom prst="rect">
             <a:avLst/>
@@ -4853,7 +4856,11 @@
             <a:pPr algn="ctr"/>
             <a:r>
               <a:rPr lang="en-US" dirty="0" smtClean="0"/>
-              <a:t>M=3 MI datasets</a:t>
+              <a:t>m=3 </a:t>
+            </a:r>
+            <a:r>
+              <a:rPr lang="en-US" dirty="0" smtClean="0"/>
+              <a:t>MI datasets</a:t>
             </a:r>
             <a:endParaRPr lang="en-US" dirty="0"/>
           </a:p>
@@ -4867,7 +4874,7 @@
         </p:nvCxnSpPr>
         <p:spPr>
           <a:xfrm>
-            <a:off x="4267201" y="2612784"/>
+            <a:off x="4038601" y="2612784"/>
             <a:ext cx="1295399" cy="0"/>
           </a:xfrm>
           <a:prstGeom prst="line">
@@ -4897,8 +4904,8 @@
         </p:nvSpPr>
         <p:spPr>
           <a:xfrm>
-            <a:off x="4343398" y="1722194"/>
-            <a:ext cx="1385455" cy="646331"/>
+            <a:off x="4114798" y="1722194"/>
+            <a:ext cx="1219201" cy="923330"/>
           </a:xfrm>
           <a:prstGeom prst="rect">
             <a:avLst/>
@@ -4920,8 +4927,8 @@
           </a:p>
         </p:txBody>
       </p:sp>
-      <mc:AlternateContent xmlns:mc="http://schemas.openxmlformats.org/markup-compatibility/2006" xmlns:a14="http://schemas.microsoft.com/office/drawing/2010/main">
-        <mc:Choice Requires="a14">
+      <mc:AlternateContent xmlns:mc="http://schemas.openxmlformats.org/markup-compatibility/2006">
+        <mc:Choice xmlns:a14="http://schemas.microsoft.com/office/drawing/2010/main" Requires="a14">
           <p:sp>
             <p:nvSpPr>
               <p:cNvPr id="33" name="Rectangle 32"/>
@@ -4930,7 +4937,7 @@
             </p:nvSpPr>
             <p:spPr>
               <a:xfrm>
-                <a:off x="5728853" y="2359679"/>
+                <a:off x="5357164" y="2385812"/>
                 <a:ext cx="1371600" cy="582492"/>
               </a:xfrm>
               <a:prstGeom prst="rect">
@@ -4939,15 +4946,15 @@
             </p:spPr>
             <p:style>
               <a:lnRef idx="2">
-                <a:schemeClr val="accent1">
+                <a:schemeClr val="dk1">
                   <a:shade val="50000"/>
                 </a:schemeClr>
               </a:lnRef>
               <a:fillRef idx="1">
-                <a:schemeClr val="accent1"/>
+                <a:schemeClr val="dk1"/>
               </a:fillRef>
               <a:effectRef idx="0">
-                <a:schemeClr val="accent1"/>
+                <a:schemeClr val="dk1"/>
               </a:effectRef>
               <a:fontRef idx="minor">
                 <a:schemeClr val="lt1"/>
@@ -5049,7 +5056,7 @@
             </p:txBody>
           </p:sp>
         </mc:Choice>
-        <mc:Fallback xmlns="">
+        <mc:Fallback>
           <p:sp>
             <p:nvSpPr>
               <p:cNvPr id="33" name="Rectangle 32"/>
@@ -5060,7 +5067,7 @@
             </p:nvSpPr>
             <p:spPr>
               <a:xfrm>
-                <a:off x="5728853" y="2359679"/>
+                <a:off x="5357164" y="2385812"/>
                 <a:ext cx="1371600" cy="582492"/>
               </a:xfrm>
               <a:prstGeom prst="rect">
@@ -5088,8 +5095,8 @@
           </p:sp>
         </mc:Fallback>
       </mc:AlternateContent>
-      <mc:AlternateContent xmlns:mc="http://schemas.openxmlformats.org/markup-compatibility/2006" xmlns:a14="http://schemas.microsoft.com/office/drawing/2010/main">
-        <mc:Choice Requires="a14">
+      <mc:AlternateContent xmlns:mc="http://schemas.openxmlformats.org/markup-compatibility/2006">
+        <mc:Choice xmlns:a14="http://schemas.microsoft.com/office/drawing/2010/main" Requires="a14">
           <p:sp>
             <p:nvSpPr>
               <p:cNvPr id="34" name="Rectangle 33"/>
@@ -5098,7 +5105,7 @@
             </p:nvSpPr>
             <p:spPr>
               <a:xfrm>
-                <a:off x="5728853" y="3421472"/>
+                <a:off x="5357164" y="3442554"/>
                 <a:ext cx="1371600" cy="582492"/>
               </a:xfrm>
               <a:prstGeom prst="rect">
@@ -5107,15 +5114,15 @@
             </p:spPr>
             <p:style>
               <a:lnRef idx="2">
-                <a:schemeClr val="accent1">
+                <a:schemeClr val="dk1">
                   <a:shade val="50000"/>
                 </a:schemeClr>
               </a:lnRef>
               <a:fillRef idx="1">
-                <a:schemeClr val="accent1"/>
+                <a:schemeClr val="dk1"/>
               </a:fillRef>
               <a:effectRef idx="0">
-                <a:schemeClr val="accent1"/>
+                <a:schemeClr val="dk1"/>
               </a:effectRef>
               <a:fontRef idx="minor">
                 <a:schemeClr val="lt1"/>
@@ -5238,7 +5245,7 @@
             </p:txBody>
           </p:sp>
         </mc:Choice>
-        <mc:Fallback xmlns="">
+        <mc:Fallback>
           <p:sp>
             <p:nvSpPr>
               <p:cNvPr id="34" name="Rectangle 33"/>
@@ -5249,7 +5256,7 @@
             </p:nvSpPr>
             <p:spPr>
               <a:xfrm>
-                <a:off x="5728853" y="3421472"/>
+                <a:off x="5357164" y="3442554"/>
                 <a:ext cx="1371600" cy="582492"/>
               </a:xfrm>
               <a:prstGeom prst="rect">
@@ -5258,7 +5265,7 @@
               <a:blipFill rotWithShape="1">
                 <a:blip r:embed="rId3"/>
                 <a:stretch>
-                  <a:fillRect t="-5000" b="-19000"/>
+                  <a:fillRect t="-5051" b="-20202"/>
                 </a:stretch>
               </a:blipFill>
             </p:spPr>
@@ -5277,8 +5284,8 @@
           </p:sp>
         </mc:Fallback>
       </mc:AlternateContent>
-      <mc:AlternateContent xmlns:mc="http://schemas.openxmlformats.org/markup-compatibility/2006" xmlns:a14="http://schemas.microsoft.com/office/drawing/2010/main">
-        <mc:Choice Requires="a14">
+      <mc:AlternateContent xmlns:mc="http://schemas.openxmlformats.org/markup-compatibility/2006">
+        <mc:Choice xmlns:a14="http://schemas.microsoft.com/office/drawing/2010/main" Requires="a14">
           <p:sp>
             <p:nvSpPr>
               <p:cNvPr id="35" name="Rectangle 34"/>
@@ -5287,7 +5294,7 @@
             </p:nvSpPr>
             <p:spPr>
               <a:xfrm>
-                <a:off x="5728853" y="4685956"/>
+                <a:off x="5357164" y="4759938"/>
                 <a:ext cx="1371600" cy="582492"/>
               </a:xfrm>
               <a:prstGeom prst="rect">
@@ -5296,15 +5303,15 @@
             </p:spPr>
             <p:style>
               <a:lnRef idx="2">
-                <a:schemeClr val="accent1">
+                <a:schemeClr val="dk1">
                   <a:shade val="50000"/>
                 </a:schemeClr>
               </a:lnRef>
               <a:fillRef idx="1">
-                <a:schemeClr val="accent1"/>
+                <a:schemeClr val="dk1"/>
               </a:fillRef>
               <a:effectRef idx="0">
-                <a:schemeClr val="accent1"/>
+                <a:schemeClr val="dk1"/>
               </a:effectRef>
               <a:fontRef idx="minor">
                 <a:schemeClr val="lt1"/>
@@ -5421,7 +5428,7 @@
             </p:txBody>
           </p:sp>
         </mc:Choice>
-        <mc:Fallback xmlns="">
+        <mc:Fallback>
           <p:sp>
             <p:nvSpPr>
               <p:cNvPr id="35" name="Rectangle 34"/>
@@ -5432,7 +5439,7 @@
             </p:nvSpPr>
             <p:spPr>
               <a:xfrm>
-                <a:off x="5728853" y="4685956"/>
+                <a:off x="5357164" y="4759938"/>
                 <a:ext cx="1371600" cy="582492"/>
               </a:xfrm>
               <a:prstGeom prst="rect">
@@ -5468,7 +5475,7 @@
         </p:nvCxnSpPr>
         <p:spPr>
           <a:xfrm>
-            <a:off x="7024252" y="3712718"/>
+            <a:off x="6795652" y="3712718"/>
             <a:ext cx="865909" cy="0"/>
           </a:xfrm>
           <a:prstGeom prst="line">
@@ -5498,7 +5505,7 @@
         </p:nvCxnSpPr>
         <p:spPr>
           <a:xfrm>
-            <a:off x="4267201" y="3773446"/>
+            <a:off x="4038601" y="3773446"/>
             <a:ext cx="1295399" cy="0"/>
           </a:xfrm>
           <a:prstGeom prst="line">
@@ -5528,7 +5535,7 @@
         </p:nvCxnSpPr>
         <p:spPr>
           <a:xfrm>
-            <a:off x="4267200" y="5051184"/>
+            <a:off x="4038600" y="5051184"/>
             <a:ext cx="1295399" cy="0"/>
           </a:xfrm>
           <a:prstGeom prst="line">
@@ -5560,8 +5567,8 @@
         </p:nvCxnSpPr>
         <p:spPr>
           <a:xfrm flipV="1">
-            <a:off x="7100453" y="3773446"/>
-            <a:ext cx="789708" cy="1203756"/>
+            <a:off x="6728764" y="3712718"/>
+            <a:ext cx="932797" cy="1338466"/>
           </a:xfrm>
           <a:prstGeom prst="line">
             <a:avLst/>
@@ -5587,13 +5594,14 @@
           <p:cNvPr id="52" name="Straight Connector 51"/>
           <p:cNvCxnSpPr>
             <a:stCxn id="33" idx="3"/>
+            <a:endCxn id="53" idx="1"/>
           </p:cNvCxnSpPr>
           <p:nvPr/>
         </p:nvCxnSpPr>
         <p:spPr>
           <a:xfrm>
-            <a:off x="7100453" y="2650925"/>
-            <a:ext cx="789708" cy="1093867"/>
+            <a:off x="6728764" y="2677058"/>
+            <a:ext cx="894697" cy="1035660"/>
           </a:xfrm>
           <a:prstGeom prst="line">
             <a:avLst/>
@@ -5614,8 +5622,8 @@
           </a:fontRef>
         </p:style>
       </p:cxnSp>
-      <mc:AlternateContent xmlns:mc="http://schemas.openxmlformats.org/markup-compatibility/2006" xmlns:a14="http://schemas.microsoft.com/office/drawing/2010/main">
-        <mc:Choice Requires="a14">
+      <mc:AlternateContent xmlns:mc="http://schemas.openxmlformats.org/markup-compatibility/2006">
+        <mc:Choice xmlns:a14="http://schemas.microsoft.com/office/drawing/2010/main" Requires="a14">
           <p:sp>
             <p:nvSpPr>
               <p:cNvPr id="53" name="Rectangle 52"/>
@@ -5624,7 +5632,7 @@
             </p:nvSpPr>
             <p:spPr>
               <a:xfrm>
-                <a:off x="7852061" y="3309665"/>
+                <a:off x="7623461" y="3309665"/>
                 <a:ext cx="1253839" cy="806106"/>
               </a:xfrm>
               <a:prstGeom prst="rect">
@@ -5633,15 +5641,15 @@
             </p:spPr>
             <p:style>
               <a:lnRef idx="2">
-                <a:schemeClr val="accent1">
+                <a:schemeClr val="dk1">
                   <a:shade val="50000"/>
                 </a:schemeClr>
               </a:lnRef>
               <a:fillRef idx="1">
-                <a:schemeClr val="accent1"/>
+                <a:schemeClr val="dk1"/>
               </a:fillRef>
               <a:effectRef idx="0">
-                <a:schemeClr val="accent1"/>
+                <a:schemeClr val="dk1"/>
               </a:effectRef>
               <a:fontRef idx="minor">
                 <a:schemeClr val="lt1"/>
@@ -5783,7 +5791,7 @@
             </p:txBody>
           </p:sp>
         </mc:Choice>
-        <mc:Fallback xmlns="">
+        <mc:Fallback>
           <p:sp>
             <p:nvSpPr>
               <p:cNvPr id="53" name="Rectangle 52"/>
@@ -5794,7 +5802,7 @@
             </p:nvSpPr>
             <p:spPr>
               <a:xfrm>
-                <a:off x="7852061" y="3309665"/>
+                <a:off x="7623461" y="3309665"/>
                 <a:ext cx="1253839" cy="806106"/>
               </a:xfrm>
               <a:prstGeom prst="rect">
@@ -5803,7 +5811,7 @@
               <a:blipFill rotWithShape="1">
                 <a:blip r:embed="rId5"/>
                 <a:stretch>
-                  <a:fillRect t="-8088" r="-952"/>
+                  <a:fillRect t="-8088" r="-957"/>
                 </a:stretch>
               </a:blipFill>
             </p:spPr>
@@ -5830,7 +5838,7 @@
         </p:nvSpPr>
         <p:spPr>
           <a:xfrm>
-            <a:off x="6019800" y="1722194"/>
+            <a:off x="5574182" y="1770965"/>
             <a:ext cx="937564" cy="369332"/>
           </a:xfrm>
           <a:prstGeom prst="rect">
@@ -5860,7 +5868,7 @@
         </p:nvSpPr>
         <p:spPr>
           <a:xfrm>
-            <a:off x="7839361" y="2619005"/>
+            <a:off x="7623461" y="2587491"/>
             <a:ext cx="1253839" cy="646331"/>
           </a:xfrm>
           <a:prstGeom prst="rect">
@@ -9768,7 +9776,7 @@
         </p:blipFill>
         <p:spPr bwMode="auto">
           <a:xfrm>
-            <a:off x="4653306" y="0"/>
+            <a:off x="2276" y="3048000"/>
             <a:ext cx="4490694" cy="2805786"/>
           </a:xfrm>
           <a:prstGeom prst="rect">
@@ -11246,7 +11254,7 @@
         <p:spPr bwMode="auto">
           <a:xfrm>
             <a:off x="200026" y="25400"/>
-            <a:ext cx="3617495" cy="3013541"/>
+            <a:ext cx="3501529" cy="2916936"/>
           </a:xfrm>
           <a:prstGeom prst="rect">
             <a:avLst/>
@@ -11354,7 +11362,7 @@
         <p:spPr bwMode="auto">
           <a:xfrm>
             <a:off x="238128" y="3206687"/>
-            <a:ext cx="3622272" cy="3017520"/>
+            <a:ext cx="3495672" cy="2912056"/>
           </a:xfrm>
           <a:prstGeom prst="rect">
             <a:avLst/>
@@ -11612,7 +11620,6 @@
               <a:rPr lang="en-US" dirty="0" smtClean="0"/>
               <a:t>Multiple Imputation:</a:t>
             </a:r>
-            <a:endParaRPr lang="en-US" dirty="0" smtClean="0"/>
           </a:p>
           <a:p>
             <a:pPr algn="ctr"/>
@@ -11624,7 +11631,6 @@
               <a:rPr lang="en-US" dirty="0" smtClean="0"/>
               <a:t>=50</a:t>
             </a:r>
-            <a:endParaRPr lang="en-US" dirty="0" smtClean="0"/>
           </a:p>
           <a:p>
             <a:pPr algn="ctr"/>
@@ -11683,7 +11689,6 @@
               <a:rPr lang="en-US" dirty="0" smtClean="0"/>
               <a:t>Kaplan-Meier</a:t>
             </a:r>
-            <a:endParaRPr lang="en-US" dirty="0" smtClean="0"/>
           </a:p>
           <a:p>
             <a:pPr algn="ctr"/>
@@ -11747,17 +11752,8 @@
             <a:pPr algn="ctr"/>
             <a:r>
               <a:rPr lang="en-US" dirty="0" smtClean="0"/>
-              <a:t>IPTW </a:t>
-            </a:r>
-            <a:r>
-              <a:rPr lang="en-US" dirty="0" smtClean="0"/>
-              <a:t>weighted Cox </a:t>
-            </a:r>
-            <a:r>
-              <a:rPr lang="en-US" dirty="0" smtClean="0"/>
-              <a:t>model</a:t>
-            </a:r>
-            <a:endParaRPr lang="en-US" dirty="0" smtClean="0"/>
+              <a:t>IPTW weighted Cox model</a:t>
+            </a:r>
           </a:p>
         </p:txBody>
       </p:sp>

</xml_diff>

<commit_message>
updated ppt with ps and km pics
</commit_message>
<xml_diff>
--- a/mi_picture.pptx
+++ b/mi_picture.pptx
@@ -15,6 +15,8 @@
     <p:sldId id="264" r:id="rId9"/>
     <p:sldId id="265" r:id="rId10"/>
     <p:sldId id="266" r:id="rId11"/>
+    <p:sldId id="267" r:id="rId12"/>
+    <p:sldId id="268" r:id="rId13"/>
   </p:sldIdLst>
   <p:sldSz cx="9144000" cy="6858000" type="screen4x3"/>
   <p:notesSz cx="6858000" cy="9144000"/>
@@ -4856,11 +4858,7 @@
             <a:pPr algn="ctr"/>
             <a:r>
               <a:rPr lang="en-US" dirty="0" smtClean="0"/>
-              <a:t>m=3 </a:t>
-            </a:r>
-            <a:r>
-              <a:rPr lang="en-US" dirty="0" smtClean="0"/>
-              <a:t>MI datasets</a:t>
+              <a:t>m=3 MI datasets</a:t>
             </a:r>
             <a:endParaRPr lang="en-US" dirty="0"/>
           </a:p>
@@ -4927,8 +4925,8 @@
           </a:p>
         </p:txBody>
       </p:sp>
-      <mc:AlternateContent xmlns:mc="http://schemas.openxmlformats.org/markup-compatibility/2006">
-        <mc:Choice xmlns:a14="http://schemas.microsoft.com/office/drawing/2010/main" Requires="a14">
+      <mc:AlternateContent xmlns:mc="http://schemas.openxmlformats.org/markup-compatibility/2006" xmlns:a14="http://schemas.microsoft.com/office/drawing/2010/main">
+        <mc:Choice Requires="a14">
           <p:sp>
             <p:nvSpPr>
               <p:cNvPr id="33" name="Rectangle 32"/>
@@ -5056,7 +5054,7 @@
             </p:txBody>
           </p:sp>
         </mc:Choice>
-        <mc:Fallback>
+        <mc:Fallback xmlns="">
           <p:sp>
             <p:nvSpPr>
               <p:cNvPr id="33" name="Rectangle 32"/>
@@ -5095,8 +5093,8 @@
           </p:sp>
         </mc:Fallback>
       </mc:AlternateContent>
-      <mc:AlternateContent xmlns:mc="http://schemas.openxmlformats.org/markup-compatibility/2006">
-        <mc:Choice xmlns:a14="http://schemas.microsoft.com/office/drawing/2010/main" Requires="a14">
+      <mc:AlternateContent xmlns:mc="http://schemas.openxmlformats.org/markup-compatibility/2006" xmlns:a14="http://schemas.microsoft.com/office/drawing/2010/main">
+        <mc:Choice Requires="a14">
           <p:sp>
             <p:nvSpPr>
               <p:cNvPr id="34" name="Rectangle 33"/>
@@ -5245,7 +5243,7 @@
             </p:txBody>
           </p:sp>
         </mc:Choice>
-        <mc:Fallback>
+        <mc:Fallback xmlns="">
           <p:sp>
             <p:nvSpPr>
               <p:cNvPr id="34" name="Rectangle 33"/>
@@ -5284,8 +5282,8 @@
           </p:sp>
         </mc:Fallback>
       </mc:AlternateContent>
-      <mc:AlternateContent xmlns:mc="http://schemas.openxmlformats.org/markup-compatibility/2006">
-        <mc:Choice xmlns:a14="http://schemas.microsoft.com/office/drawing/2010/main" Requires="a14">
+      <mc:AlternateContent xmlns:mc="http://schemas.openxmlformats.org/markup-compatibility/2006" xmlns:a14="http://schemas.microsoft.com/office/drawing/2010/main">
+        <mc:Choice Requires="a14">
           <p:sp>
             <p:nvSpPr>
               <p:cNvPr id="35" name="Rectangle 34"/>
@@ -5428,7 +5426,7 @@
             </p:txBody>
           </p:sp>
         </mc:Choice>
-        <mc:Fallback>
+        <mc:Fallback xmlns="">
           <p:sp>
             <p:nvSpPr>
               <p:cNvPr id="35" name="Rectangle 34"/>
@@ -5622,8 +5620,8 @@
           </a:fontRef>
         </p:style>
       </p:cxnSp>
-      <mc:AlternateContent xmlns:mc="http://schemas.openxmlformats.org/markup-compatibility/2006">
-        <mc:Choice xmlns:a14="http://schemas.microsoft.com/office/drawing/2010/main" Requires="a14">
+      <mc:AlternateContent xmlns:mc="http://schemas.openxmlformats.org/markup-compatibility/2006" xmlns:a14="http://schemas.microsoft.com/office/drawing/2010/main">
+        <mc:Choice Requires="a14">
           <p:sp>
             <p:nvSpPr>
               <p:cNvPr id="53" name="Rectangle 52"/>
@@ -5791,7 +5789,7 @@
             </p:txBody>
           </p:sp>
         </mc:Choice>
-        <mc:Fallback>
+        <mc:Fallback xmlns="">
           <p:sp>
             <p:nvSpPr>
               <p:cNvPr id="53" name="Rectangle 52"/>
@@ -6555,6 +6553,429 @@
     <p:extLst>
       <p:ext uri="{BB962C8B-B14F-4D97-AF65-F5344CB8AC3E}">
         <p14:creationId xmlns:p14="http://schemas.microsoft.com/office/powerpoint/2010/main" val="2531997174"/>
+      </p:ext>
+    </p:extLst>
+  </p:cSld>
+  <p:clrMapOvr>
+    <a:masterClrMapping/>
+  </p:clrMapOvr>
+  <p:timing>
+    <p:tnLst>
+      <p:par>
+        <p:cTn id="1" dur="indefinite" restart="never" nodeType="tmRoot"/>
+      </p:par>
+    </p:tnLst>
+  </p:timing>
+</p:sld>
+</file>
+
+<file path=ppt/slides/slide11.xml><?xml version="1.0" encoding="utf-8"?>
+<p:sld xmlns:a="http://schemas.openxmlformats.org/drawingml/2006/main" xmlns:r="http://schemas.openxmlformats.org/officeDocument/2006/relationships" xmlns:p="http://schemas.openxmlformats.org/presentationml/2006/main">
+  <p:cSld>
+    <p:spTree>
+      <p:nvGrpSpPr>
+        <p:cNvPr id="1" name=""/>
+        <p:cNvGrpSpPr/>
+        <p:nvPr/>
+      </p:nvGrpSpPr>
+      <p:grpSpPr>
+        <a:xfrm>
+          <a:off x="0" y="0"/>
+          <a:ext cx="0" cy="0"/>
+          <a:chOff x="0" y="0"/>
+          <a:chExt cx="0" cy="0"/>
+        </a:xfrm>
+      </p:grpSpPr>
+      <p:pic>
+        <p:nvPicPr>
+          <p:cNvPr id="1032" name="Picture 8"/>
+          <p:cNvPicPr>
+            <a:picLocks noChangeAspect="1" noChangeArrowheads="1"/>
+          </p:cNvPicPr>
+          <p:nvPr/>
+        </p:nvPicPr>
+        <p:blipFill>
+          <a:blip r:embed="rId2">
+            <a:extLst>
+              <a:ext uri="{28A0092B-C50C-407E-A947-70E740481C1C}">
+                <a14:useLocalDpi xmlns:a14="http://schemas.microsoft.com/office/drawing/2010/main" val="0"/>
+              </a:ext>
+            </a:extLst>
+          </a:blip>
+          <a:srcRect/>
+          <a:stretch>
+            <a:fillRect/>
+          </a:stretch>
+        </p:blipFill>
+        <p:spPr bwMode="auto">
+          <a:xfrm>
+            <a:off x="25400" y="762000"/>
+            <a:ext cx="4495800" cy="5608162"/>
+          </a:xfrm>
+          <a:prstGeom prst="rect">
+            <a:avLst/>
+          </a:prstGeom>
+          <a:noFill/>
+          <a:ln>
+            <a:noFill/>
+          </a:ln>
+          <a:extLst>
+            <a:ext uri="{909E8E84-426E-40DD-AFC4-6F175D3DCCD1}">
+              <a14:hiddenFill xmlns:a14="http://schemas.microsoft.com/office/drawing/2010/main">
+                <a:solidFill>
+                  <a:schemeClr val="accent1"/>
+                </a:solidFill>
+              </a14:hiddenFill>
+            </a:ext>
+            <a:ext uri="{91240B29-F687-4F45-9708-019B960494DF}">
+              <a14:hiddenLine xmlns:a14="http://schemas.microsoft.com/office/drawing/2010/main" w="9525">
+                <a:solidFill>
+                  <a:schemeClr val="tx1"/>
+                </a:solidFill>
+                <a:miter lim="800000"/>
+                <a:headEnd/>
+                <a:tailEnd/>
+              </a14:hiddenLine>
+            </a:ext>
+          </a:extLst>
+        </p:spPr>
+      </p:pic>
+      <p:pic>
+        <p:nvPicPr>
+          <p:cNvPr id="1033" name="Picture 9"/>
+          <p:cNvPicPr>
+            <a:picLocks noChangeAspect="1" noChangeArrowheads="1"/>
+          </p:cNvPicPr>
+          <p:nvPr/>
+        </p:nvPicPr>
+        <p:blipFill>
+          <a:blip r:embed="rId3">
+            <a:extLst>
+              <a:ext uri="{28A0092B-C50C-407E-A947-70E740481C1C}">
+                <a14:useLocalDpi xmlns:a14="http://schemas.microsoft.com/office/drawing/2010/main" val="0"/>
+              </a:ext>
+            </a:extLst>
+          </a:blip>
+          <a:srcRect/>
+          <a:stretch>
+            <a:fillRect/>
+          </a:stretch>
+        </p:blipFill>
+        <p:spPr bwMode="auto">
+          <a:xfrm>
+            <a:off x="4191000" y="762000"/>
+            <a:ext cx="4495800" cy="5608162"/>
+          </a:xfrm>
+          <a:prstGeom prst="rect">
+            <a:avLst/>
+          </a:prstGeom>
+          <a:noFill/>
+          <a:ln>
+            <a:noFill/>
+          </a:ln>
+          <a:extLst>
+            <a:ext uri="{909E8E84-426E-40DD-AFC4-6F175D3DCCD1}">
+              <a14:hiddenFill xmlns:a14="http://schemas.microsoft.com/office/drawing/2010/main">
+                <a:solidFill>
+                  <a:schemeClr val="accent1"/>
+                </a:solidFill>
+              </a14:hiddenFill>
+            </a:ext>
+            <a:ext uri="{91240B29-F687-4F45-9708-019B960494DF}">
+              <a14:hiddenLine xmlns:a14="http://schemas.microsoft.com/office/drawing/2010/main" w="9525">
+                <a:solidFill>
+                  <a:schemeClr val="tx1"/>
+                </a:solidFill>
+                <a:miter lim="800000"/>
+                <a:headEnd/>
+                <a:tailEnd/>
+              </a14:hiddenLine>
+            </a:ext>
+          </a:extLst>
+        </p:spPr>
+      </p:pic>
+    </p:spTree>
+    <p:extLst>
+      <p:ext uri="{BB962C8B-B14F-4D97-AF65-F5344CB8AC3E}">
+        <p14:creationId xmlns:p14="http://schemas.microsoft.com/office/powerpoint/2010/main" val="3108675268"/>
+      </p:ext>
+    </p:extLst>
+  </p:cSld>
+  <p:clrMapOvr>
+    <a:masterClrMapping/>
+  </p:clrMapOvr>
+  <p:timing>
+    <p:tnLst>
+      <p:par>
+        <p:cTn id="1" dur="indefinite" restart="never" nodeType="tmRoot"/>
+      </p:par>
+    </p:tnLst>
+  </p:timing>
+</p:sld>
+</file>
+
+<file path=ppt/slides/slide12.xml><?xml version="1.0" encoding="utf-8"?>
+<p:sld xmlns:a="http://schemas.openxmlformats.org/drawingml/2006/main" xmlns:r="http://schemas.openxmlformats.org/officeDocument/2006/relationships" xmlns:p="http://schemas.openxmlformats.org/presentationml/2006/main">
+  <p:cSld>
+    <p:spTree>
+      <p:nvGrpSpPr>
+        <p:cNvPr id="1" name=""/>
+        <p:cNvGrpSpPr/>
+        <p:nvPr/>
+      </p:nvGrpSpPr>
+      <p:grpSpPr>
+        <a:xfrm>
+          <a:off x="0" y="0"/>
+          <a:ext cx="0" cy="0"/>
+          <a:chOff x="0" y="0"/>
+          <a:chExt cx="0" cy="0"/>
+        </a:xfrm>
+      </p:grpSpPr>
+      <p:pic>
+        <p:nvPicPr>
+          <p:cNvPr id="4" name="Picture 3"/>
+          <p:cNvPicPr>
+            <a:picLocks noChangeAspect="1"/>
+          </p:cNvPicPr>
+          <p:nvPr/>
+        </p:nvPicPr>
+        <p:blipFill rotWithShape="1">
+          <a:blip r:embed="rId2">
+            <a:extLst>
+              <a:ext uri="{28A0092B-C50C-407E-A947-70E740481C1C}">
+                <a14:useLocalDpi xmlns:a14="http://schemas.microsoft.com/office/drawing/2010/main" val="0"/>
+              </a:ext>
+            </a:extLst>
+          </a:blip>
+          <a:srcRect t="15517" r="17955"/>
+          <a:stretch/>
+        </p:blipFill>
+        <p:spPr>
+          <a:xfrm>
+            <a:off x="723900" y="1701799"/>
+            <a:ext cx="3619500" cy="3484871"/>
+          </a:xfrm>
+          <a:prstGeom prst="rect">
+            <a:avLst/>
+          </a:prstGeom>
+        </p:spPr>
+      </p:pic>
+      <p:pic>
+        <p:nvPicPr>
+          <p:cNvPr id="5" name="Picture 4"/>
+          <p:cNvPicPr>
+            <a:picLocks noChangeAspect="1"/>
+          </p:cNvPicPr>
+          <p:nvPr/>
+        </p:nvPicPr>
+        <p:blipFill rotWithShape="1">
+          <a:blip r:embed="rId3">
+            <a:extLst>
+              <a:ext uri="{28A0092B-C50C-407E-A947-70E740481C1C}">
+                <a14:useLocalDpi xmlns:a14="http://schemas.microsoft.com/office/drawing/2010/main" val="0"/>
+              </a:ext>
+            </a:extLst>
+          </a:blip>
+          <a:srcRect t="15761" r="5776"/>
+          <a:stretch/>
+        </p:blipFill>
+        <p:spPr>
+          <a:xfrm>
+            <a:off x="5029200" y="1693588"/>
+            <a:ext cx="3721100" cy="3493082"/>
+          </a:xfrm>
+          <a:prstGeom prst="rect">
+            <a:avLst/>
+          </a:prstGeom>
+        </p:spPr>
+      </p:pic>
+      <p:pic>
+        <p:nvPicPr>
+          <p:cNvPr id="2050" name="Picture 2"/>
+          <p:cNvPicPr>
+            <a:picLocks noChangeAspect="1" noChangeArrowheads="1"/>
+          </p:cNvPicPr>
+          <p:nvPr/>
+        </p:nvPicPr>
+        <p:blipFill>
+          <a:blip r:embed="rId4">
+            <a:extLst>
+              <a:ext uri="{28A0092B-C50C-407E-A947-70E740481C1C}">
+                <a14:useLocalDpi xmlns:a14="http://schemas.microsoft.com/office/drawing/2010/main" val="0"/>
+              </a:ext>
+            </a:extLst>
+          </a:blip>
+          <a:srcRect/>
+          <a:stretch>
+            <a:fillRect/>
+          </a:stretch>
+        </p:blipFill>
+        <p:spPr bwMode="auto">
+          <a:xfrm rot="16200000">
+            <a:off x="-582612" y="2881314"/>
+            <a:ext cx="2105025" cy="609600"/>
+          </a:xfrm>
+          <a:prstGeom prst="rect">
+            <a:avLst/>
+          </a:prstGeom>
+          <a:noFill/>
+          <a:ln>
+            <a:noFill/>
+          </a:ln>
+          <a:extLst>
+            <a:ext uri="{909E8E84-426E-40DD-AFC4-6F175D3DCCD1}">
+              <a14:hiddenFill xmlns:a14="http://schemas.microsoft.com/office/drawing/2010/main">
+                <a:solidFill>
+                  <a:schemeClr val="accent1"/>
+                </a:solidFill>
+              </a14:hiddenFill>
+            </a:ext>
+            <a:ext uri="{91240B29-F687-4F45-9708-019B960494DF}">
+              <a14:hiddenLine xmlns:a14="http://schemas.microsoft.com/office/drawing/2010/main" w="9525">
+                <a:solidFill>
+                  <a:schemeClr val="tx1"/>
+                </a:solidFill>
+                <a:miter lim="800000"/>
+                <a:headEnd/>
+                <a:tailEnd/>
+              </a14:hiddenLine>
+            </a:ext>
+          </a:extLst>
+        </p:spPr>
+      </p:pic>
+      <p:pic>
+        <p:nvPicPr>
+          <p:cNvPr id="7" name="Picture 2"/>
+          <p:cNvPicPr>
+            <a:picLocks noChangeAspect="1" noChangeArrowheads="1"/>
+          </p:cNvPicPr>
+          <p:nvPr/>
+        </p:nvPicPr>
+        <p:blipFill>
+          <a:blip r:embed="rId4">
+            <a:extLst>
+              <a:ext uri="{28A0092B-C50C-407E-A947-70E740481C1C}">
+                <a14:useLocalDpi xmlns:a14="http://schemas.microsoft.com/office/drawing/2010/main" val="0"/>
+              </a:ext>
+            </a:extLst>
+          </a:blip>
+          <a:srcRect/>
+          <a:stretch>
+            <a:fillRect/>
+          </a:stretch>
+        </p:blipFill>
+        <p:spPr bwMode="auto">
+          <a:xfrm rot="16200000">
+            <a:off x="3854406" y="2855915"/>
+            <a:ext cx="2105025" cy="609600"/>
+          </a:xfrm>
+          <a:prstGeom prst="rect">
+            <a:avLst/>
+          </a:prstGeom>
+          <a:noFill/>
+          <a:ln>
+            <a:noFill/>
+          </a:ln>
+          <a:extLst>
+            <a:ext uri="{909E8E84-426E-40DD-AFC4-6F175D3DCCD1}">
+              <a14:hiddenFill xmlns:a14="http://schemas.microsoft.com/office/drawing/2010/main">
+                <a:solidFill>
+                  <a:schemeClr val="accent1"/>
+                </a:solidFill>
+              </a14:hiddenFill>
+            </a:ext>
+            <a:ext uri="{91240B29-F687-4F45-9708-019B960494DF}">
+              <a14:hiddenLine xmlns:a14="http://schemas.microsoft.com/office/drawing/2010/main" w="9525">
+                <a:solidFill>
+                  <a:schemeClr val="tx1"/>
+                </a:solidFill>
+                <a:miter lim="800000"/>
+                <a:headEnd/>
+                <a:tailEnd/>
+              </a14:hiddenLine>
+            </a:ext>
+          </a:extLst>
+        </p:spPr>
+      </p:pic>
+      <p:sp>
+        <p:nvSpPr>
+          <p:cNvPr id="6" name="TextBox 5"/>
+          <p:cNvSpPr txBox="1"/>
+          <p:nvPr/>
+        </p:nvSpPr>
+        <p:spPr>
+          <a:xfrm>
+            <a:off x="1659709" y="1124634"/>
+            <a:ext cx="1981200" cy="646331"/>
+          </a:xfrm>
+          <a:prstGeom prst="rect">
+            <a:avLst/>
+          </a:prstGeom>
+          <a:noFill/>
+        </p:spPr>
+        <p:txBody>
+          <a:bodyPr wrap="square" rtlCol="0">
+            <a:spAutoFit/>
+          </a:bodyPr>
+          <a:lstStyle/>
+          <a:p>
+            <a:pPr algn="ctr"/>
+            <a:r>
+              <a:rPr lang="en-US" b="1" dirty="0" smtClean="0"/>
+              <a:t>Propensity Score</a:t>
+            </a:r>
+          </a:p>
+          <a:p>
+            <a:pPr algn="ctr"/>
+            <a:r>
+              <a:rPr lang="en-US" b="1" dirty="0" smtClean="0"/>
+              <a:t>Matching</a:t>
+            </a:r>
+            <a:endParaRPr lang="en-US" b="1" dirty="0"/>
+          </a:p>
+        </p:txBody>
+      </p:sp>
+      <p:sp>
+        <p:nvSpPr>
+          <p:cNvPr id="8" name="Rectangle 7"/>
+          <p:cNvSpPr/>
+          <p:nvPr/>
+        </p:nvSpPr>
+        <p:spPr>
+          <a:xfrm>
+            <a:off x="5943600" y="1124634"/>
+            <a:ext cx="2425200" cy="646331"/>
+          </a:xfrm>
+          <a:prstGeom prst="rect">
+            <a:avLst/>
+          </a:prstGeom>
+        </p:spPr>
+        <p:txBody>
+          <a:bodyPr wrap="square">
+            <a:spAutoFit/>
+          </a:bodyPr>
+          <a:lstStyle/>
+          <a:p>
+            <a:pPr algn="ctr"/>
+            <a:r>
+              <a:rPr lang="en-US" b="1" dirty="0"/>
+              <a:t>Propensity Score</a:t>
+            </a:r>
+          </a:p>
+          <a:p>
+            <a:pPr algn="ctr"/>
+            <a:r>
+              <a:rPr lang="en-US" b="1" dirty="0" smtClean="0"/>
+              <a:t>Weighting</a:t>
+            </a:r>
+            <a:endParaRPr lang="en-US" b="1" dirty="0"/>
+          </a:p>
+        </p:txBody>
+      </p:sp>
+    </p:spTree>
+    <p:extLst>
+      <p:ext uri="{BB962C8B-B14F-4D97-AF65-F5344CB8AC3E}">
+        <p14:creationId xmlns:p14="http://schemas.microsoft.com/office/powerpoint/2010/main" val="563232678"/>
       </p:ext>
     </p:extLst>
   </p:cSld>

</xml_diff>

<commit_message>
added pics to ppt
</commit_message>
<xml_diff>
--- a/mi_picture.pptx
+++ b/mi_picture.pptx
@@ -17,6 +17,8 @@
     <p:sldId id="266" r:id="rId11"/>
     <p:sldId id="267" r:id="rId12"/>
     <p:sldId id="268" r:id="rId13"/>
+    <p:sldId id="269" r:id="rId14"/>
+    <p:sldId id="270" r:id="rId15"/>
   </p:sldIdLst>
   <p:sldSz cx="9144000" cy="6858000" type="screen4x3"/>
   <p:notesSz cx="6858000" cy="9144000"/>
@@ -299,7 +301,7 @@
           <a:p>
             <a:fld id="{B17F4E78-F3C6-4442-AD2E-D4916562ED88}" type="datetimeFigureOut">
               <a:rPr lang="en-US" smtClean="0"/>
-              <a:t>11/23/2015</a:t>
+              <a:t>11/24/2015</a:t>
             </a:fld>
             <a:endParaRPr lang="en-US"/>
           </a:p>
@@ -469,7 +471,7 @@
           <a:p>
             <a:fld id="{B17F4E78-F3C6-4442-AD2E-D4916562ED88}" type="datetimeFigureOut">
               <a:rPr lang="en-US" smtClean="0"/>
-              <a:t>11/23/2015</a:t>
+              <a:t>11/24/2015</a:t>
             </a:fld>
             <a:endParaRPr lang="en-US"/>
           </a:p>
@@ -649,7 +651,7 @@
           <a:p>
             <a:fld id="{B17F4E78-F3C6-4442-AD2E-D4916562ED88}" type="datetimeFigureOut">
               <a:rPr lang="en-US" smtClean="0"/>
-              <a:t>11/23/2015</a:t>
+              <a:t>11/24/2015</a:t>
             </a:fld>
             <a:endParaRPr lang="en-US"/>
           </a:p>
@@ -819,7 +821,7 @@
           <a:p>
             <a:fld id="{B17F4E78-F3C6-4442-AD2E-D4916562ED88}" type="datetimeFigureOut">
               <a:rPr lang="en-US" smtClean="0"/>
-              <a:t>11/23/2015</a:t>
+              <a:t>11/24/2015</a:t>
             </a:fld>
             <a:endParaRPr lang="en-US"/>
           </a:p>
@@ -1065,7 +1067,7 @@
           <a:p>
             <a:fld id="{B17F4E78-F3C6-4442-AD2E-D4916562ED88}" type="datetimeFigureOut">
               <a:rPr lang="en-US" smtClean="0"/>
-              <a:t>11/23/2015</a:t>
+              <a:t>11/24/2015</a:t>
             </a:fld>
             <a:endParaRPr lang="en-US"/>
           </a:p>
@@ -1353,7 +1355,7 @@
           <a:p>
             <a:fld id="{B17F4E78-F3C6-4442-AD2E-D4916562ED88}" type="datetimeFigureOut">
               <a:rPr lang="en-US" smtClean="0"/>
-              <a:t>11/23/2015</a:t>
+              <a:t>11/24/2015</a:t>
             </a:fld>
             <a:endParaRPr lang="en-US"/>
           </a:p>
@@ -1775,7 +1777,7 @@
           <a:p>
             <a:fld id="{B17F4E78-F3C6-4442-AD2E-D4916562ED88}" type="datetimeFigureOut">
               <a:rPr lang="en-US" smtClean="0"/>
-              <a:t>11/23/2015</a:t>
+              <a:t>11/24/2015</a:t>
             </a:fld>
             <a:endParaRPr lang="en-US"/>
           </a:p>
@@ -1893,7 +1895,7 @@
           <a:p>
             <a:fld id="{B17F4E78-F3C6-4442-AD2E-D4916562ED88}" type="datetimeFigureOut">
               <a:rPr lang="en-US" smtClean="0"/>
-              <a:t>11/23/2015</a:t>
+              <a:t>11/24/2015</a:t>
             </a:fld>
             <a:endParaRPr lang="en-US"/>
           </a:p>
@@ -1988,7 +1990,7 @@
           <a:p>
             <a:fld id="{B17F4E78-F3C6-4442-AD2E-D4916562ED88}" type="datetimeFigureOut">
               <a:rPr lang="en-US" smtClean="0"/>
-              <a:t>11/23/2015</a:t>
+              <a:t>11/24/2015</a:t>
             </a:fld>
             <a:endParaRPr lang="en-US"/>
           </a:p>
@@ -2265,7 +2267,7 @@
           <a:p>
             <a:fld id="{B17F4E78-F3C6-4442-AD2E-D4916562ED88}" type="datetimeFigureOut">
               <a:rPr lang="en-US" smtClean="0"/>
-              <a:t>11/23/2015</a:t>
+              <a:t>11/24/2015</a:t>
             </a:fld>
             <a:endParaRPr lang="en-US"/>
           </a:p>
@@ -2518,7 +2520,7 @@
           <a:p>
             <a:fld id="{B17F4E78-F3C6-4442-AD2E-D4916562ED88}" type="datetimeFigureOut">
               <a:rPr lang="en-US" smtClean="0"/>
-              <a:t>11/23/2015</a:t>
+              <a:t>11/24/2015</a:t>
             </a:fld>
             <a:endParaRPr lang="en-US"/>
           </a:p>
@@ -2731,7 +2733,7 @@
           <a:p>
             <a:fld id="{B17F4E78-F3C6-4442-AD2E-D4916562ED88}" type="datetimeFigureOut">
               <a:rPr lang="en-US" smtClean="0"/>
-              <a:t>11/23/2015</a:t>
+              <a:t>11/24/2015</a:t>
             </a:fld>
             <a:endParaRPr lang="en-US"/>
           </a:p>
@@ -6992,6 +6994,382 @@
 </p:sld>
 </file>
 
+<file path=ppt/slides/slide13.xml><?xml version="1.0" encoding="utf-8"?>
+<p:sld xmlns:a="http://schemas.openxmlformats.org/drawingml/2006/main" xmlns:r="http://schemas.openxmlformats.org/officeDocument/2006/relationships" xmlns:p="http://schemas.openxmlformats.org/presentationml/2006/main">
+  <p:cSld>
+    <p:spTree>
+      <p:nvGrpSpPr>
+        <p:cNvPr id="1" name=""/>
+        <p:cNvGrpSpPr/>
+        <p:nvPr/>
+      </p:nvGrpSpPr>
+      <p:grpSpPr>
+        <a:xfrm>
+          <a:off x="0" y="0"/>
+          <a:ext cx="0" cy="0"/>
+          <a:chOff x="0" y="0"/>
+          <a:chExt cx="0" cy="0"/>
+        </a:xfrm>
+      </p:grpSpPr>
+      <p:sp>
+        <p:nvSpPr>
+          <p:cNvPr id="4" name="TextBox 3"/>
+          <p:cNvSpPr txBox="1"/>
+          <p:nvPr/>
+        </p:nvSpPr>
+        <p:spPr>
+          <a:xfrm>
+            <a:off x="3352800" y="1981200"/>
+            <a:ext cx="4343400" cy="2862322"/>
+          </a:xfrm>
+          <a:prstGeom prst="rect">
+            <a:avLst/>
+          </a:prstGeom>
+          <a:noFill/>
+        </p:spPr>
+        <p:txBody>
+          <a:bodyPr wrap="square" rtlCol="0">
+            <a:spAutoFit/>
+          </a:bodyPr>
+          <a:lstStyle/>
+          <a:p>
+            <a:r>
+              <a:rPr lang="en-US" dirty="0"/>
+              <a:t>plot(</a:t>
+            </a:r>
+            <a:r>
+              <a:rPr lang="en-US" dirty="0" err="1"/>
+              <a:t>survfit</a:t>
+            </a:r>
+            <a:r>
+              <a:rPr lang="en-US" dirty="0"/>
+              <a:t>(</a:t>
+            </a:r>
+            <a:r>
+              <a:rPr lang="en-US" dirty="0" err="1"/>
+              <a:t>Surv</a:t>
+            </a:r>
+            <a:r>
+              <a:rPr lang="en-US" dirty="0"/>
+              <a:t>(</a:t>
+            </a:r>
+            <a:r>
+              <a:rPr lang="en-US" dirty="0" err="1"/>
+              <a:t>os,dead</a:t>
+            </a:r>
+            <a:r>
+              <a:rPr lang="en-US" dirty="0"/>
+              <a:t>)~factor(ECOG01),data=</a:t>
+            </a:r>
+            <a:r>
+              <a:rPr lang="en-US" dirty="0" err="1"/>
+              <a:t>data,subset</a:t>
+            </a:r>
+            <a:r>
+              <a:rPr lang="en-US" dirty="0"/>
+              <a:t>=</a:t>
+            </a:r>
+            <a:r>
+              <a:rPr lang="en-US" dirty="0" err="1"/>
+              <a:t>os</a:t>
+            </a:r>
+            <a:r>
+              <a:rPr lang="en-US" dirty="0"/>
+              <a:t>&gt;2),col=c("</a:t>
+            </a:r>
+            <a:r>
+              <a:rPr lang="en-US" dirty="0" err="1"/>
+              <a:t>red","blue</a:t>
+            </a:r>
+            <a:r>
+              <a:rPr lang="en-US" dirty="0"/>
+              <a:t>"),</a:t>
+            </a:r>
+            <a:r>
+              <a:rPr lang="en-US" dirty="0" err="1"/>
+              <a:t>mark.time</a:t>
+            </a:r>
+            <a:r>
+              <a:rPr lang="en-US" dirty="0"/>
+              <a:t> = </a:t>
+            </a:r>
+            <a:r>
+              <a:rPr lang="en-US" dirty="0" err="1"/>
+              <a:t>FALSE,xlab</a:t>
+            </a:r>
+            <a:r>
+              <a:rPr lang="en-US" dirty="0"/>
+              <a:t>="Months",</a:t>
+            </a:r>
+            <a:r>
+              <a:rPr lang="en-US" dirty="0" err="1"/>
+              <a:t>ylab</a:t>
+            </a:r>
+            <a:r>
+              <a:rPr lang="en-US" dirty="0"/>
+              <a:t>="</a:t>
+            </a:r>
+            <a:r>
+              <a:rPr lang="en-US" dirty="0" err="1"/>
+              <a:t>Survival",main</a:t>
+            </a:r>
+            <a:r>
+              <a:rPr lang="en-US" dirty="0"/>
+              <a:t>="Survival by ECOG Classification")</a:t>
+            </a:r>
+          </a:p>
+          <a:p>
+            <a:r>
+              <a:rPr lang="en-US" dirty="0"/>
+              <a:t> legend("</a:t>
+            </a:r>
+            <a:r>
+              <a:rPr lang="en-US" dirty="0" err="1"/>
+              <a:t>topright</a:t>
+            </a:r>
+            <a:r>
+              <a:rPr lang="en-US" dirty="0"/>
+              <a:t>",title="ECOG Score",</a:t>
+            </a:r>
+          </a:p>
+          <a:p>
+            <a:r>
+              <a:rPr lang="en-US" dirty="0"/>
+              <a:t>                c("0,1","&gt;2"), col=c("</a:t>
+            </a:r>
+            <a:r>
+              <a:rPr lang="en-US" dirty="0" err="1"/>
+              <a:t>blue","red</a:t>
+            </a:r>
+            <a:r>
+              <a:rPr lang="en-US" dirty="0"/>
+              <a:t>"),</a:t>
+            </a:r>
+            <a:r>
+              <a:rPr lang="en-US" dirty="0" err="1"/>
+              <a:t>lty</a:t>
+            </a:r>
+            <a:r>
+              <a:rPr lang="en-US" dirty="0"/>
+              <a:t>=1 )</a:t>
+            </a:r>
+          </a:p>
+          <a:p>
+            <a:r>
+              <a:rPr lang="en-US" dirty="0"/>
+              <a:t> </a:t>
+            </a:r>
+            <a:r>
+              <a:rPr lang="en-US" dirty="0" err="1"/>
+              <a:t>abline</a:t>
+            </a:r>
+            <a:r>
+              <a:rPr lang="en-US" dirty="0"/>
+              <a:t>(h=.5)</a:t>
+            </a:r>
+          </a:p>
+          <a:p>
+            <a:r>
+              <a:rPr lang="en-US" dirty="0"/>
+              <a:t> </a:t>
+            </a:r>
+          </a:p>
+        </p:txBody>
+      </p:sp>
+    </p:spTree>
+    <p:extLst>
+      <p:ext uri="{BB962C8B-B14F-4D97-AF65-F5344CB8AC3E}">
+        <p14:creationId xmlns:p14="http://schemas.microsoft.com/office/powerpoint/2010/main" val="351646617"/>
+      </p:ext>
+    </p:extLst>
+  </p:cSld>
+  <p:clrMapOvr>
+    <a:masterClrMapping/>
+  </p:clrMapOvr>
+  <p:timing>
+    <p:tnLst>
+      <p:par>
+        <p:cTn id="1" dur="indefinite" restart="never" nodeType="tmRoot"/>
+      </p:par>
+    </p:tnLst>
+  </p:timing>
+</p:sld>
+</file>
+
+<file path=ppt/slides/slide14.xml><?xml version="1.0" encoding="utf-8"?>
+<p:sld xmlns:a="http://schemas.openxmlformats.org/drawingml/2006/main" xmlns:r="http://schemas.openxmlformats.org/officeDocument/2006/relationships" xmlns:p="http://schemas.openxmlformats.org/presentationml/2006/main">
+  <p:cSld>
+    <p:spTree>
+      <p:nvGrpSpPr>
+        <p:cNvPr id="1" name=""/>
+        <p:cNvGrpSpPr/>
+        <p:nvPr/>
+      </p:nvGrpSpPr>
+      <p:grpSpPr>
+        <a:xfrm>
+          <a:off x="0" y="0"/>
+          <a:ext cx="0" cy="0"/>
+          <a:chOff x="0" y="0"/>
+          <a:chExt cx="0" cy="0"/>
+        </a:xfrm>
+      </p:grpSpPr>
+      <p:pic>
+        <p:nvPicPr>
+          <p:cNvPr id="1026" name="Picture 2"/>
+          <p:cNvPicPr>
+            <a:picLocks noChangeAspect="1" noChangeArrowheads="1"/>
+          </p:cNvPicPr>
+          <p:nvPr/>
+        </p:nvPicPr>
+        <p:blipFill>
+          <a:blip r:embed="rId2">
+            <a:extLst>
+              <a:ext uri="{28A0092B-C50C-407E-A947-70E740481C1C}">
+                <a14:useLocalDpi xmlns:a14="http://schemas.microsoft.com/office/drawing/2010/main" val="0"/>
+              </a:ext>
+            </a:extLst>
+          </a:blip>
+          <a:srcRect/>
+          <a:stretch>
+            <a:fillRect/>
+          </a:stretch>
+        </p:blipFill>
+        <p:spPr bwMode="auto">
+          <a:xfrm>
+            <a:off x="1676400" y="533400"/>
+            <a:ext cx="5648325" cy="2590800"/>
+          </a:xfrm>
+          <a:prstGeom prst="rect">
+            <a:avLst/>
+          </a:prstGeom>
+          <a:noFill/>
+          <a:ln>
+            <a:noFill/>
+          </a:ln>
+          <a:extLst>
+            <a:ext uri="{909E8E84-426E-40DD-AFC4-6F175D3DCCD1}">
+              <a14:hiddenFill xmlns:a14="http://schemas.microsoft.com/office/drawing/2010/main">
+                <a:solidFill>
+                  <a:schemeClr val="accent1"/>
+                </a:solidFill>
+              </a14:hiddenFill>
+            </a:ext>
+            <a:ext uri="{91240B29-F687-4F45-9708-019B960494DF}">
+              <a14:hiddenLine xmlns:a14="http://schemas.microsoft.com/office/drawing/2010/main" w="9525">
+                <a:solidFill>
+                  <a:schemeClr val="tx1"/>
+                </a:solidFill>
+                <a:miter lim="800000"/>
+                <a:headEnd/>
+                <a:tailEnd/>
+              </a14:hiddenLine>
+            </a:ext>
+          </a:extLst>
+        </p:spPr>
+      </p:pic>
+      <p:pic>
+        <p:nvPicPr>
+          <p:cNvPr id="1027" name="Picture 3"/>
+          <p:cNvPicPr>
+            <a:picLocks noChangeAspect="1" noChangeArrowheads="1"/>
+          </p:cNvPicPr>
+          <p:nvPr/>
+        </p:nvPicPr>
+        <p:blipFill>
+          <a:blip r:embed="rId3">
+            <a:extLst>
+              <a:ext uri="{28A0092B-C50C-407E-A947-70E740481C1C}">
+                <a14:useLocalDpi xmlns:a14="http://schemas.microsoft.com/office/drawing/2010/main" val="0"/>
+              </a:ext>
+            </a:extLst>
+          </a:blip>
+          <a:srcRect/>
+          <a:stretch>
+            <a:fillRect/>
+          </a:stretch>
+        </p:blipFill>
+        <p:spPr bwMode="auto">
+          <a:xfrm>
+            <a:off x="1638300" y="2895600"/>
+            <a:ext cx="6086475" cy="2657475"/>
+          </a:xfrm>
+          <a:prstGeom prst="rect">
+            <a:avLst/>
+          </a:prstGeom>
+          <a:noFill/>
+          <a:ln>
+            <a:noFill/>
+          </a:ln>
+          <a:extLst>
+            <a:ext uri="{909E8E84-426E-40DD-AFC4-6F175D3DCCD1}">
+              <a14:hiddenFill xmlns:a14="http://schemas.microsoft.com/office/drawing/2010/main">
+                <a:solidFill>
+                  <a:schemeClr val="accent1"/>
+                </a:solidFill>
+              </a14:hiddenFill>
+            </a:ext>
+            <a:ext uri="{91240B29-F687-4F45-9708-019B960494DF}">
+              <a14:hiddenLine xmlns:a14="http://schemas.microsoft.com/office/drawing/2010/main" w="9525">
+                <a:solidFill>
+                  <a:schemeClr val="tx1"/>
+                </a:solidFill>
+                <a:miter lim="800000"/>
+                <a:headEnd/>
+                <a:tailEnd/>
+              </a14:hiddenLine>
+            </a:ext>
+          </a:extLst>
+        </p:spPr>
+      </p:pic>
+      <p:sp>
+        <p:nvSpPr>
+          <p:cNvPr id="6" name="TextBox 5"/>
+          <p:cNvSpPr txBox="1"/>
+          <p:nvPr/>
+        </p:nvSpPr>
+        <p:spPr>
+          <a:xfrm>
+            <a:off x="2073775" y="5733534"/>
+            <a:ext cx="4853573" cy="369332"/>
+          </a:xfrm>
+          <a:prstGeom prst="rect">
+            <a:avLst/>
+          </a:prstGeom>
+          <a:noFill/>
+        </p:spPr>
+        <p:txBody>
+          <a:bodyPr wrap="none" rtlCol="0">
+            <a:spAutoFit/>
+          </a:bodyPr>
+          <a:lstStyle/>
+          <a:p>
+            <a:r>
+              <a:rPr lang="en-US" dirty="0"/>
+              <a:t>https://www.youtube.com/watch?v=sRktKszFmSk</a:t>
+            </a:r>
+          </a:p>
+        </p:txBody>
+      </p:sp>
+    </p:spTree>
+    <p:extLst>
+      <p:ext uri="{BB962C8B-B14F-4D97-AF65-F5344CB8AC3E}">
+        <p14:creationId xmlns:p14="http://schemas.microsoft.com/office/powerpoint/2010/main" val="3316497519"/>
+      </p:ext>
+    </p:extLst>
+  </p:cSld>
+  <p:clrMapOvr>
+    <a:masterClrMapping/>
+  </p:clrMapOvr>
+  <p:timing>
+    <p:tnLst>
+      <p:par>
+        <p:cTn id="1" dur="indefinite" restart="never" nodeType="tmRoot"/>
+      </p:par>
+    </p:tnLst>
+  </p:timing>
+</p:sld>
+</file>
+
 <file path=ppt/slides/slide2.xml><?xml version="1.0" encoding="utf-8"?>
 <p:sld xmlns:a="http://schemas.openxmlformats.org/drawingml/2006/main" xmlns:r="http://schemas.openxmlformats.org/officeDocument/2006/relationships" xmlns:p="http://schemas.openxmlformats.org/presentationml/2006/main">
   <p:cSld>
@@ -10870,7 +11248,7 @@
         <p:spPr>
           <a:xfrm>
             <a:off x="533400" y="2679700"/>
-            <a:ext cx="855362" cy="369332"/>
+            <a:ext cx="915956" cy="646331"/>
           </a:xfrm>
           <a:prstGeom prst="rect">
             <a:avLst/>
@@ -10883,9 +11261,17 @@
           </a:bodyPr>
           <a:lstStyle/>
           <a:p>
+            <a:pPr algn="ctr"/>
             <a:r>
               <a:rPr lang="en-US" dirty="0" smtClean="0"/>
-              <a:t>Weight</a:t>
+              <a:t>Survival</a:t>
+            </a:r>
+          </a:p>
+          <a:p>
+            <a:pPr algn="ctr"/>
+            <a:r>
+              <a:rPr lang="en-US" dirty="0" smtClean="0"/>
+              <a:t>Time</a:t>
             </a:r>
             <a:endParaRPr lang="en-US" dirty="0"/>
           </a:p>
@@ -11012,172 +11398,10 @@
           </a:p>
         </p:txBody>
       </p:sp>
-      <p:pic>
-        <p:nvPicPr>
-          <p:cNvPr id="1026" name="Picture 2"/>
-          <p:cNvPicPr>
-            <a:picLocks noChangeAspect="1" noChangeArrowheads="1"/>
-          </p:cNvPicPr>
-          <p:nvPr/>
-        </p:nvPicPr>
-        <p:blipFill>
-          <a:blip r:embed="rId2" cstate="print">
-            <a:extLst>
-              <a:ext uri="{28A0092B-C50C-407E-A947-70E740481C1C}">
-                <a14:useLocalDpi xmlns:a14="http://schemas.microsoft.com/office/drawing/2010/main" val="0"/>
-              </a:ext>
-            </a:extLst>
-          </a:blip>
-          <a:srcRect/>
-          <a:stretch>
-            <a:fillRect/>
-          </a:stretch>
-        </p:blipFill>
-        <p:spPr bwMode="auto">
-          <a:xfrm>
-            <a:off x="2045493" y="1893062"/>
-            <a:ext cx="888969" cy="1266328"/>
-          </a:xfrm>
-          <a:prstGeom prst="rect">
-            <a:avLst/>
-          </a:prstGeom>
-          <a:noFill/>
-          <a:ln>
-            <a:noFill/>
-          </a:ln>
-          <a:extLst>
-            <a:ext uri="{909E8E84-426E-40DD-AFC4-6F175D3DCCD1}">
-              <a14:hiddenFill xmlns:a14="http://schemas.microsoft.com/office/drawing/2010/main">
-                <a:solidFill>
-                  <a:schemeClr val="accent1"/>
-                </a:solidFill>
-              </a14:hiddenFill>
-            </a:ext>
-            <a:ext uri="{91240B29-F687-4F45-9708-019B960494DF}">
-              <a14:hiddenLine xmlns:a14="http://schemas.microsoft.com/office/drawing/2010/main" w="9525">
-                <a:solidFill>
-                  <a:schemeClr val="tx1"/>
-                </a:solidFill>
-                <a:miter lim="800000"/>
-                <a:headEnd/>
-                <a:tailEnd/>
-              </a14:hiddenLine>
-            </a:ext>
-          </a:extLst>
-        </p:spPr>
-      </p:pic>
-      <p:pic>
-        <p:nvPicPr>
-          <p:cNvPr id="1027" name="Picture 3"/>
-          <p:cNvPicPr>
-            <a:picLocks noChangeAspect="1" noChangeArrowheads="1"/>
-          </p:cNvPicPr>
-          <p:nvPr/>
-        </p:nvPicPr>
-        <p:blipFill>
-          <a:blip r:embed="rId3" cstate="print">
-            <a:extLst>
-              <a:ext uri="{28A0092B-C50C-407E-A947-70E740481C1C}">
-                <a14:useLocalDpi xmlns:a14="http://schemas.microsoft.com/office/drawing/2010/main" val="0"/>
-              </a:ext>
-            </a:extLst>
-          </a:blip>
-          <a:srcRect/>
-          <a:stretch>
-            <a:fillRect/>
-          </a:stretch>
-        </p:blipFill>
-        <p:spPr bwMode="auto">
-          <a:xfrm>
-            <a:off x="5518150" y="609600"/>
-            <a:ext cx="1308957" cy="1219200"/>
-          </a:xfrm>
-          <a:prstGeom prst="rect">
-            <a:avLst/>
-          </a:prstGeom>
-          <a:noFill/>
-          <a:ln>
-            <a:noFill/>
-          </a:ln>
-          <a:extLst>
-            <a:ext uri="{909E8E84-426E-40DD-AFC4-6F175D3DCCD1}">
-              <a14:hiddenFill xmlns:a14="http://schemas.microsoft.com/office/drawing/2010/main">
-                <a:solidFill>
-                  <a:schemeClr val="accent1"/>
-                </a:solidFill>
-              </a14:hiddenFill>
-            </a:ext>
-            <a:ext uri="{91240B29-F687-4F45-9708-019B960494DF}">
-              <a14:hiddenLine xmlns:a14="http://schemas.microsoft.com/office/drawing/2010/main" w="9525">
-                <a:solidFill>
-                  <a:schemeClr val="tx1"/>
-                </a:solidFill>
-                <a:miter lim="800000"/>
-                <a:headEnd/>
-                <a:tailEnd/>
-              </a14:hiddenLine>
-            </a:ext>
-          </a:extLst>
-        </p:spPr>
-      </p:pic>
-      <p:pic>
-        <p:nvPicPr>
-          <p:cNvPr id="1028" name="Picture 4"/>
-          <p:cNvPicPr>
-            <a:picLocks noChangeAspect="1" noChangeArrowheads="1"/>
-          </p:cNvPicPr>
-          <p:nvPr/>
-        </p:nvPicPr>
-        <p:blipFill rotWithShape="1">
-          <a:blip r:embed="rId4">
-            <a:extLst>
-              <a:ext uri="{28A0092B-C50C-407E-A947-70E740481C1C}">
-                <a14:useLocalDpi xmlns:a14="http://schemas.microsoft.com/office/drawing/2010/main" val="0"/>
-              </a:ext>
-            </a:extLst>
-          </a:blip>
-          <a:srcRect r="12388"/>
-          <a:stretch/>
-        </p:blipFill>
-        <p:spPr bwMode="auto">
-          <a:xfrm>
-            <a:off x="5518150" y="3105666"/>
-            <a:ext cx="1263650" cy="1434178"/>
-          </a:xfrm>
-          <a:prstGeom prst="rect">
-            <a:avLst/>
-          </a:prstGeom>
-          <a:noFill/>
-          <a:ln>
-            <a:noFill/>
-          </a:ln>
-          <a:extLst>
-            <a:ext uri="{909E8E84-426E-40DD-AFC4-6F175D3DCCD1}">
-              <a14:hiddenFill xmlns:a14="http://schemas.microsoft.com/office/drawing/2010/main">
-                <a:solidFill>
-                  <a:schemeClr val="accent1"/>
-                </a:solidFill>
-              </a14:hiddenFill>
-            </a:ext>
-            <a:ext uri="{91240B29-F687-4F45-9708-019B960494DF}">
-              <a14:hiddenLine xmlns:a14="http://schemas.microsoft.com/office/drawing/2010/main" w="9525">
-                <a:solidFill>
-                  <a:schemeClr val="tx1"/>
-                </a:solidFill>
-                <a:miter lim="800000"/>
-                <a:headEnd/>
-                <a:tailEnd/>
-              </a14:hiddenLine>
-            </a:ext>
-          </a:extLst>
-        </p:spPr>
-      </p:pic>
       <p:cxnSp>
         <p:nvCxnSpPr>
           <p:cNvPr id="18" name="Straight Arrow Connector 17"/>
-          <p:cNvCxnSpPr>
-            <a:endCxn id="1027" idx="1"/>
-          </p:cNvCxnSpPr>
+          <p:cNvCxnSpPr/>
           <p:nvPr/>
         </p:nvCxnSpPr>
         <p:spPr>
@@ -11189,9 +11413,7 @@
             <a:avLst/>
           </a:prstGeom>
           <a:ln>
-            <a:solidFill>
-              <a:schemeClr val="accent2"/>
-            </a:solidFill>
+            <a:noFill/>
             <a:prstDash val="dashDot"/>
             <a:tailEnd type="arrow"/>
           </a:ln>
@@ -11214,9 +11436,7 @@
       <p:cxnSp>
         <p:nvCxnSpPr>
           <p:cNvPr id="20" name="Straight Arrow Connector 19"/>
-          <p:cNvCxnSpPr>
-            <a:endCxn id="1028" idx="1"/>
-          </p:cNvCxnSpPr>
+          <p:cNvCxnSpPr/>
           <p:nvPr/>
         </p:nvCxnSpPr>
         <p:spPr>
@@ -11228,6 +11448,10 @@
             <a:avLst/>
           </a:prstGeom>
           <a:ln>
+            <a:solidFill>
+              <a:schemeClr val="tx1"/>
+            </a:solidFill>
+            <a:prstDash val="dash"/>
             <a:tailEnd type="arrow"/>
           </a:ln>
         </p:spPr>
@@ -11254,7 +11478,7 @@
         </p:nvSpPr>
         <p:spPr>
           <a:xfrm>
-            <a:off x="2787650" y="928164"/>
+            <a:off x="2616200" y="3733800"/>
             <a:ext cx="2730500" cy="646331"/>
           </a:xfrm>
           <a:prstGeom prst="rect">
@@ -11271,7 +11495,7 @@
             <a:pPr algn="ctr"/>
             <a:r>
               <a:rPr lang="en-US" dirty="0" smtClean="0"/>
-              <a:t>Placebo: Counterfactual (unobserved)</a:t>
+              <a:t>No Drug: Counterfactual (unobserved)</a:t>
             </a:r>
             <a:endParaRPr lang="en-US" dirty="0"/>
           </a:p>
@@ -11285,7 +11509,7 @@
         </p:nvSpPr>
         <p:spPr>
           <a:xfrm>
-            <a:off x="3048571" y="3625334"/>
+            <a:off x="2934462" y="1304740"/>
             <a:ext cx="2197100" cy="369332"/>
           </a:xfrm>
           <a:prstGeom prst="rect">
@@ -11308,6 +11532,167 @@
           </a:p>
         </p:txBody>
       </p:sp>
+      <p:pic>
+        <p:nvPicPr>
+          <p:cNvPr id="3" name="Picture 4" descr="http://cdn.totalsororitymove.com/wp-content/uploads/2013/12/ea3fd306b431d2a4bc577a5f57f9f6102022047862.png"/>
+          <p:cNvPicPr>
+            <a:picLocks noChangeAspect="1" noChangeArrowheads="1"/>
+          </p:cNvPicPr>
+          <p:nvPr/>
+        </p:nvPicPr>
+        <p:blipFill>
+          <a:blip r:embed="rId2" cstate="print">
+            <a:extLst>
+              <a:ext uri="{28A0092B-C50C-407E-A947-70E740481C1C}">
+                <a14:useLocalDpi xmlns:a14="http://schemas.microsoft.com/office/drawing/2010/main" val="0"/>
+              </a:ext>
+            </a:extLst>
+          </a:blip>
+          <a:srcRect/>
+          <a:stretch>
+            <a:fillRect/>
+          </a:stretch>
+        </p:blipFill>
+        <p:spPr bwMode="auto">
+          <a:xfrm>
+            <a:off x="2102399" y="2178447"/>
+            <a:ext cx="976801" cy="1002506"/>
+          </a:xfrm>
+          <a:prstGeom prst="rect">
+            <a:avLst/>
+          </a:prstGeom>
+          <a:noFill/>
+          <a:extLst>
+            <a:ext uri="{909E8E84-426E-40DD-AFC4-6F175D3DCCD1}">
+              <a14:hiddenFill xmlns:a14="http://schemas.microsoft.com/office/drawing/2010/main">
+                <a:solidFill>
+                  <a:srgbClr val="FFFFFF"/>
+                </a:solidFill>
+              </a14:hiddenFill>
+            </a:ext>
+          </a:extLst>
+        </p:spPr>
+      </p:pic>
+      <p:pic>
+        <p:nvPicPr>
+          <p:cNvPr id="1030" name="Picture 6" descr="https://laurenarellis.files.wordpress.com/2015/01/emjoi4.png"/>
+          <p:cNvPicPr>
+            <a:picLocks noChangeAspect="1" noChangeArrowheads="1"/>
+          </p:cNvPicPr>
+          <p:nvPr/>
+        </p:nvPicPr>
+        <p:blipFill>
+          <a:blip r:embed="rId3">
+            <a:extLst>
+              <a:ext uri="{28A0092B-C50C-407E-A947-70E740481C1C}">
+                <a14:useLocalDpi xmlns:a14="http://schemas.microsoft.com/office/drawing/2010/main" val="0"/>
+              </a:ext>
+            </a:extLst>
+          </a:blip>
+          <a:srcRect/>
+          <a:stretch>
+            <a:fillRect/>
+          </a:stretch>
+        </p:blipFill>
+        <p:spPr bwMode="auto">
+          <a:xfrm>
+            <a:off x="5518150" y="762000"/>
+            <a:ext cx="1085480" cy="1085480"/>
+          </a:xfrm>
+          <a:prstGeom prst="rect">
+            <a:avLst/>
+          </a:prstGeom>
+          <a:noFill/>
+          <a:extLst>
+            <a:ext uri="{909E8E84-426E-40DD-AFC4-6F175D3DCCD1}">
+              <a14:hiddenFill xmlns:a14="http://schemas.microsoft.com/office/drawing/2010/main">
+                <a:solidFill>
+                  <a:srgbClr val="FFFFFF"/>
+                </a:solidFill>
+              </a14:hiddenFill>
+            </a:ext>
+          </a:extLst>
+        </p:spPr>
+      </p:pic>
+      <p:pic>
+        <p:nvPicPr>
+          <p:cNvPr id="1032" name="Picture 8" descr="http://media.tumblr.com/0d22cbf4b14b105ba858fe59ed8f67c6/tumblr_inline_mrtu4mr3ir1qz4rgp.png"/>
+          <p:cNvPicPr>
+            <a:picLocks noChangeAspect="1" noChangeArrowheads="1"/>
+          </p:cNvPicPr>
+          <p:nvPr/>
+        </p:nvPicPr>
+        <p:blipFill>
+          <a:blip r:embed="rId4">
+            <a:extLst>
+              <a:ext uri="{28A0092B-C50C-407E-A947-70E740481C1C}">
+                <a14:useLocalDpi xmlns:a14="http://schemas.microsoft.com/office/drawing/2010/main" val="0"/>
+              </a:ext>
+            </a:extLst>
+          </a:blip>
+          <a:srcRect/>
+          <a:stretch>
+            <a:fillRect/>
+          </a:stretch>
+        </p:blipFill>
+        <p:spPr bwMode="auto">
+          <a:xfrm>
+            <a:off x="5518150" y="3225827"/>
+            <a:ext cx="1002505" cy="1002506"/>
+          </a:xfrm>
+          <a:prstGeom prst="rect">
+            <a:avLst/>
+          </a:prstGeom>
+          <a:noFill/>
+          <a:extLst>
+            <a:ext uri="{909E8E84-426E-40DD-AFC4-6F175D3DCCD1}">
+              <a14:hiddenFill xmlns:a14="http://schemas.microsoft.com/office/drawing/2010/main">
+                <a:solidFill>
+                  <a:srgbClr val="FFFFFF"/>
+                </a:solidFill>
+              </a14:hiddenFill>
+            </a:ext>
+          </a:extLst>
+        </p:spPr>
+      </p:pic>
+      <p:cxnSp>
+        <p:nvCxnSpPr>
+          <p:cNvPr id="6" name="Straight Arrow Connector 5"/>
+          <p:cNvCxnSpPr>
+            <a:stCxn id="3" idx="3"/>
+          </p:cNvCxnSpPr>
+          <p:nvPr/>
+        </p:nvCxnSpPr>
+        <p:spPr>
+          <a:xfrm flipV="1">
+            <a:off x="3079200" y="1489406"/>
+            <a:ext cx="2438950" cy="1190294"/>
+          </a:xfrm>
+          <a:prstGeom prst="straightConnector1">
+            <a:avLst/>
+          </a:prstGeom>
+          <a:ln>
+            <a:solidFill>
+              <a:schemeClr val="accent2"/>
+            </a:solidFill>
+            <a:tailEnd type="arrow"/>
+          </a:ln>
+        </p:spPr>
+        <p:style>
+          <a:lnRef idx="1">
+            <a:schemeClr val="accent1"/>
+          </a:lnRef>
+          <a:fillRef idx="0">
+            <a:schemeClr val="accent1"/>
+          </a:fillRef>
+          <a:effectRef idx="0">
+            <a:schemeClr val="accent1"/>
+          </a:effectRef>
+          <a:fontRef idx="minor">
+            <a:schemeClr val="tx1"/>
+          </a:fontRef>
+        </p:style>
+      </p:cxnSp>
     </p:spTree>
     <p:extLst>
       <p:ext uri="{BB962C8B-B14F-4D97-AF65-F5344CB8AC3E}">

</xml_diff>

<commit_message>
Finished with Hess edits
</commit_message>
<xml_diff>
--- a/mi_picture.pptx
+++ b/mi_picture.pptx
@@ -301,7 +301,7 @@
           <a:p>
             <a:fld id="{B17F4E78-F3C6-4442-AD2E-D4916562ED88}" type="datetimeFigureOut">
               <a:rPr lang="en-US" smtClean="0"/>
-              <a:t>11/27/2015</a:t>
+              <a:t>12/1/2015</a:t>
             </a:fld>
             <a:endParaRPr lang="en-US"/>
           </a:p>
@@ -471,7 +471,7 @@
           <a:p>
             <a:fld id="{B17F4E78-F3C6-4442-AD2E-D4916562ED88}" type="datetimeFigureOut">
               <a:rPr lang="en-US" smtClean="0"/>
-              <a:t>11/27/2015</a:t>
+              <a:t>12/1/2015</a:t>
             </a:fld>
             <a:endParaRPr lang="en-US"/>
           </a:p>
@@ -651,7 +651,7 @@
           <a:p>
             <a:fld id="{B17F4E78-F3C6-4442-AD2E-D4916562ED88}" type="datetimeFigureOut">
               <a:rPr lang="en-US" smtClean="0"/>
-              <a:t>11/27/2015</a:t>
+              <a:t>12/1/2015</a:t>
             </a:fld>
             <a:endParaRPr lang="en-US"/>
           </a:p>
@@ -821,7 +821,7 @@
           <a:p>
             <a:fld id="{B17F4E78-F3C6-4442-AD2E-D4916562ED88}" type="datetimeFigureOut">
               <a:rPr lang="en-US" smtClean="0"/>
-              <a:t>11/27/2015</a:t>
+              <a:t>12/1/2015</a:t>
             </a:fld>
             <a:endParaRPr lang="en-US"/>
           </a:p>
@@ -1067,7 +1067,7 @@
           <a:p>
             <a:fld id="{B17F4E78-F3C6-4442-AD2E-D4916562ED88}" type="datetimeFigureOut">
               <a:rPr lang="en-US" smtClean="0"/>
-              <a:t>11/27/2015</a:t>
+              <a:t>12/1/2015</a:t>
             </a:fld>
             <a:endParaRPr lang="en-US"/>
           </a:p>
@@ -1355,7 +1355,7 @@
           <a:p>
             <a:fld id="{B17F4E78-F3C6-4442-AD2E-D4916562ED88}" type="datetimeFigureOut">
               <a:rPr lang="en-US" smtClean="0"/>
-              <a:t>11/27/2015</a:t>
+              <a:t>12/1/2015</a:t>
             </a:fld>
             <a:endParaRPr lang="en-US"/>
           </a:p>
@@ -1777,7 +1777,7 @@
           <a:p>
             <a:fld id="{B17F4E78-F3C6-4442-AD2E-D4916562ED88}" type="datetimeFigureOut">
               <a:rPr lang="en-US" smtClean="0"/>
-              <a:t>11/27/2015</a:t>
+              <a:t>12/1/2015</a:t>
             </a:fld>
             <a:endParaRPr lang="en-US"/>
           </a:p>
@@ -1895,7 +1895,7 @@
           <a:p>
             <a:fld id="{B17F4E78-F3C6-4442-AD2E-D4916562ED88}" type="datetimeFigureOut">
               <a:rPr lang="en-US" smtClean="0"/>
-              <a:t>11/27/2015</a:t>
+              <a:t>12/1/2015</a:t>
             </a:fld>
             <a:endParaRPr lang="en-US"/>
           </a:p>
@@ -1990,7 +1990,7 @@
           <a:p>
             <a:fld id="{B17F4E78-F3C6-4442-AD2E-D4916562ED88}" type="datetimeFigureOut">
               <a:rPr lang="en-US" smtClean="0"/>
-              <a:t>11/27/2015</a:t>
+              <a:t>12/1/2015</a:t>
             </a:fld>
             <a:endParaRPr lang="en-US"/>
           </a:p>
@@ -2267,7 +2267,7 @@
           <a:p>
             <a:fld id="{B17F4E78-F3C6-4442-AD2E-D4916562ED88}" type="datetimeFigureOut">
               <a:rPr lang="en-US" smtClean="0"/>
-              <a:t>11/27/2015</a:t>
+              <a:t>12/1/2015</a:t>
             </a:fld>
             <a:endParaRPr lang="en-US"/>
           </a:p>
@@ -2520,7 +2520,7 @@
           <a:p>
             <a:fld id="{B17F4E78-F3C6-4442-AD2E-D4916562ED88}" type="datetimeFigureOut">
               <a:rPr lang="en-US" smtClean="0"/>
-              <a:t>11/27/2015</a:t>
+              <a:t>12/1/2015</a:t>
             </a:fld>
             <a:endParaRPr lang="en-US"/>
           </a:p>
@@ -2733,7 +2733,7 @@
           <a:p>
             <a:fld id="{B17F4E78-F3C6-4442-AD2E-D4916562ED88}" type="datetimeFigureOut">
               <a:rPr lang="en-US" smtClean="0"/>
-              <a:t>11/27/2015</a:t>
+              <a:t>12/1/2015</a:t>
             </a:fld>
             <a:endParaRPr lang="en-US"/>
           </a:p>
@@ -4921,7 +4921,7 @@
             <a:pPr algn="ctr"/>
             <a:r>
               <a:rPr lang="en-US" dirty="0" smtClean="0"/>
-              <a:t>Regress Age on Weight</a:t>
+              <a:t>Regress Weight on Age</a:t>
             </a:r>
             <a:endParaRPr lang="en-US" dirty="0"/>
           </a:p>
@@ -12558,15 +12558,7 @@
             <a:pPr algn="ctr"/>
             <a:r>
               <a:rPr lang="en-US" dirty="0" smtClean="0"/>
-              <a:t>IPTW </a:t>
-            </a:r>
-            <a:r>
-              <a:rPr lang="en-US" dirty="0" smtClean="0"/>
-              <a:t>Cox </a:t>
-            </a:r>
-            <a:r>
-              <a:rPr lang="en-US" dirty="0" smtClean="0"/>
-              <a:t>model</a:t>
+              <a:t>IPTW Cox model</a:t>
             </a:r>
           </a:p>
         </p:txBody>

</xml_diff>